<commit_message>
Fix spacing, fonts, quotes, and do some general code cleanup
</commit_message>
<xml_diff>
--- a/tutorial-07-sdag.pptx
+++ b/tutorial-07-sdag.pptx
@@ -7824,14 +7824,21 @@
                 <a:latin typeface="Lucida Console"/>
                 <a:cs typeface="Lucida Console"/>
               </a:rPr>
-              <a:t>[ClassName</a:t>
+              <a:t>[</a:t>
+            </a:r>
+            <a:r>
+              <a:rPr lang="en-US" sz="1800" spc="-80" dirty="0" err="1">
+                <a:latin typeface="Lucida Console"/>
+                <a:cs typeface="Lucida Console"/>
+              </a:rPr>
+              <a:t>ClassName</a:t>
             </a:r>
             <a:r>
               <a:rPr lang="en-US" sz="1800" spc="-80" dirty="0" smtClean="0">
                 <a:latin typeface="Lucida Console"/>
                 <a:cs typeface="Lucida Console"/>
               </a:rPr>
-              <a:t>] </a:t>
+              <a:t>]</a:t>
             </a:r>
             <a:r>
               <a:rPr lang="en-US" sz="1800" spc="-225" dirty="0" smtClean="0">
@@ -7952,25 +7959,32 @@
               <a:t>__</a:t>
             </a:r>
             <a:r>
-              <a:rPr lang="en-US" sz="1800" spc="-80" dirty="0" smtClean="0">
+              <a:rPr lang="en-US" sz="1800" spc="-80" dirty="0" err="1" smtClean="0">
                 <a:latin typeface="Lucida Console"/>
                 <a:cs typeface="Lucida Console"/>
               </a:rPr>
               <a:t>sdag</a:t>
             </a:r>
             <a:r>
-              <a:rPr lang="en-US" sz="1800" spc="-225" dirty="0" smtClean="0">
+              <a:rPr lang="en-US" sz="1800" spc="-225" dirty="0" err="1">
                 <a:latin typeface="Lucida Console"/>
                 <a:cs typeface="Lucida Console"/>
               </a:rPr>
-              <a:t> </a:t>
+              <a:t>_</a:t>
+            </a:r>
+            <a:r>
+              <a:rPr lang="en-US" sz="1800" spc="-80" dirty="0" err="1" smtClean="0">
+                <a:latin typeface="Lucida Console"/>
+                <a:cs typeface="Lucida Console"/>
+              </a:rPr>
+              <a:t>pup</a:t>
             </a:r>
             <a:r>
               <a:rPr lang="en-US" sz="1800" spc="-80" dirty="0">
                 <a:latin typeface="Lucida Console"/>
                 <a:cs typeface="Lucida Console"/>
               </a:rPr>
-              <a:t>pup()</a:t>
+              <a:t>()</a:t>
             </a:r>
             <a:r>
               <a:rPr lang="en-US" sz="1800" spc="30" dirty="0">
@@ -10311,11 +10325,25 @@
               <a:t>#include </a:t>
             </a:r>
             <a:r>
+              <a:rPr lang="en-US" dirty="0" smtClean="0">
+                <a:latin typeface="Consolas"/>
+                <a:cs typeface="Consolas"/>
+              </a:rPr>
+              <a:t>“</a:t>
+            </a:r>
+            <a:r>
+              <a:rPr lang="en-US" dirty="0" err="1" smtClean="0">
+                <a:latin typeface="Consolas"/>
+                <a:cs typeface="Consolas"/>
+              </a:rPr>
+              <a:t>fib.decl.h</a:t>
+            </a:r>
+            <a:r>
               <a:rPr lang="en-US" dirty="0">
                 <a:latin typeface="Consolas"/>
                 <a:cs typeface="Consolas"/>
               </a:rPr>
-              <a:t>”fib.decl.h”</a:t>
+              <a:t>”</a:t>
             </a:r>
           </a:p>
           <a:p>
@@ -10536,54 +10564,28 @@
                 <a:latin typeface="Consolas"/>
                 <a:cs typeface="Consolas"/>
               </a:rPr>
-              <a:t>    Fib  </a:t>
-            </a:r>
-            <a:r>
-              <a:rPr lang="en-US" dirty="0">
-                <a:latin typeface="Consolas"/>
-                <a:cs typeface="Consolas"/>
-              </a:rPr>
-              <a:t>SDAG  CODE</a:t>
-            </a:r>
-          </a:p>
-          <a:p>
-            <a:pPr marL="0" indent="0">
-              <a:buNone/>
-            </a:pPr>
-            <a:r>
-              <a:rPr lang="en-US" dirty="0" smtClean="0">
-                <a:latin typeface="Consolas"/>
-                <a:cs typeface="Consolas"/>
-              </a:rPr>
-              <a:t>    CProxy_Fib </a:t>
-            </a:r>
-            <a:r>
-              <a:rPr lang="en-US" dirty="0">
-                <a:latin typeface="Consolas"/>
-                <a:cs typeface="Consolas"/>
-              </a:rPr>
-              <a:t>parent; </a:t>
-            </a:r>
-            <a:r>
-              <a:rPr lang="en-US" b="1" dirty="0">
-                <a:latin typeface="Consolas"/>
-                <a:cs typeface="Consolas"/>
-              </a:rPr>
-              <a:t>bool </a:t>
-            </a:r>
-            <a:r>
-              <a:rPr lang="en-US" dirty="0">
-                <a:latin typeface="Consolas"/>
-                <a:cs typeface="Consolas"/>
-              </a:rPr>
-              <a:t>isRoot</a:t>
-            </a:r>
-            <a:r>
-              <a:rPr lang="en-US" dirty="0" smtClean="0">
-                <a:latin typeface="Consolas"/>
-                <a:cs typeface="Consolas"/>
-              </a:rPr>
-              <a:t>;</a:t>
+              <a:t>    </a:t>
+            </a:r>
+            <a:r>
+              <a:rPr lang="en-US" dirty="0" err="1" smtClean="0">
+                <a:latin typeface="Consolas"/>
+                <a:cs typeface="Consolas"/>
+              </a:rPr>
+              <a:t>Fib_SDAG</a:t>
+            </a:r>
+            <a:r>
+              <a:rPr lang="en-US" dirty="0" err="1">
+                <a:latin typeface="Consolas"/>
+                <a:cs typeface="Consolas"/>
+              </a:rPr>
+              <a:t>_</a:t>
+            </a:r>
+            <a:r>
+              <a:rPr lang="en-US" dirty="0" err="1" smtClean="0">
+                <a:latin typeface="Consolas"/>
+                <a:cs typeface="Consolas"/>
+              </a:rPr>
+              <a:t>CODE</a:t>
             </a:r>
             <a:endParaRPr lang="en-US" dirty="0">
               <a:latin typeface="Consolas"/>
@@ -10594,6 +10596,50 @@
             <a:pPr marL="0" indent="0">
               <a:buNone/>
             </a:pPr>
+            <a:r>
+              <a:rPr lang="en-US" dirty="0" smtClean="0">
+                <a:latin typeface="Consolas"/>
+                <a:cs typeface="Consolas"/>
+              </a:rPr>
+              <a:t>    CProxy_Fib </a:t>
+            </a:r>
+            <a:r>
+              <a:rPr lang="en-US" dirty="0">
+                <a:latin typeface="Consolas"/>
+                <a:cs typeface="Consolas"/>
+              </a:rPr>
+              <a:t>parent; </a:t>
+            </a:r>
+            <a:r>
+              <a:rPr lang="en-US" b="1" dirty="0">
+                <a:latin typeface="Consolas"/>
+                <a:cs typeface="Consolas"/>
+              </a:rPr>
+              <a:t>bool </a:t>
+            </a:r>
+            <a:r>
+              <a:rPr lang="en-US" dirty="0">
+                <a:latin typeface="Consolas"/>
+                <a:cs typeface="Consolas"/>
+              </a:rPr>
+              <a:t>isRoot</a:t>
+            </a:r>
+            <a:r>
+              <a:rPr lang="en-US" dirty="0" smtClean="0">
+                <a:latin typeface="Consolas"/>
+                <a:cs typeface="Consolas"/>
+              </a:rPr>
+              <a:t>;</a:t>
+            </a:r>
+            <a:endParaRPr lang="en-US" dirty="0">
+              <a:latin typeface="Consolas"/>
+              <a:cs typeface="Consolas"/>
+            </a:endParaRPr>
+          </a:p>
+          <a:p>
+            <a:pPr marL="0" indent="0">
+              <a:buNone/>
+            </a:pPr>
             <a:endParaRPr lang="en-US" dirty="0" smtClean="0">
               <a:latin typeface="Consolas"/>
               <a:cs typeface="Consolas"/>
@@ -10643,23 +10689,28 @@
                 <a:latin typeface="Consolas"/>
                 <a:cs typeface="Consolas"/>
               </a:rPr>
-              <a:t>isRoot_, CProxy_Fib parent_)</a:t>
-            </a:r>
-            <a:endParaRPr lang="en-US" dirty="0">
-              <a:latin typeface="Consolas"/>
-              <a:cs typeface="Consolas"/>
-            </a:endParaRPr>
-          </a:p>
-          <a:p>
-            <a:pPr marL="0" indent="0">
-              <a:buNone/>
-            </a:pPr>
+              <a:t>isRoot_, CProxy_Fib parent_</a:t>
+            </a:r>
             <a:r>
               <a:rPr lang="en-US" dirty="0" smtClean="0">
                 <a:latin typeface="Consolas"/>
                 <a:cs typeface="Consolas"/>
               </a:rPr>
-              <a:t>        : </a:t>
+              <a:t>)</a:t>
+            </a:r>
+            <a:r>
+              <a:rPr lang="en-US" dirty="0">
+                <a:latin typeface="Consolas"/>
+                <a:cs typeface="Consolas"/>
+              </a:rPr>
+              <a:t> </a:t>
+            </a:r>
+            <a:r>
+              <a:rPr lang="en-US" dirty="0" smtClean="0">
+                <a:latin typeface="Consolas"/>
+                <a:cs typeface="Consolas"/>
+              </a:rPr>
+              <a:t>: </a:t>
             </a:r>
             <a:r>
               <a:rPr lang="en-US" dirty="0">
@@ -18195,13 +18246,13 @@
         </p:nvSpPr>
         <p:spPr>
           <a:xfrm>
-            <a:off x="261865" y="1143000"/>
-            <a:ext cx="8615360" cy="3339353"/>
+            <a:off x="261865" y="917222"/>
+            <a:ext cx="8615360" cy="3565131"/>
           </a:xfrm>
         </p:spPr>
         <p:txBody>
           <a:bodyPr>
-            <a:normAutofit fontScale="85000" lnSpcReduction="10000"/>
+            <a:normAutofit fontScale="92500" lnSpcReduction="20000"/>
           </a:bodyPr>
           <a:lstStyle/>
           <a:p>
@@ -19020,7 +19071,7 @@
                 <a:latin typeface="Times New Roman"/>
                 <a:cs typeface="Times New Roman"/>
               </a:rPr>
-              <a:t>Syntax </a:t>
+              <a:t>Syntax: </a:t>
             </a:r>
             <a:r>
               <a:rPr lang="en-US" spc="-80" dirty="0">
@@ -19064,25 +19115,21 @@
               </a:rPr>
               <a:t>}</a:t>
             </a:r>
-            <a:endParaRPr lang="en-US" dirty="0">
+          </a:p>
+          <a:p>
+            <a:pPr marL="459740" marR="12700" indent="0">
+              <a:spcBef>
+                <a:spcPts val="0"/>
+              </a:spcBef>
+              <a:buNone/>
+            </a:pPr>
+            <a:endParaRPr lang="en-US" dirty="0" smtClean="0">
               <a:latin typeface="Lucida Console"/>
               <a:cs typeface="Lucida Console"/>
             </a:endParaRPr>
           </a:p>
           <a:p>
-            <a:pPr marL="459740" marR="12700" indent="0">
-              <a:spcBef>
-                <a:spcPts val="0"/>
-              </a:spcBef>
-              <a:buNone/>
-            </a:pPr>
-            <a:endParaRPr lang="en-US" dirty="0" smtClean="0">
-              <a:latin typeface="Times New Roman"/>
-              <a:cs typeface="Times New Roman"/>
-            </a:endParaRPr>
-          </a:p>
-          <a:p>
-            <a:pPr marL="459740" marR="12700" indent="0">
+            <a:pPr marL="0" marR="12700" indent="0">
               <a:spcBef>
                 <a:spcPts val="0"/>
               </a:spcBef>
@@ -19820,7 +19867,15 @@
             <a:pPr lvl="2"/>
             <a:r>
               <a:rPr lang="en-US" dirty="0"/>
-              <a:t>i.e.  some chars may be truly reactive, and the programmer does not know the life cycle</a:t>
+              <a:t>i.e</a:t>
+            </a:r>
+            <a:r>
+              <a:rPr lang="en-US" dirty="0" smtClean="0"/>
+              <a:t>. </a:t>
+            </a:r>
+            <a:r>
+              <a:rPr lang="en-US" dirty="0"/>
+              <a:t>some chars may be truly reactive, and the programmer does not know the life cycle</a:t>
             </a:r>
           </a:p>
           <a:p>
@@ -20973,7 +21028,21 @@
                 <a:latin typeface="Lucida Console"/>
                 <a:cs typeface="Lucida Console"/>
               </a:rPr>
-              <a:t>[&lt;ident&gt;] (&lt;min&gt; :	&lt;max&gt;, &lt;stride&gt;) &lt;body&gt;</a:t>
+              <a:t>[&lt;ident&gt;] (&lt;min&gt; </a:t>
+            </a:r>
+            <a:r>
+              <a:rPr lang="en-US" sz="2000" spc="-80" dirty="0" smtClean="0">
+                <a:latin typeface="Lucida Console"/>
+                <a:cs typeface="Lucida Console"/>
+              </a:rPr>
+              <a:t>: &lt;</a:t>
+            </a:r>
+            <a:r>
+              <a:rPr lang="en-US" sz="2000" spc="-80" dirty="0">
+                <a:latin typeface="Lucida Console"/>
+                <a:cs typeface="Lucida Console"/>
+              </a:rPr>
+              <a:t>max&gt;, &lt;stride&gt;) &lt;body&gt;</a:t>
             </a:r>
             <a:endParaRPr lang="en-US" sz="2000" dirty="0">
               <a:latin typeface="Lucida Console"/>
@@ -22222,7 +22291,21 @@
                 <a:latin typeface="Consolas"/>
                 <a:cs typeface="Consolas"/>
               </a:rPr>
-              <a:t>[reductiontarget] void checkIn();</a:t>
+              <a:t>[reductiontarget] </a:t>
+            </a:r>
+            <a:r>
+              <a:rPr lang="en-US" sz="2000" b="1" dirty="0">
+                <a:latin typeface="Consolas"/>
+                <a:cs typeface="Consolas"/>
+              </a:rPr>
+              <a:t>void</a:t>
+            </a:r>
+            <a:r>
+              <a:rPr lang="en-US" sz="2000" dirty="0">
+                <a:latin typeface="Consolas"/>
+                <a:cs typeface="Consolas"/>
+              </a:rPr>
+              <a:t> checkIn();</a:t>
             </a:r>
           </a:p>
           <a:p>
@@ -22309,7 +22392,21 @@
                 <a:latin typeface="Consolas"/>
                 <a:cs typeface="Consolas"/>
               </a:rPr>
-              <a:t>Prefix(int n, </a:t>
+              <a:t>Prefix(</a:t>
+            </a:r>
+            <a:r>
+              <a:rPr lang="en-US" sz="2000" b="1" dirty="0">
+                <a:latin typeface="Consolas"/>
+                <a:cs typeface="Consolas"/>
+              </a:rPr>
+              <a:t>int</a:t>
+            </a:r>
+            <a:r>
+              <a:rPr lang="en-US" sz="2000" dirty="0">
+                <a:latin typeface="Consolas"/>
+                <a:cs typeface="Consolas"/>
+              </a:rPr>
+              <a:t> n, </a:t>
             </a:r>
             <a:r>
               <a:rPr lang="en-US" sz="2000" dirty="0" smtClean="0">
@@ -22740,28 +22837,28 @@
               <a:buNone/>
             </a:pPr>
             <a:r>
-              <a:rPr lang="en-US" sz="1400" dirty="0" smtClean="0">
+              <a:rPr lang="en-US" sz="1500" dirty="0" smtClean="0">
                 <a:latin typeface="Consolas"/>
                 <a:cs typeface="Consolas"/>
               </a:rPr>
               <a:t>  </a:t>
             </a:r>
             <a:r>
-              <a:rPr lang="en-US" sz="1400" b="1" dirty="0" smtClean="0">
+              <a:rPr lang="en-US" sz="1500" b="1" dirty="0" smtClean="0">
                 <a:latin typeface="Consolas"/>
                 <a:cs typeface="Consolas"/>
               </a:rPr>
               <a:t>entry </a:t>
             </a:r>
             <a:r>
-              <a:rPr lang="en-US" sz="1400" b="1" dirty="0">
+              <a:rPr lang="en-US" sz="1500" b="1" dirty="0">
                 <a:latin typeface="Consolas"/>
                 <a:cs typeface="Consolas"/>
               </a:rPr>
               <a:t>void </a:t>
             </a:r>
             <a:r>
-              <a:rPr lang="en-US" sz="1400" dirty="0">
+              <a:rPr lang="en-US" sz="1500" dirty="0">
                 <a:latin typeface="Consolas"/>
                 <a:cs typeface="Consolas"/>
               </a:rPr>
@@ -22773,21 +22870,21 @@
               <a:buNone/>
             </a:pPr>
             <a:r>
-              <a:rPr lang="en-US" sz="1400" dirty="0" smtClean="0">
-                <a:latin typeface="Consolas"/>
-                <a:cs typeface="Consolas"/>
-              </a:rPr>
-              <a:t>     </a:t>
-            </a:r>
-            <a:r>
-              <a:rPr lang="en-US" sz="1400" b="1" dirty="0" smtClean="0">
+              <a:rPr lang="en-US" sz="1500" dirty="0" smtClean="0">
+                <a:latin typeface="Consolas"/>
+                <a:cs typeface="Consolas"/>
+              </a:rPr>
+              <a:t>    </a:t>
+            </a:r>
+            <a:r>
+              <a:rPr lang="en-US" sz="1500" b="1" dirty="0" smtClean="0">
                 <a:latin typeface="Consolas"/>
                 <a:cs typeface="Consolas"/>
               </a:rPr>
               <a:t>for</a:t>
             </a:r>
             <a:r>
-              <a:rPr lang="en-US" sz="1400" dirty="0">
+              <a:rPr lang="en-US" sz="1500" dirty="0">
                 <a:latin typeface="Consolas"/>
                 <a:cs typeface="Consolas"/>
               </a:rPr>
@@ -22799,86 +22896,114 @@
               <a:buNone/>
             </a:pPr>
             <a:r>
-              <a:rPr lang="en-US" sz="1400" dirty="0" smtClean="0">
+              <a:rPr lang="en-US" sz="1500" dirty="0" smtClean="0">
+                <a:latin typeface="Consolas"/>
+                <a:cs typeface="Consolas"/>
+              </a:rPr>
+              <a:t>      </a:t>
+            </a:r>
+            <a:r>
+              <a:rPr lang="en-US" sz="1500" b="1" dirty="0" smtClean="0">
+                <a:latin typeface="Consolas"/>
+                <a:cs typeface="Consolas"/>
+              </a:rPr>
+              <a:t>serial </a:t>
+            </a:r>
+            <a:r>
+              <a:rPr lang="en-US" sz="1500" dirty="0" smtClean="0">
+                <a:latin typeface="Consolas"/>
+                <a:cs typeface="Consolas"/>
+              </a:rPr>
+              <a:t>“</a:t>
+            </a:r>
+            <a:r>
+              <a:rPr lang="en-US" sz="1500" dirty="0" err="1" smtClean="0">
+                <a:latin typeface="Consolas"/>
+                <a:cs typeface="Consolas"/>
+              </a:rPr>
+              <a:t>send_value</a:t>
+            </a:r>
+            <a:r>
+              <a:rPr lang="en-US" sz="1500" dirty="0">
+                <a:latin typeface="Consolas"/>
+                <a:cs typeface="Consolas"/>
+              </a:rPr>
+              <a:t>” {</a:t>
+            </a:r>
+          </a:p>
+          <a:p>
+            <a:pPr marL="0" indent="0">
+              <a:buNone/>
+            </a:pPr>
+            <a:r>
+              <a:rPr lang="en-US" sz="1500" dirty="0" smtClean="0">
+                <a:latin typeface="Consolas"/>
+                <a:cs typeface="Consolas"/>
+              </a:rPr>
+              <a:t>      </a:t>
+            </a:r>
+            <a:r>
+              <a:rPr lang="en-US" sz="1500" dirty="0">
+                <a:latin typeface="Consolas"/>
+                <a:cs typeface="Consolas"/>
+              </a:rPr>
+              <a:t> </a:t>
+            </a:r>
+            <a:r>
+              <a:rPr lang="en-US" sz="1500" dirty="0" smtClean="0">
+                <a:latin typeface="Consolas"/>
+                <a:cs typeface="Consolas"/>
+              </a:rPr>
+              <a:t> </a:t>
+            </a:r>
+            <a:r>
+              <a:rPr lang="en-US" sz="1500" dirty="0" err="1" smtClean="0">
+                <a:latin typeface="Consolas"/>
+                <a:cs typeface="Consolas"/>
+              </a:rPr>
+              <a:t>targetIndex</a:t>
+            </a:r>
+            <a:r>
+              <a:rPr lang="en-US" sz="1500" dirty="0" smtClean="0">
+                <a:latin typeface="Consolas"/>
+                <a:cs typeface="Consolas"/>
+              </a:rPr>
+              <a:t> </a:t>
+            </a:r>
+            <a:r>
+              <a:rPr lang="en-US" sz="1500" dirty="0">
+                <a:latin typeface="Consolas"/>
+                <a:cs typeface="Consolas"/>
+              </a:rPr>
+              <a:t>= thisIndex + (1&lt;&lt;stage);</a:t>
+            </a:r>
+          </a:p>
+          <a:p>
+            <a:pPr marL="0" indent="0">
+              <a:buNone/>
+            </a:pPr>
+            <a:r>
+              <a:rPr lang="en-US" sz="1500" dirty="0" smtClean="0">
                 <a:latin typeface="Consolas"/>
                 <a:cs typeface="Consolas"/>
               </a:rPr>
               <a:t>        </a:t>
             </a:r>
             <a:r>
-              <a:rPr lang="en-US" sz="1400" b="1" dirty="0" smtClean="0">
-                <a:latin typeface="Consolas"/>
-                <a:cs typeface="Consolas"/>
-              </a:rPr>
-              <a:t>serial </a:t>
-            </a:r>
-            <a:r>
-              <a:rPr lang="en-US" sz="1400" dirty="0">
-                <a:latin typeface="Consolas"/>
-                <a:cs typeface="Consolas"/>
-              </a:rPr>
-              <a:t>”</a:t>
-            </a:r>
-            <a:r>
-              <a:rPr lang="en-US" sz="1400" dirty="0" smtClean="0">
-                <a:latin typeface="Consolas"/>
-                <a:cs typeface="Consolas"/>
-              </a:rPr>
-              <a:t>send_value</a:t>
-            </a:r>
-            <a:r>
-              <a:rPr lang="en-US" sz="1400" dirty="0">
-                <a:latin typeface="Consolas"/>
-                <a:cs typeface="Consolas"/>
-              </a:rPr>
-              <a:t>” {</a:t>
-            </a:r>
-          </a:p>
-          <a:p>
-            <a:pPr marL="0" indent="0">
-              <a:buNone/>
-            </a:pPr>
-            <a:r>
-              <a:rPr lang="en-US" sz="1400" dirty="0" smtClean="0">
-                <a:latin typeface="Consolas"/>
-                <a:cs typeface="Consolas"/>
-              </a:rPr>
-              <a:t>           targetIndex </a:t>
-            </a:r>
-            <a:r>
-              <a:rPr lang="en-US" sz="1400" dirty="0">
-                <a:latin typeface="Consolas"/>
-                <a:cs typeface="Consolas"/>
-              </a:rPr>
-              <a:t>= thisIndex + (1&lt;&lt;stage);</a:t>
-            </a:r>
-          </a:p>
-          <a:p>
-            <a:pPr marL="0" indent="0">
-              <a:buNone/>
-            </a:pPr>
-            <a:r>
-              <a:rPr lang="en-US" sz="1400" dirty="0" smtClean="0">
-                <a:latin typeface="Consolas"/>
-                <a:cs typeface="Consolas"/>
-              </a:rPr>
-              <a:t>           </a:t>
-            </a:r>
-            <a:r>
-              <a:rPr lang="en-US" sz="1400" b="1" dirty="0" smtClean="0">
+              <a:rPr lang="en-US" sz="1500" b="1" dirty="0" smtClean="0">
                 <a:latin typeface="Consolas"/>
                 <a:cs typeface="Consolas"/>
               </a:rPr>
               <a:t>if </a:t>
             </a:r>
             <a:r>
-              <a:rPr lang="en-US" sz="1400" dirty="0">
+              <a:rPr lang="en-US" sz="1500" dirty="0">
                 <a:latin typeface="Consolas"/>
                 <a:cs typeface="Consolas"/>
               </a:rPr>
               <a:t>(targetIndex &lt; numElements) </a:t>
             </a:r>
-            <a:endParaRPr lang="en-US" sz="1400" dirty="0" smtClean="0">
+            <a:endParaRPr lang="en-US" sz="1500" dirty="0" smtClean="0">
               <a:latin typeface="Consolas"/>
               <a:cs typeface="Consolas"/>
             </a:endParaRPr>
@@ -22888,11 +23013,39 @@
               <a:buNone/>
             </a:pPr>
             <a:r>
-              <a:rPr lang="en-US" sz="1400" dirty="0" smtClean="0">
-                <a:latin typeface="Consolas"/>
-                <a:cs typeface="Consolas"/>
-              </a:rPr>
-              <a:t>              thisProxy[targetIndex].passValue(stage, value);</a:t>
+              <a:rPr lang="en-US" sz="1500" dirty="0" smtClean="0">
+                <a:latin typeface="Consolas"/>
+                <a:cs typeface="Consolas"/>
+              </a:rPr>
+              <a:t>        </a:t>
+            </a:r>
+            <a:r>
+              <a:rPr lang="en-US" sz="1500" dirty="0">
+                <a:latin typeface="Consolas"/>
+                <a:cs typeface="Consolas"/>
+              </a:rPr>
+              <a:t> </a:t>
+            </a:r>
+            <a:r>
+              <a:rPr lang="en-US" sz="1500" dirty="0" smtClean="0">
+                <a:latin typeface="Consolas"/>
+                <a:cs typeface="Consolas"/>
+              </a:rPr>
+              <a:t> </a:t>
+            </a:r>
+            <a:r>
+              <a:rPr lang="en-US" sz="1500" dirty="0" err="1" smtClean="0">
+                <a:latin typeface="Consolas"/>
+                <a:cs typeface="Consolas"/>
+              </a:rPr>
+              <a:t>thisProxy</a:t>
+            </a:r>
+            <a:r>
+              <a:rPr lang="en-US" sz="1500" dirty="0" smtClean="0">
+                <a:latin typeface="Consolas"/>
+                <a:cs typeface="Consolas"/>
+              </a:rPr>
+              <a:t>[targetIndex].passValue(stage, value);</a:t>
             </a:r>
           </a:p>
           <a:p>
@@ -22900,13 +23053,20 @@
               <a:buNone/>
             </a:pPr>
             <a:r>
-              <a:rPr lang="en-US" sz="1400" dirty="0" smtClean="0">
-                <a:latin typeface="Consolas"/>
-                <a:cs typeface="Consolas"/>
-              </a:rPr>
-              <a:t>        }</a:t>
-            </a:r>
-            <a:endParaRPr lang="en-US" sz="1400" dirty="0">
+              <a:rPr lang="en-US" sz="1500" dirty="0" smtClean="0">
+                <a:latin typeface="Consolas"/>
+                <a:cs typeface="Consolas"/>
+              </a:rPr>
+              <a:t>      </a:t>
+            </a:r>
+            <a:r>
+              <a:rPr lang="en-US" sz="1500" dirty="0" smtClean="0">
+                <a:latin typeface="Consolas"/>
+                <a:cs typeface="Consolas"/>
+              </a:rPr>
+              <a:t>}</a:t>
+            </a:r>
+            <a:endParaRPr lang="en-US" sz="1500" dirty="0">
               <a:latin typeface="Consolas"/>
               <a:cs typeface="Consolas"/>
             </a:endParaRPr>
@@ -22916,21 +23076,21 @@
               <a:buNone/>
             </a:pPr>
             <a:r>
-              <a:rPr lang="en-US" sz="1400" dirty="0" smtClean="0">
-                <a:latin typeface="Consolas"/>
-                <a:cs typeface="Consolas"/>
-              </a:rPr>
-              <a:t>        </a:t>
-            </a:r>
-            <a:r>
-              <a:rPr lang="en-US" sz="1400" b="1" dirty="0" smtClean="0">
+              <a:rPr lang="en-US" sz="1500" dirty="0" smtClean="0">
+                <a:latin typeface="Consolas"/>
+                <a:cs typeface="Consolas"/>
+              </a:rPr>
+              <a:t>      </a:t>
+            </a:r>
+            <a:r>
+              <a:rPr lang="en-US" sz="1500" b="1" dirty="0" smtClean="0">
                 <a:latin typeface="Consolas"/>
                 <a:cs typeface="Consolas"/>
               </a:rPr>
               <a:t>if </a:t>
             </a:r>
             <a:r>
-              <a:rPr lang="en-US" sz="1400" dirty="0">
+              <a:rPr lang="en-US" sz="1500" dirty="0">
                 <a:latin typeface="Consolas"/>
                 <a:cs typeface="Consolas"/>
               </a:rPr>
@@ -22942,88 +23102,83 @@
               <a:buNone/>
             </a:pPr>
             <a:r>
-              <a:rPr lang="en-US" sz="1400" dirty="0" smtClean="0">
-                <a:latin typeface="Consolas"/>
-                <a:cs typeface="Consolas"/>
-              </a:rPr>
-              <a:t>            </a:t>
-            </a:r>
-            <a:r>
-              <a:rPr lang="en-US" sz="1200" b="1" dirty="0" smtClean="0">
+              <a:rPr lang="en-US" sz="1500" dirty="0" smtClean="0">
+                <a:latin typeface="Consolas"/>
+                <a:cs typeface="Consolas"/>
+              </a:rPr>
+              <a:t>      </a:t>
+            </a:r>
+            <a:r>
+              <a:rPr lang="en-US" sz="1500" dirty="0" smtClean="0">
+                <a:latin typeface="Consolas"/>
+                <a:cs typeface="Consolas"/>
+              </a:rPr>
+              <a:t>  </a:t>
+            </a:r>
+            <a:r>
+              <a:rPr lang="en-US" sz="1500" b="1" dirty="0" smtClean="0">
                 <a:latin typeface="Consolas"/>
                 <a:cs typeface="Consolas"/>
               </a:rPr>
               <a:t>when </a:t>
             </a:r>
             <a:r>
-              <a:rPr lang="en-US" sz="1200" dirty="0">
-                <a:latin typeface="Consolas"/>
-                <a:cs typeface="Consolas"/>
-              </a:rPr>
-              <a:t>passValue[stage] (</a:t>
-            </a:r>
-            <a:r>
-              <a:rPr lang="en-US" sz="1200" b="1" dirty="0">
+              <a:rPr lang="en-US" sz="1500" dirty="0">
+                <a:latin typeface="Consolas"/>
+                <a:cs typeface="Consolas"/>
+              </a:rPr>
+              <a:t>passValue[stage</a:t>
+            </a:r>
+            <a:r>
+              <a:rPr lang="en-US" sz="1500" dirty="0" smtClean="0">
+                <a:latin typeface="Consolas"/>
+                <a:cs typeface="Consolas"/>
+              </a:rPr>
+              <a:t>](</a:t>
+            </a:r>
+            <a:r>
+              <a:rPr lang="en-US" sz="1500" b="1" dirty="0">
                 <a:latin typeface="Consolas"/>
                 <a:cs typeface="Consolas"/>
               </a:rPr>
               <a:t>int </a:t>
             </a:r>
             <a:r>
-              <a:rPr lang="en-US" sz="1200" dirty="0" smtClean="0">
+              <a:rPr lang="en-US" sz="1500" dirty="0" smtClean="0">
                 <a:latin typeface="Consolas"/>
                 <a:cs typeface="Consolas"/>
               </a:rPr>
               <a:t>incoming_stage</a:t>
             </a:r>
             <a:r>
-              <a:rPr lang="en-US" sz="1200" dirty="0">
+              <a:rPr lang="en-US" sz="1500" dirty="0">
                 <a:latin typeface="Consolas"/>
                 <a:cs typeface="Consolas"/>
               </a:rPr>
               <a:t>, </a:t>
             </a:r>
             <a:r>
-              <a:rPr lang="en-US" sz="1200" b="1" dirty="0">
+              <a:rPr lang="en-US" sz="1500" b="1" dirty="0">
                 <a:latin typeface="Consolas"/>
                 <a:cs typeface="Consolas"/>
               </a:rPr>
               <a:t>unsigned int </a:t>
             </a:r>
             <a:r>
-              <a:rPr lang="en-US" sz="1200" dirty="0" smtClean="0">
+              <a:rPr lang="en-US" sz="1500" dirty="0" smtClean="0">
                 <a:latin typeface="Consolas"/>
                 <a:cs typeface="Consolas"/>
               </a:rPr>
               <a:t>incoming_value</a:t>
             </a:r>
             <a:r>
-              <a:rPr lang="en-US" sz="1200" dirty="0">
+              <a:rPr lang="en-US" sz="1500" dirty="0">
                 <a:latin typeface="Consolas"/>
                 <a:cs typeface="Consolas"/>
               </a:rPr>
               <a:t>) </a:t>
             </a:r>
-            <a:r>
-              <a:rPr lang="en-US" sz="1200" b="1" dirty="0">
-                <a:latin typeface="Consolas"/>
-                <a:cs typeface="Consolas"/>
-              </a:rPr>
-              <a:t>serial</a:t>
-            </a:r>
-          </a:p>
-          <a:p>
-            <a:pPr marL="0" indent="0">
-              <a:buNone/>
-            </a:pPr>
-            <a:r>
-              <a:rPr lang="en-US" sz="1400" dirty="0" smtClean="0">
-                <a:latin typeface="Consolas"/>
-                <a:cs typeface="Consolas"/>
-              </a:rPr>
-              <a:t>                   {</a:t>
-            </a:r>
-            <a:endParaRPr lang="en-US" sz="1400" dirty="0">
+            <a:endParaRPr lang="en-US" sz="1500" dirty="0" smtClean="0">
               <a:latin typeface="Consolas"/>
               <a:cs typeface="Consolas"/>
             </a:endParaRPr>
@@ -23033,46 +23188,62 @@
               <a:buNone/>
             </a:pPr>
             <a:r>
-              <a:rPr lang="en-US" sz="1400" dirty="0" smtClean="0">
-                <a:latin typeface="Consolas"/>
-                <a:cs typeface="Consolas"/>
-              </a:rPr>
-              <a:t>                value </a:t>
-            </a:r>
-            <a:r>
-              <a:rPr lang="en-US" sz="1400" dirty="0">
+              <a:rPr lang="en-US" sz="1500" b="1" dirty="0" smtClean="0">
+                <a:latin typeface="Consolas"/>
+                <a:cs typeface="Consolas"/>
+              </a:rPr>
+              <a:t>	 </a:t>
+            </a:r>
+            <a:r>
+              <a:rPr lang="en-US" sz="1500" b="1" dirty="0" smtClean="0">
+                <a:latin typeface="Consolas"/>
+                <a:cs typeface="Consolas"/>
+              </a:rPr>
+              <a:t>serial</a:t>
+            </a:r>
+            <a:r>
+              <a:rPr lang="en-US" sz="1500" b="1" dirty="0" smtClean="0">
+                <a:latin typeface="Consolas"/>
+                <a:cs typeface="Consolas"/>
+              </a:rPr>
+              <a:t> {</a:t>
+            </a:r>
+            <a:r>
+              <a:rPr lang="en-US" sz="1500" dirty="0">
+                <a:latin typeface="Consolas"/>
+                <a:cs typeface="Consolas"/>
+              </a:rPr>
+              <a:t> </a:t>
+            </a:r>
+            <a:r>
+              <a:rPr lang="en-US" sz="1500" dirty="0" smtClean="0">
+                <a:latin typeface="Consolas"/>
+                <a:cs typeface="Consolas"/>
+              </a:rPr>
+              <a:t>value </a:t>
+            </a:r>
+            <a:r>
+              <a:rPr lang="en-US" sz="1500" dirty="0">
                 <a:latin typeface="Consolas"/>
                 <a:cs typeface="Consolas"/>
               </a:rPr>
               <a:t>+= </a:t>
             </a:r>
             <a:r>
-              <a:rPr lang="en-US" sz="1400" dirty="0" smtClean="0">
+              <a:rPr lang="en-US" sz="1500" dirty="0" err="1" smtClean="0">
                 <a:latin typeface="Consolas"/>
                 <a:cs typeface="Consolas"/>
               </a:rPr>
               <a:t>incoming_value</a:t>
             </a:r>
             <a:r>
-              <a:rPr lang="en-US" sz="1400" dirty="0">
-                <a:latin typeface="Consolas"/>
-                <a:cs typeface="Consolas"/>
-              </a:rPr>
-              <a:t>;</a:t>
-            </a:r>
-          </a:p>
-          <a:p>
-            <a:pPr marL="0" indent="0">
-              <a:buNone/>
-            </a:pPr>
-            <a:r>
-              <a:rPr lang="en-US" sz="1400" dirty="0" smtClean="0">
-                <a:latin typeface="Consolas"/>
-                <a:cs typeface="Consolas"/>
-              </a:rPr>
-              <a:t>            }</a:t>
-            </a:r>
-            <a:endParaRPr lang="en-US" sz="1400" dirty="0">
+              <a:rPr lang="en-US" sz="1500" dirty="0" smtClean="0">
+                <a:latin typeface="Consolas"/>
+                <a:cs typeface="Consolas"/>
+              </a:rPr>
+              <a:t>; }</a:t>
+            </a:r>
+            <a:endParaRPr lang="en-US" sz="1500" dirty="0">
               <a:latin typeface="Consolas"/>
               <a:cs typeface="Consolas"/>
             </a:endParaRPr>
@@ -23082,13 +23253,20 @@
               <a:buNone/>
             </a:pPr>
             <a:r>
-              <a:rPr lang="en-US" sz="1400" dirty="0" smtClean="0">
-                <a:latin typeface="Consolas"/>
-                <a:cs typeface="Consolas"/>
-              </a:rPr>
-              <a:t>         }</a:t>
-            </a:r>
-            <a:endParaRPr lang="en-US" sz="1400" dirty="0">
+              <a:rPr lang="en-US" sz="1500" dirty="0" smtClean="0">
+                <a:latin typeface="Consolas"/>
+                <a:cs typeface="Consolas"/>
+              </a:rPr>
+              <a:t>      </a:t>
+            </a:r>
+            <a:r>
+              <a:rPr lang="en-US" sz="1500" dirty="0" smtClean="0">
+                <a:latin typeface="Consolas"/>
+                <a:cs typeface="Consolas"/>
+              </a:rPr>
+              <a:t>}</a:t>
+            </a:r>
+            <a:endParaRPr lang="en-US" sz="1500" dirty="0">
               <a:latin typeface="Consolas"/>
               <a:cs typeface="Consolas"/>
             </a:endParaRPr>
@@ -23098,25 +23276,39 @@
               <a:buNone/>
             </a:pPr>
             <a:r>
-              <a:rPr lang="en-US" sz="1400" dirty="0" smtClean="0">
-                <a:latin typeface="Consolas"/>
-                <a:cs typeface="Consolas"/>
-              </a:rPr>
-              <a:t>         </a:t>
-            </a:r>
-            <a:r>
-              <a:rPr lang="en-US" sz="1400" b="1" dirty="0" smtClean="0">
+              <a:rPr lang="en-US" sz="1500" dirty="0" smtClean="0">
+                <a:latin typeface="Consolas"/>
+                <a:cs typeface="Consolas"/>
+              </a:rPr>
+              <a:t>      </a:t>
+            </a:r>
+            <a:r>
+              <a:rPr lang="en-US" sz="1500" b="1" dirty="0" smtClean="0">
                 <a:latin typeface="Consolas"/>
                 <a:cs typeface="Consolas"/>
               </a:rPr>
               <a:t>serial </a:t>
             </a:r>
             <a:r>
-              <a:rPr lang="en-US" sz="1400" dirty="0">
-                <a:latin typeface="Consolas"/>
-                <a:cs typeface="Consolas"/>
-              </a:rPr>
-              <a:t>”done” {</a:t>
+              <a:rPr lang="en-US" sz="1500" dirty="0" smtClean="0">
+                <a:latin typeface="Consolas"/>
+                <a:cs typeface="Consolas"/>
+              </a:rPr>
+              <a:t>“</a:t>
+            </a:r>
+            <a:r>
+              <a:rPr lang="en-US" sz="1500" dirty="0" smtClean="0">
+                <a:latin typeface="Consolas"/>
+                <a:cs typeface="Consolas"/>
+              </a:rPr>
+              <a:t>done</a:t>
+            </a:r>
+            <a:r>
+              <a:rPr lang="en-US" sz="1500" dirty="0">
+                <a:latin typeface="Consolas"/>
+                <a:cs typeface="Consolas"/>
+              </a:rPr>
+              <a:t>” {</a:t>
             </a:r>
           </a:p>
           <a:p>
@@ -23124,21 +23316,28 @@
               <a:buNone/>
             </a:pPr>
             <a:r>
-              <a:rPr lang="en-US" sz="1400" dirty="0" smtClean="0">
-                <a:latin typeface="Consolas"/>
-                <a:cs typeface="Consolas"/>
-              </a:rPr>
-              <a:t>            contribute</a:t>
-            </a:r>
-            <a:r>
-              <a:rPr lang="en-US" sz="1400" dirty="0">
+              <a:rPr lang="en-US" sz="1500" dirty="0" smtClean="0">
+                <a:latin typeface="Consolas"/>
+                <a:cs typeface="Consolas"/>
+              </a:rPr>
+              <a:t>        </a:t>
+            </a:r>
+            <a:r>
+              <a:rPr lang="en-US" sz="1500" dirty="0" smtClean="0">
+                <a:latin typeface="Consolas"/>
+                <a:cs typeface="Consolas"/>
+              </a:rPr>
+              <a:t>contribute</a:t>
+            </a:r>
+            <a:r>
+              <a:rPr lang="en-US" sz="1500" dirty="0">
                 <a:latin typeface="Consolas"/>
                 <a:cs typeface="Consolas"/>
               </a:rPr>
               <a:t>(CkCallback(CkReductionTarget(Main, checkIn), mainProxy)</a:t>
             </a:r>
             <a:r>
-              <a:rPr lang="en-US" sz="1400" dirty="0" smtClean="0">
+              <a:rPr lang="en-US" sz="1500" dirty="0" smtClean="0">
                 <a:latin typeface="Consolas"/>
                 <a:cs typeface="Consolas"/>
               </a:rPr>
@@ -23150,35 +23349,78 @@
               <a:buNone/>
             </a:pPr>
             <a:r>
-              <a:rPr lang="en-US" sz="1400" dirty="0" smtClean="0">
-                <a:latin typeface="Consolas"/>
-                <a:cs typeface="Consolas"/>
-              </a:rPr>
-              <a:t>         }</a:t>
-            </a:r>
+              <a:rPr lang="en-US" sz="1500" dirty="0" smtClean="0">
+                <a:latin typeface="Consolas"/>
+                <a:cs typeface="Consolas"/>
+              </a:rPr>
+              <a:t>      </a:t>
+            </a:r>
+            <a:r>
+              <a:rPr lang="en-US" sz="1500" dirty="0" smtClean="0">
+                <a:latin typeface="Consolas"/>
+                <a:cs typeface="Consolas"/>
+              </a:rPr>
+              <a:t>}</a:t>
+            </a:r>
+            <a:endParaRPr lang="en-US" sz="1500" dirty="0" smtClean="0">
+              <a:latin typeface="Consolas"/>
+              <a:cs typeface="Consolas"/>
+            </a:endParaRPr>
           </a:p>
           <a:p>
             <a:pPr marL="0" indent="0">
               <a:buNone/>
             </a:pPr>
             <a:r>
-              <a:rPr lang="en-US" sz="1400" dirty="0" smtClean="0">
-                <a:latin typeface="Consolas"/>
-                <a:cs typeface="Consolas"/>
-              </a:rPr>
-              <a:t>      };</a:t>
-            </a:r>
+              <a:rPr lang="en-US" sz="1500" dirty="0" smtClean="0">
+                <a:latin typeface="Consolas"/>
+                <a:cs typeface="Consolas"/>
+              </a:rPr>
+              <a:t>    </a:t>
+            </a:r>
+            <a:r>
+              <a:rPr lang="en-US" sz="1500" dirty="0" smtClean="0">
+                <a:latin typeface="Consolas"/>
+                <a:cs typeface="Consolas"/>
+              </a:rPr>
+              <a:t>}</a:t>
+            </a:r>
+            <a:r>
+              <a:rPr lang="en-US" sz="1500" dirty="0">
+                <a:latin typeface="Consolas"/>
+                <a:cs typeface="Consolas"/>
+              </a:rPr>
+              <a:t>;</a:t>
+            </a:r>
+            <a:endParaRPr lang="en-US" sz="1500" dirty="0" smtClean="0">
+              <a:latin typeface="Consolas"/>
+              <a:cs typeface="Consolas"/>
+            </a:endParaRPr>
           </a:p>
           <a:p>
             <a:pPr marL="0" indent="0">
               <a:buNone/>
             </a:pPr>
             <a:r>
-              <a:rPr lang="en-US" sz="1400" dirty="0" smtClean="0">
-                <a:latin typeface="Consolas"/>
-                <a:cs typeface="Consolas"/>
-              </a:rPr>
-              <a:t>   };</a:t>
+              <a:rPr lang="en-US" sz="1500" dirty="0" smtClean="0">
+                <a:latin typeface="Consolas"/>
+                <a:cs typeface="Consolas"/>
+              </a:rPr>
+              <a:t>  </a:t>
+            </a:r>
+            <a:r>
+              <a:rPr lang="en-US" sz="1500" dirty="0" smtClean="0">
+                <a:latin typeface="Consolas"/>
+                <a:cs typeface="Consolas"/>
+              </a:rPr>
+              <a:t>}</a:t>
+            </a:r>
+            <a:r>
+              <a:rPr lang="en-US" sz="1500" dirty="0" smtClean="0">
+                <a:latin typeface="Consolas"/>
+                <a:cs typeface="Consolas"/>
+              </a:rPr>
+              <a:t>;</a:t>
             </a:r>
           </a:p>
           <a:p>
@@ -23186,13 +23428,13 @@
               <a:buNone/>
             </a:pPr>
             <a:r>
-              <a:rPr lang="en-US" sz="1400" dirty="0" smtClean="0">
+              <a:rPr lang="en-US" sz="1500" dirty="0" smtClean="0">
                 <a:latin typeface="Consolas"/>
                 <a:cs typeface="Consolas"/>
               </a:rPr>
               <a:t>};</a:t>
             </a:r>
-            <a:endParaRPr lang="en-US" sz="1400" dirty="0">
+            <a:endParaRPr lang="en-US" sz="1500" dirty="0">
               <a:latin typeface="Consolas"/>
               <a:cs typeface="Consolas"/>
             </a:endParaRPr>
@@ -23565,11 +23807,25 @@
               <a:t>#include </a:t>
             </a:r>
             <a:r>
+              <a:rPr lang="en-US" sz="1400" dirty="0" smtClean="0">
+                <a:latin typeface="Consolas"/>
+                <a:cs typeface="Consolas"/>
+              </a:rPr>
+              <a:t>“</a:t>
+            </a:r>
+            <a:r>
+              <a:rPr lang="en-US" sz="1400" dirty="0" err="1" smtClean="0">
+                <a:latin typeface="Consolas"/>
+                <a:cs typeface="Consolas"/>
+              </a:rPr>
+              <a:t>prefix.decl.h</a:t>
+            </a:r>
+            <a:r>
               <a:rPr lang="en-US" sz="1400" dirty="0">
                 <a:latin typeface="Consolas"/>
                 <a:cs typeface="Consolas"/>
               </a:rPr>
-              <a:t>”prefix.decl.h” </a:t>
+              <a:t>” </a:t>
             </a:r>
             <a:endParaRPr lang="en-US" sz="1400" dirty="0" smtClean="0">
               <a:latin typeface="Consolas"/>
@@ -23831,7 +24087,28 @@
                 <a:latin typeface="Consolas"/>
                 <a:cs typeface="Consolas"/>
               </a:rPr>
-              <a:t>(msg&gt;argc &gt; 1) </a:t>
+              <a:t>(</a:t>
+            </a:r>
+            <a:r>
+              <a:rPr lang="en-US" sz="1400" dirty="0" err="1" smtClean="0">
+                <a:latin typeface="Consolas"/>
+                <a:cs typeface="Consolas"/>
+              </a:rPr>
+              <a:t>msg</a:t>
+            </a:r>
+            <a:r>
+              <a:rPr lang="en-US" sz="1400" dirty="0" smtClean="0">
+                <a:latin typeface="Consolas"/>
+                <a:cs typeface="Consolas"/>
+              </a:rPr>
+              <a:t>-&gt;</a:t>
+            </a:r>
+            <a:r>
+              <a:rPr lang="en-US" sz="1400" dirty="0">
+                <a:latin typeface="Consolas"/>
+                <a:cs typeface="Consolas"/>
+              </a:rPr>
+              <a:t>argc &gt; 1) </a:t>
             </a:r>
           </a:p>
           <a:p>
@@ -23850,7 +24127,28 @@
                 <a:latin typeface="Consolas"/>
                 <a:cs typeface="Consolas"/>
               </a:rPr>
-              <a:t>= atoi(msg&gt;argv[1]);</a:t>
+              <a:t>= atoi(</a:t>
+            </a:r>
+            <a:r>
+              <a:rPr lang="en-US" sz="1400" dirty="0" err="1" smtClean="0">
+                <a:latin typeface="Consolas"/>
+                <a:cs typeface="Consolas"/>
+              </a:rPr>
+              <a:t>msg</a:t>
+            </a:r>
+            <a:r>
+              <a:rPr lang="en-US" sz="1400" dirty="0" smtClean="0">
+                <a:latin typeface="Consolas"/>
+                <a:cs typeface="Consolas"/>
+              </a:rPr>
+              <a:t>-&gt;</a:t>
+            </a:r>
+            <a:r>
+              <a:rPr lang="en-US" sz="1400" dirty="0">
+                <a:latin typeface="Consolas"/>
+                <a:cs typeface="Consolas"/>
+              </a:rPr>
+              <a:t>argv[1]);</a:t>
             </a:r>
             <a:br>
               <a:rPr lang="en-US" sz="1400" dirty="0">
@@ -24666,7 +24964,14 @@
                 <a:latin typeface="Consolas"/>
                 <a:cs typeface="Consolas"/>
               </a:rPr>
-              <a:t>(thisIndex);</a:t>
+              <a:t>(thisIndex)</a:t>
+            </a:r>
+            <a:r>
+              <a:rPr lang="en-US" sz="1600" dirty="0" smtClean="0">
+                <a:latin typeface="Consolas"/>
+                <a:cs typeface="Consolas"/>
+              </a:rPr>
+              <a:t>;</a:t>
             </a:r>
           </a:p>
           <a:p>
@@ -24674,44 +24979,39 @@
               <a:buNone/>
             </a:pPr>
             <a:r>
+              <a:rPr lang="en-US" sz="1600" dirty="0">
+                <a:latin typeface="Consolas"/>
+                <a:cs typeface="Consolas"/>
+              </a:rPr>
+              <a:t>	</a:t>
+            </a:r>
+            <a:r>
               <a:rPr lang="en-US" sz="1600" dirty="0" smtClean="0">
                 <a:latin typeface="Consolas"/>
                 <a:cs typeface="Consolas"/>
               </a:rPr>
-              <a:t>         </a:t>
-            </a:r>
-            <a:r>
-              <a:rPr lang="en-US" sz="1400" dirty="0" smtClean="0">
-                <a:latin typeface="Consolas"/>
-                <a:cs typeface="Consolas"/>
-              </a:rPr>
-              <a:t>value </a:t>
-            </a:r>
-            <a:r>
-              <a:rPr lang="en-US" sz="1400" dirty="0">
-                <a:latin typeface="Consolas"/>
-                <a:cs typeface="Consolas"/>
-              </a:rPr>
-              <a:t>= rand() % 10; </a:t>
-            </a:r>
-            <a:r>
-              <a:rPr lang="en-US" sz="1400" i="1" dirty="0">
-                <a:latin typeface="Consolas"/>
-                <a:cs typeface="Consolas"/>
-              </a:rPr>
-              <a:t>// Random positive int between 0 and 9 (inclusive)</a:t>
-            </a:r>
-          </a:p>
-          <a:p>
-            <a:pPr marL="0" indent="0">
-              <a:buNone/>
-            </a:pPr>
-            <a:r>
-              <a:rPr lang="en-US" sz="1600" dirty="0" smtClean="0">
-                <a:latin typeface="Consolas"/>
-                <a:cs typeface="Consolas"/>
-              </a:rPr>
-              <a:t>      }</a:t>
+              <a:t> </a:t>
+            </a:r>
+            <a:r>
+              <a:rPr lang="en-US" sz="1600" i="1" dirty="0">
+                <a:latin typeface="Consolas"/>
+                <a:cs typeface="Consolas"/>
+              </a:rPr>
+              <a:t>// Random positive </a:t>
+            </a:r>
+            <a:r>
+              <a:rPr lang="en-US" sz="1600" i="1" dirty="0" err="1">
+                <a:latin typeface="Consolas"/>
+                <a:cs typeface="Consolas"/>
+              </a:rPr>
+              <a:t>int</a:t>
+            </a:r>
+            <a:r>
+              <a:rPr lang="en-US" sz="1600" i="1" dirty="0">
+                <a:latin typeface="Consolas"/>
+                <a:cs typeface="Consolas"/>
+              </a:rPr>
+              <a:t> between 0 and 9 (inclusive)</a:t>
             </a:r>
             <a:endParaRPr lang="en-US" sz="1600" dirty="0">
               <a:latin typeface="Consolas"/>
@@ -24727,20 +25027,31 @@
                 <a:latin typeface="Consolas"/>
                 <a:cs typeface="Consolas"/>
               </a:rPr>
-              <a:t>      Prefix</a:t>
+              <a:t>         value </a:t>
             </a:r>
             <a:r>
               <a:rPr lang="en-US" sz="1600" dirty="0">
                 <a:latin typeface="Consolas"/>
                 <a:cs typeface="Consolas"/>
               </a:rPr>
-              <a:t>(CkMigrateMessage ∗msg) { }</a:t>
-            </a:r>
+              <a:t>= rand() % 10; </a:t>
+            </a:r>
+            <a:endParaRPr lang="en-US" sz="1600" i="1" dirty="0">
+              <a:latin typeface="Consolas"/>
+              <a:cs typeface="Consolas"/>
+            </a:endParaRPr>
           </a:p>
           <a:p>
             <a:pPr marL="0" indent="0">
               <a:buNone/>
             </a:pPr>
+            <a:r>
+              <a:rPr lang="en-US" sz="1600" dirty="0" smtClean="0">
+                <a:latin typeface="Consolas"/>
+                <a:cs typeface="Consolas"/>
+              </a:rPr>
+              <a:t>      }</a:t>
+            </a:r>
             <a:endParaRPr lang="en-US" sz="1600" dirty="0">
               <a:latin typeface="Consolas"/>
               <a:cs typeface="Consolas"/>
@@ -24755,6 +25066,34 @@
                 <a:latin typeface="Consolas"/>
                 <a:cs typeface="Consolas"/>
               </a:rPr>
+              <a:t>      Prefix</a:t>
+            </a:r>
+            <a:r>
+              <a:rPr lang="en-US" sz="1600" dirty="0">
+                <a:latin typeface="Consolas"/>
+                <a:cs typeface="Consolas"/>
+              </a:rPr>
+              <a:t>(CkMigrateMessage ∗msg) { }</a:t>
+            </a:r>
+          </a:p>
+          <a:p>
+            <a:pPr marL="0" indent="0">
+              <a:buNone/>
+            </a:pPr>
+            <a:endParaRPr lang="en-US" sz="1600" dirty="0">
+              <a:latin typeface="Consolas"/>
+              <a:cs typeface="Consolas"/>
+            </a:endParaRPr>
+          </a:p>
+          <a:p>
+            <a:pPr marL="0" indent="0">
+              <a:buNone/>
+            </a:pPr>
+            <a:r>
+              <a:rPr lang="en-US" sz="1600" dirty="0" smtClean="0">
+                <a:latin typeface="Consolas"/>
+                <a:cs typeface="Consolas"/>
+              </a:rPr>
               <a:t>}</a:t>
             </a:r>
             <a:r>
@@ -24774,7 +25113,28 @@
                 <a:latin typeface="Consolas"/>
                 <a:cs typeface="Consolas"/>
               </a:rPr>
-              <a:t>#include ”prefix.def.h”</a:t>
+              <a:t>#include </a:t>
+            </a:r>
+            <a:r>
+              <a:rPr lang="en-US" sz="1600" dirty="0" smtClean="0">
+                <a:latin typeface="Consolas"/>
+                <a:cs typeface="Consolas"/>
+              </a:rPr>
+              <a:t>“</a:t>
+            </a:r>
+            <a:r>
+              <a:rPr lang="en-US" sz="1600" dirty="0" err="1" smtClean="0">
+                <a:latin typeface="Consolas"/>
+                <a:cs typeface="Consolas"/>
+              </a:rPr>
+              <a:t>prefix.def.h</a:t>
+            </a:r>
+            <a:r>
+              <a:rPr lang="en-US" sz="1600" dirty="0">
+                <a:latin typeface="Consolas"/>
+                <a:cs typeface="Consolas"/>
+              </a:rPr>
+              <a:t>”</a:t>
             </a:r>
           </a:p>
         </p:txBody>
@@ -26266,7 +26626,28 @@
                 <a:latin typeface="Consolas"/>
                 <a:cs typeface="Consolas"/>
               </a:rPr>
-              <a:t>Main(CkArgMsg∗  m);</a:t>
+              <a:t>Main(</a:t>
+            </a:r>
+            <a:r>
+              <a:rPr lang="en-US" sz="2000" dirty="0" err="1">
+                <a:latin typeface="Consolas"/>
+                <a:cs typeface="Consolas"/>
+              </a:rPr>
+              <a:t>CkArgMsg</a:t>
+            </a:r>
+            <a:r>
+              <a:rPr lang="en-US" sz="2000" dirty="0" smtClean="0">
+                <a:latin typeface="Consolas"/>
+                <a:cs typeface="Consolas"/>
+              </a:rPr>
+              <a:t>∗ </a:t>
+            </a:r>
+            <a:r>
+              <a:rPr lang="en-US" sz="2000" dirty="0">
+                <a:latin typeface="Consolas"/>
+                <a:cs typeface="Consolas"/>
+              </a:rPr>
+              <a:t>m);</a:t>
             </a:r>
           </a:p>
           <a:p>
@@ -26949,97 +27330,104 @@
               <a:t>      </a:t>
             </a:r>
             <a:r>
-              <a:rPr lang="en-US" sz="1400" b="1" dirty="0" smtClean="0">
+              <a:rPr lang="en-US" sz="1600" b="1" dirty="0" smtClean="0">
                 <a:latin typeface="Consolas"/>
                 <a:cs typeface="Consolas"/>
               </a:rPr>
               <a:t>entry </a:t>
             </a:r>
             <a:r>
-              <a:rPr lang="en-US" sz="1400" b="1" dirty="0">
+              <a:rPr lang="en-US" sz="1600" b="1" dirty="0">
                 <a:latin typeface="Consolas"/>
                 <a:cs typeface="Consolas"/>
               </a:rPr>
               <a:t>void </a:t>
             </a:r>
             <a:r>
-              <a:rPr lang="en-US" sz="1400" dirty="0">
+              <a:rPr lang="en-US" sz="1600" dirty="0">
                 <a:latin typeface="Consolas"/>
                 <a:cs typeface="Consolas"/>
               </a:rPr>
               <a:t>updateGhosts(</a:t>
             </a:r>
             <a:r>
-              <a:rPr lang="en-US" sz="1400" b="1" dirty="0">
+              <a:rPr lang="en-US" sz="1500" b="1" dirty="0">
                 <a:latin typeface="Consolas"/>
                 <a:cs typeface="Consolas"/>
               </a:rPr>
               <a:t>int </a:t>
             </a:r>
             <a:r>
-              <a:rPr lang="en-US" sz="1400" dirty="0">
+              <a:rPr lang="en-US" sz="1500" dirty="0">
                 <a:latin typeface="Consolas"/>
                 <a:cs typeface="Consolas"/>
               </a:rPr>
               <a:t>ref, </a:t>
             </a:r>
             <a:r>
-              <a:rPr lang="en-US" sz="1400" b="1" dirty="0">
+              <a:rPr lang="en-US" sz="1500" b="1" dirty="0">
                 <a:latin typeface="Consolas"/>
                 <a:cs typeface="Consolas"/>
               </a:rPr>
               <a:t>int </a:t>
             </a:r>
             <a:r>
-              <a:rPr lang="en-US" sz="1400" dirty="0">
+              <a:rPr lang="en-US" sz="1500" dirty="0">
                 <a:latin typeface="Consolas"/>
                 <a:cs typeface="Consolas"/>
               </a:rPr>
               <a:t>dir, </a:t>
             </a:r>
             <a:r>
-              <a:rPr lang="en-US" sz="1400" b="1" dirty="0">
+              <a:rPr lang="en-US" sz="1500" b="1" dirty="0">
                 <a:latin typeface="Consolas"/>
                 <a:cs typeface="Consolas"/>
               </a:rPr>
               <a:t>int </a:t>
             </a:r>
             <a:r>
-              <a:rPr lang="en-US" sz="1400" dirty="0">
+              <a:rPr lang="en-US" sz="1500" dirty="0">
                 <a:latin typeface="Consolas"/>
                 <a:cs typeface="Consolas"/>
               </a:rPr>
               <a:t>w, </a:t>
             </a:r>
             <a:r>
-              <a:rPr lang="en-US" sz="1400" b="1" dirty="0">
+              <a:rPr lang="en-US" sz="1500" b="1" dirty="0">
                 <a:latin typeface="Consolas"/>
                 <a:cs typeface="Consolas"/>
               </a:rPr>
               <a:t>int </a:t>
             </a:r>
             <a:r>
-              <a:rPr lang="en-US" sz="1400" dirty="0">
+              <a:rPr lang="en-US" sz="1500" dirty="0">
                 <a:latin typeface="Consolas"/>
                 <a:cs typeface="Consolas"/>
               </a:rPr>
               <a:t>h, </a:t>
             </a:r>
             <a:r>
-              <a:rPr lang="en-US" sz="1400" b="1" dirty="0">
+              <a:rPr lang="en-US" sz="1500" b="1" dirty="0">
                 <a:latin typeface="Consolas"/>
                 <a:cs typeface="Consolas"/>
               </a:rPr>
               <a:t>double </a:t>
             </a:r>
             <a:r>
-              <a:rPr lang="en-US" sz="1400" dirty="0">
-                <a:latin typeface="Consolas"/>
-                <a:cs typeface="Consolas"/>
-              </a:rPr>
-              <a:t>gh[w∗h]); </a:t>
-            </a:r>
-            <a:endParaRPr lang="en-US" sz="1400" dirty="0" smtClean="0">
+              <a:rPr lang="en-US" sz="1500" dirty="0">
+                <a:latin typeface="Consolas"/>
+                <a:cs typeface="Consolas"/>
+              </a:rPr>
+              <a:t>gh[w∗h]</a:t>
+            </a:r>
+            <a:r>
+              <a:rPr lang="en-US" sz="1600" dirty="0">
+                <a:latin typeface="Consolas"/>
+                <a:cs typeface="Consolas"/>
+              </a:rPr>
+              <a:t>); </a:t>
+            </a:r>
+            <a:endParaRPr lang="en-US" sz="1600" dirty="0" smtClean="0">
               <a:latin typeface="Consolas"/>
               <a:cs typeface="Consolas"/>
             </a:endParaRPr>
@@ -27588,7 +27976,21 @@
                 <a:latin typeface="Consolas"/>
                 <a:cs typeface="Consolas"/>
               </a:rPr>
-              <a:t>(wrapX(x1),y,z).updateGhosts(iter, RIGHT, bdY, bdZ, rightGhost); </a:t>
+              <a:t>(wrapX(</a:t>
+            </a:r>
+            <a:r>
+              <a:rPr lang="en-US" dirty="0" smtClean="0">
+                <a:latin typeface="Consolas"/>
+                <a:cs typeface="Consolas"/>
+              </a:rPr>
+              <a:t>x-1</a:t>
+            </a:r>
+            <a:r>
+              <a:rPr lang="en-US" dirty="0">
+                <a:latin typeface="Consolas"/>
+                <a:cs typeface="Consolas"/>
+              </a:rPr>
+              <a:t>),y,z).updateGhosts(iter, RIGHT, bdY, bdZ, rightGhost); </a:t>
             </a:r>
             <a:endParaRPr lang="en-US" dirty="0" smtClean="0">
               <a:latin typeface="Consolas"/>
@@ -27648,7 +28050,21 @@
                 <a:latin typeface="Consolas"/>
                 <a:cs typeface="Consolas"/>
               </a:rPr>
-              <a:t>(x,wrapY(y1),z).updateGhosts(iter, TOP, bdX, bdZ, topGhost); </a:t>
+              <a:t>(x,wrapY(</a:t>
+            </a:r>
+            <a:r>
+              <a:rPr lang="en-US" dirty="0" smtClean="0">
+                <a:latin typeface="Consolas"/>
+                <a:cs typeface="Consolas"/>
+              </a:rPr>
+              <a:t>y-1</a:t>
+            </a:r>
+            <a:r>
+              <a:rPr lang="en-US" dirty="0">
+                <a:latin typeface="Consolas"/>
+                <a:cs typeface="Consolas"/>
+              </a:rPr>
+              <a:t>),z).updateGhosts(iter, TOP, bdX, bdZ, topGhost); </a:t>
             </a:r>
             <a:endParaRPr lang="en-US" dirty="0" smtClean="0">
               <a:latin typeface="Consolas"/>
@@ -27708,7 +28124,21 @@
                 <a:latin typeface="Consolas"/>
                 <a:cs typeface="Consolas"/>
               </a:rPr>
-              <a:t>(x,y,wrapZ(z1)).updateGhosts(iter, BACK, bdX, bdY, backGhost); </a:t>
+              <a:t>(x,y,wrapZ(</a:t>
+            </a:r>
+            <a:r>
+              <a:rPr lang="en-US" dirty="0" smtClean="0">
+                <a:latin typeface="Consolas"/>
+                <a:cs typeface="Consolas"/>
+              </a:rPr>
+              <a:t>z-1</a:t>
+            </a:r>
+            <a:r>
+              <a:rPr lang="en-US" dirty="0">
+                <a:latin typeface="Consolas"/>
+                <a:cs typeface="Consolas"/>
+              </a:rPr>
+              <a:t>)).updateGhosts(iter, BACK, bdX, bdY, backGhost); </a:t>
             </a:r>
             <a:endParaRPr lang="en-US" dirty="0" smtClean="0">
               <a:latin typeface="Consolas"/>
@@ -28116,7 +28546,21 @@
                 <a:latin typeface="Consolas"/>
                 <a:cs typeface="Consolas"/>
               </a:rPr>
-              <a:t>), &amp;conv, CkReduction::logical and, cb); </a:t>
+              <a:t>), &amp;conv, CkReduction::</a:t>
+            </a:r>
+            <a:r>
+              <a:rPr lang="en-US" dirty="0" err="1" smtClean="0">
+                <a:latin typeface="Consolas"/>
+                <a:cs typeface="Consolas"/>
+              </a:rPr>
+              <a:t>logical_and</a:t>
+            </a:r>
+            <a:r>
+              <a:rPr lang="en-US" dirty="0">
+                <a:latin typeface="Consolas"/>
+                <a:cs typeface="Consolas"/>
+              </a:rPr>
+              <a:t>, cb); </a:t>
             </a:r>
           </a:p>
           <a:p>
@@ -29242,7 +29686,21 @@
                 <a:latin typeface="Consolas"/>
                 <a:cs typeface="Consolas"/>
               </a:rPr>
-              <a:t>(int), &amp;conv, CkReduction::logical  and, CkCallback(CkReductionTarget(Jacobi, </a:t>
+              <a:t>(int), &amp;conv, CkReduction::</a:t>
+            </a:r>
+            <a:r>
+              <a:rPr lang="en-US" sz="1050" dirty="0" err="1" smtClean="0">
+                <a:latin typeface="Consolas"/>
+                <a:cs typeface="Consolas"/>
+              </a:rPr>
+              <a:t>logical_and</a:t>
+            </a:r>
+            <a:r>
+              <a:rPr lang="en-US" sz="1050" dirty="0">
+                <a:latin typeface="Consolas"/>
+                <a:cs typeface="Consolas"/>
+              </a:rPr>
+              <a:t>, CkCallback(CkReductionTarget(Jacobi, </a:t>
             </a:r>
             <a:endParaRPr lang="en-US" sz="1050" dirty="0" smtClean="0">
               <a:latin typeface="Consolas"/>
@@ -31880,7 +32338,28 @@
                 <a:latin typeface="Consolas"/>
                 <a:cs typeface="Consolas"/>
               </a:rPr>
-              <a:t>key, CProxy Client c, </a:t>
+              <a:t>key, </a:t>
+            </a:r>
+            <a:r>
+              <a:rPr lang="en-US" sz="1700" dirty="0" err="1" smtClean="0">
+                <a:latin typeface="Consolas"/>
+                <a:cs typeface="Consolas"/>
+              </a:rPr>
+              <a:t>CProxy_Client</a:t>
+            </a:r>
+            <a:r>
+              <a:rPr lang="en-US" sz="1700" dirty="0" smtClean="0">
+                <a:latin typeface="Consolas"/>
+                <a:cs typeface="Consolas"/>
+              </a:rPr>
+              <a:t> </a:t>
+            </a:r>
+            <a:r>
+              <a:rPr lang="en-US" sz="1700" dirty="0">
+                <a:latin typeface="Consolas"/>
+                <a:cs typeface="Consolas"/>
+              </a:rPr>
+              <a:t>c, </a:t>
             </a:r>
             <a:r>
               <a:rPr lang="en-US" sz="1700" b="1" dirty="0">
@@ -32514,8 +32993,60 @@
                 <a:latin typeface="Consolas"/>
                 <a:cs typeface="Consolas"/>
               </a:rPr>
-              <a:t>isRoot_, CProxy_Fib parent_)</a:t>
-            </a:r>
+              <a:t>isRoot_, CProxy_Fib parent_</a:t>
+            </a:r>
+            <a:r>
+              <a:rPr lang="en-US" sz="1600" dirty="0" smtClean="0">
+                <a:latin typeface="Consolas"/>
+                <a:cs typeface="Consolas"/>
+              </a:rPr>
+              <a:t>)</a:t>
+            </a:r>
+          </a:p>
+          <a:p>
+            <a:pPr marL="0" indent="0">
+              <a:buNone/>
+            </a:pPr>
+            <a:r>
+              <a:rPr lang="en-US" sz="1600" dirty="0" smtClean="0">
+                <a:latin typeface="Consolas"/>
+                <a:cs typeface="Consolas"/>
+              </a:rPr>
+              <a:t>        : parent(parent_), </a:t>
+            </a:r>
+            <a:r>
+              <a:rPr lang="en-US" sz="1600" dirty="0" err="1" smtClean="0">
+                <a:latin typeface="Consolas"/>
+                <a:cs typeface="Consolas"/>
+              </a:rPr>
+              <a:t>isRoot</a:t>
+            </a:r>
+            <a:r>
+              <a:rPr lang="en-US" sz="1600" dirty="0" smtClean="0">
+                <a:latin typeface="Consolas"/>
+                <a:cs typeface="Consolas"/>
+              </a:rPr>
+              <a:t>(</a:t>
+            </a:r>
+            <a:r>
+              <a:rPr lang="en-US" sz="1600" dirty="0" err="1" smtClean="0">
+                <a:latin typeface="Consolas"/>
+                <a:cs typeface="Consolas"/>
+              </a:rPr>
+              <a:t>isRoot</a:t>
+            </a:r>
+            <a:r>
+              <a:rPr lang="en-US" sz="1600" dirty="0" smtClean="0">
+                <a:latin typeface="Consolas"/>
+                <a:cs typeface="Consolas"/>
+              </a:rPr>
+              <a:t>_), result(0), count(2) {</a:t>
+            </a:r>
+          </a:p>
+          <a:p>
+            <a:pPr marL="0" indent="0">
+              <a:buNone/>
+            </a:pPr>
             <a:endParaRPr lang="en-US" sz="1600" dirty="0">
               <a:latin typeface="Consolas"/>
               <a:cs typeface="Consolas"/>
@@ -32530,55 +33061,151 @@
                 <a:latin typeface="Consolas"/>
                 <a:cs typeface="Consolas"/>
               </a:rPr>
-              <a:t>        : </a:t>
+              <a:t>        </a:t>
+            </a:r>
+            <a:r>
+              <a:rPr lang="en-US" sz="1600" b="1" dirty="0" smtClean="0">
+                <a:latin typeface="Consolas"/>
+                <a:cs typeface="Consolas"/>
+              </a:rPr>
+              <a:t>if </a:t>
             </a:r>
             <a:r>
               <a:rPr lang="en-US" sz="1600" dirty="0">
                 <a:latin typeface="Consolas"/>
                 <a:cs typeface="Consolas"/>
               </a:rPr>
-              <a:t>parent</a:t>
-            </a:r>
-            <a:r>
-              <a:rPr lang="en-US" sz="1600">
-                <a:latin typeface="Consolas"/>
-                <a:cs typeface="Consolas"/>
-              </a:rPr>
-              <a:t>(</a:t>
-            </a:r>
-            <a:r>
-              <a:rPr lang="en-US" sz="1600" smtClean="0">
-                <a:latin typeface="Consolas"/>
-                <a:cs typeface="Consolas"/>
-              </a:rPr>
-              <a:t>parent_)</a:t>
+              <a:t>(n &lt; 2) respond(n);</a:t>
+            </a:r>
+          </a:p>
+          <a:p>
+            <a:pPr marL="0" indent="0">
+              <a:buNone/>
+            </a:pPr>
+            <a:r>
+              <a:rPr lang="en-US" sz="1600" dirty="0" smtClean="0">
+                <a:latin typeface="Consolas"/>
+                <a:cs typeface="Consolas"/>
+              </a:rPr>
+              <a:t>        </a:t>
+            </a:r>
+            <a:r>
+              <a:rPr lang="en-US" sz="1600" b="1" dirty="0" smtClean="0">
+                <a:latin typeface="Consolas"/>
+                <a:cs typeface="Consolas"/>
+              </a:rPr>
+              <a:t>else </a:t>
             </a:r>
             <a:r>
               <a:rPr lang="en-US" sz="1600" dirty="0">
                 <a:latin typeface="Consolas"/>
                 <a:cs typeface="Consolas"/>
               </a:rPr>
-              <a:t>, isRoot(</a:t>
-            </a:r>
+              <a:t>{</a:t>
+            </a:r>
+          </a:p>
+          <a:p>
+            <a:pPr marL="0" indent="0">
+              <a:buNone/>
+            </a:pPr>
             <a:r>
               <a:rPr lang="en-US" sz="1600" dirty="0" smtClean="0">
                 <a:latin typeface="Consolas"/>
                 <a:cs typeface="Consolas"/>
               </a:rPr>
-              <a:t>isRoot_)</a:t>
+              <a:t>            CProxy_Fib</a:t>
             </a:r>
             <a:r>
               <a:rPr lang="en-US" sz="1600" dirty="0">
                 <a:latin typeface="Consolas"/>
                 <a:cs typeface="Consolas"/>
               </a:rPr>
-              <a:t>, result(0), count(2) {</a:t>
-            </a:r>
+              <a:t>::ckNew(n − 1, </a:t>
+            </a:r>
+            <a:r>
+              <a:rPr lang="en-US" sz="1600" b="1" dirty="0">
+                <a:latin typeface="Consolas"/>
+                <a:cs typeface="Consolas"/>
+              </a:rPr>
+              <a:t>false</a:t>
+            </a:r>
+            <a:r>
+              <a:rPr lang="en-US" sz="1600" dirty="0">
+                <a:latin typeface="Consolas"/>
+                <a:cs typeface="Consolas"/>
+              </a:rPr>
+              <a:t>, thisProxy); </a:t>
+            </a:r>
+            <a:endParaRPr lang="en-US" sz="1600" dirty="0" smtClean="0">
+              <a:latin typeface="Consolas"/>
+              <a:cs typeface="Consolas"/>
+            </a:endParaRPr>
           </a:p>
           <a:p>
             <a:pPr marL="0" indent="0">
               <a:buNone/>
             </a:pPr>
+            <a:r>
+              <a:rPr lang="en-US" sz="1600" dirty="0">
+                <a:latin typeface="Consolas"/>
+                <a:cs typeface="Consolas"/>
+              </a:rPr>
+              <a:t> </a:t>
+            </a:r>
+            <a:r>
+              <a:rPr lang="en-US" sz="1600" dirty="0" smtClean="0">
+                <a:latin typeface="Consolas"/>
+                <a:cs typeface="Consolas"/>
+              </a:rPr>
+              <a:t>           CProxy_Fib</a:t>
+            </a:r>
+            <a:r>
+              <a:rPr lang="en-US" sz="1600" dirty="0">
+                <a:latin typeface="Consolas"/>
+                <a:cs typeface="Consolas"/>
+              </a:rPr>
+              <a:t>::ckNew(n − 2, </a:t>
+            </a:r>
+            <a:r>
+              <a:rPr lang="en-US" sz="1600" b="1" dirty="0">
+                <a:latin typeface="Consolas"/>
+                <a:cs typeface="Consolas"/>
+              </a:rPr>
+              <a:t>false</a:t>
+            </a:r>
+            <a:r>
+              <a:rPr lang="en-US" sz="1600" dirty="0">
+                <a:latin typeface="Consolas"/>
+                <a:cs typeface="Consolas"/>
+              </a:rPr>
+              <a:t>, thisProxy)</a:t>
+            </a:r>
+            <a:r>
+              <a:rPr lang="en-US" sz="1600" dirty="0" smtClean="0">
+                <a:latin typeface="Consolas"/>
+                <a:cs typeface="Consolas"/>
+              </a:rPr>
+              <a:t>;</a:t>
+            </a:r>
+          </a:p>
+          <a:p>
+            <a:pPr marL="0" indent="0">
+              <a:buNone/>
+            </a:pPr>
+            <a:r>
+              <a:rPr lang="en-US" sz="1600" dirty="0">
+                <a:latin typeface="Consolas"/>
+                <a:cs typeface="Consolas"/>
+              </a:rPr>
+              <a:t> </a:t>
+            </a:r>
+            <a:r>
+              <a:rPr lang="en-US" sz="1600" dirty="0" smtClean="0">
+                <a:latin typeface="Consolas"/>
+                <a:cs typeface="Consolas"/>
+              </a:rPr>
+              <a:t>       }</a:t>
+            </a:r>
             <a:endParaRPr lang="en-US" sz="1600" dirty="0">
               <a:latin typeface="Consolas"/>
               <a:cs typeface="Consolas"/>
@@ -32593,6 +33220,90 @@
                 <a:latin typeface="Consolas"/>
                 <a:cs typeface="Consolas"/>
               </a:rPr>
+              <a:t>    }</a:t>
+            </a:r>
+            <a:endParaRPr lang="en-US" sz="1600" dirty="0">
+              <a:latin typeface="Consolas"/>
+              <a:cs typeface="Consolas"/>
+            </a:endParaRPr>
+          </a:p>
+          <a:p>
+            <a:pPr marL="0" indent="0">
+              <a:buNone/>
+            </a:pPr>
+            <a:endParaRPr lang="en-US" sz="1600" dirty="0">
+              <a:latin typeface="Consolas"/>
+              <a:cs typeface="Consolas"/>
+            </a:endParaRPr>
+          </a:p>
+          <a:p>
+            <a:pPr marL="0" indent="0">
+              <a:buNone/>
+            </a:pPr>
+            <a:r>
+              <a:rPr lang="en-US" sz="1600" dirty="0" smtClean="0">
+                <a:latin typeface="Consolas"/>
+                <a:cs typeface="Consolas"/>
+              </a:rPr>
+              <a:t>    </a:t>
+            </a:r>
+            <a:r>
+              <a:rPr lang="en-US" sz="1600" b="1" dirty="0" smtClean="0">
+                <a:latin typeface="Consolas"/>
+                <a:cs typeface="Consolas"/>
+              </a:rPr>
+              <a:t>void </a:t>
+            </a:r>
+            <a:r>
+              <a:rPr lang="en-US" sz="1600" dirty="0">
+                <a:latin typeface="Consolas"/>
+                <a:cs typeface="Consolas"/>
+              </a:rPr>
+              <a:t>respond(</a:t>
+            </a:r>
+            <a:r>
+              <a:rPr lang="en-US" sz="1600" b="1" dirty="0">
+                <a:latin typeface="Consolas"/>
+                <a:cs typeface="Consolas"/>
+              </a:rPr>
+              <a:t>int </a:t>
+            </a:r>
+            <a:r>
+              <a:rPr lang="en-US" sz="1600" dirty="0">
+                <a:latin typeface="Consolas"/>
+                <a:cs typeface="Consolas"/>
+              </a:rPr>
+              <a:t>val) {</a:t>
+            </a:r>
+          </a:p>
+          <a:p>
+            <a:pPr marL="0" indent="0">
+              <a:buNone/>
+            </a:pPr>
+            <a:r>
+              <a:rPr lang="en-US" sz="1600" dirty="0" smtClean="0">
+                <a:latin typeface="Consolas"/>
+                <a:cs typeface="Consolas"/>
+              </a:rPr>
+              <a:t>        result </a:t>
+            </a:r>
+            <a:r>
+              <a:rPr lang="en-US" sz="1600" dirty="0">
+                <a:latin typeface="Consolas"/>
+                <a:cs typeface="Consolas"/>
+              </a:rPr>
+              <a:t>+= val;</a:t>
+            </a:r>
+          </a:p>
+          <a:p>
+            <a:pPr marL="0" indent="0">
+              <a:buNone/>
+            </a:pPr>
+            <a:r>
+              <a:rPr lang="en-US" sz="1600" dirty="0" smtClean="0">
+                <a:latin typeface="Consolas"/>
+                <a:cs typeface="Consolas"/>
+              </a:rPr>
               <a:t>        </a:t>
             </a:r>
             <a:r>
@@ -32607,7 +33318,7 @@
                 <a:latin typeface="Consolas"/>
                 <a:cs typeface="Consolas"/>
               </a:rPr>
-              <a:t>(n &lt; 2) respond(n);</a:t>
+              <a:t>(−−count == 0 || n &lt; 2) {</a:t>
             </a:r>
           </a:p>
           <a:p>
@@ -32619,21 +33330,21 @@
                 <a:latin typeface="Consolas"/>
                 <a:cs typeface="Consolas"/>
               </a:rPr>
-              <a:t>        </a:t>
+              <a:t>            </a:t>
             </a:r>
             <a:r>
               <a:rPr lang="en-US" sz="1600" b="1" dirty="0" smtClean="0">
                 <a:latin typeface="Consolas"/>
                 <a:cs typeface="Consolas"/>
               </a:rPr>
-              <a:t>else </a:t>
+              <a:t>if </a:t>
             </a:r>
             <a:r>
               <a:rPr lang="en-US" sz="1600" dirty="0">
                 <a:latin typeface="Consolas"/>
                 <a:cs typeface="Consolas"/>
               </a:rPr>
-              <a:t>{</a:t>
+              <a:t>(isRoot) {</a:t>
             </a:r>
           </a:p>
           <a:p>
@@ -32645,28 +33356,28 @@
                 <a:latin typeface="Consolas"/>
                 <a:cs typeface="Consolas"/>
               </a:rPr>
-              <a:t>            CProxy_Fib</a:t>
+              <a:t>                </a:t>
+            </a:r>
+            <a:r>
+              <a:rPr lang="en-US" sz="1600" dirty="0" err="1" smtClean="0">
+                <a:latin typeface="Consolas"/>
+                <a:cs typeface="Consolas"/>
+              </a:rPr>
+              <a:t>CkPrintf</a:t>
+            </a:r>
+            <a:r>
+              <a:rPr lang="en-US" sz="1600" dirty="0" smtClean="0">
+                <a:latin typeface="Consolas"/>
+                <a:cs typeface="Consolas"/>
+              </a:rPr>
+              <a:t>(“Fibonacci </a:t>
             </a:r>
             <a:r>
               <a:rPr lang="en-US" sz="1600" dirty="0">
                 <a:latin typeface="Consolas"/>
                 <a:cs typeface="Consolas"/>
               </a:rPr>
-              <a:t>::ckNew(n − 1, </a:t>
-            </a:r>
-            <a:r>
-              <a:rPr lang="en-US" sz="1600" b="1" dirty="0">
-                <a:latin typeface="Consolas"/>
-                <a:cs typeface="Consolas"/>
-              </a:rPr>
-              <a:t>false</a:t>
-            </a:r>
-            <a:r>
-              <a:rPr lang="en-US" sz="1600" dirty="0">
-                <a:latin typeface="Consolas"/>
-                <a:cs typeface="Consolas"/>
-              </a:rPr>
-              <a:t>, thisProxy); </a:t>
+              <a:t>number is: %d\n”, result); </a:t>
             </a:r>
             <a:endParaRPr lang="en-US" sz="1600" dirty="0" smtClean="0">
               <a:latin typeface="Consolas"/>
@@ -32689,213 +33400,47 @@
                 <a:latin typeface="Consolas"/>
                 <a:cs typeface="Consolas"/>
               </a:rPr>
-              <a:t>           CProxy_Fib</a:t>
+              <a:t>               CkExit</a:t>
             </a:r>
             <a:r>
               <a:rPr lang="en-US" sz="1600" dirty="0">
                 <a:latin typeface="Consolas"/>
                 <a:cs typeface="Consolas"/>
               </a:rPr>
-              <a:t>::ckNew(n − 2, </a:t>
+              <a:t>();</a:t>
+            </a:r>
+          </a:p>
+          <a:p>
+            <a:pPr marL="0" indent="0">
+              <a:buNone/>
+            </a:pPr>
+            <a:r>
+              <a:rPr lang="en-US" sz="1600" dirty="0" smtClean="0">
+                <a:latin typeface="Consolas"/>
+                <a:cs typeface="Consolas"/>
+              </a:rPr>
+              <a:t>            } </a:t>
             </a:r>
             <a:r>
               <a:rPr lang="en-US" sz="1600" b="1" dirty="0">
                 <a:latin typeface="Consolas"/>
                 <a:cs typeface="Consolas"/>
               </a:rPr>
-              <a:t>false</a:t>
+              <a:t>else</a:t>
             </a:r>
             <a:r>
               <a:rPr lang="en-US" sz="1600" dirty="0">
                 <a:latin typeface="Consolas"/>
                 <a:cs typeface="Consolas"/>
               </a:rPr>
-              <a:t>, thisProxy)</a:t>
+              <a:t> </a:t>
             </a:r>
             <a:r>
               <a:rPr lang="en-US" sz="1600" dirty="0" smtClean="0">
                 <a:latin typeface="Consolas"/>
                 <a:cs typeface="Consolas"/>
               </a:rPr>
-              <a:t>;</a:t>
-            </a:r>
-          </a:p>
-          <a:p>
-            <a:pPr marL="0" indent="0">
-              <a:buNone/>
-            </a:pPr>
-            <a:r>
-              <a:rPr lang="en-US" sz="1600" dirty="0">
-                <a:latin typeface="Consolas"/>
-                <a:cs typeface="Consolas"/>
-              </a:rPr>
-              <a:t> </a:t>
-            </a:r>
-            <a:r>
-              <a:rPr lang="en-US" sz="1600" dirty="0" smtClean="0">
-                <a:latin typeface="Consolas"/>
-                <a:cs typeface="Consolas"/>
-              </a:rPr>
-              <a:t>       }</a:t>
-            </a:r>
-            <a:endParaRPr lang="en-US" sz="1600" dirty="0">
-              <a:latin typeface="Consolas"/>
-              <a:cs typeface="Consolas"/>
-            </a:endParaRPr>
-          </a:p>
-          <a:p>
-            <a:pPr marL="0" indent="0">
-              <a:buNone/>
-            </a:pPr>
-            <a:r>
-              <a:rPr lang="en-US" sz="1600" dirty="0" smtClean="0">
-                <a:latin typeface="Consolas"/>
-                <a:cs typeface="Consolas"/>
-              </a:rPr>
-              <a:t>    }</a:t>
-            </a:r>
-            <a:endParaRPr lang="en-US" sz="1600" dirty="0">
-              <a:latin typeface="Consolas"/>
-              <a:cs typeface="Consolas"/>
-            </a:endParaRPr>
-          </a:p>
-          <a:p>
-            <a:pPr marL="0" indent="0">
-              <a:buNone/>
-            </a:pPr>
-            <a:endParaRPr lang="en-US" sz="1600" dirty="0">
-              <a:latin typeface="Consolas"/>
-              <a:cs typeface="Consolas"/>
-            </a:endParaRPr>
-          </a:p>
-          <a:p>
-            <a:pPr marL="0" indent="0">
-              <a:buNone/>
-            </a:pPr>
-            <a:r>
-              <a:rPr lang="en-US" sz="1600" dirty="0" smtClean="0">
-                <a:latin typeface="Consolas"/>
-                <a:cs typeface="Consolas"/>
-              </a:rPr>
-              <a:t>    </a:t>
-            </a:r>
-            <a:r>
-              <a:rPr lang="en-US" sz="1600" b="1" dirty="0" smtClean="0">
-                <a:latin typeface="Consolas"/>
-                <a:cs typeface="Consolas"/>
-              </a:rPr>
-              <a:t>void </a:t>
-            </a:r>
-            <a:r>
-              <a:rPr lang="en-US" sz="1600" dirty="0">
-                <a:latin typeface="Consolas"/>
-                <a:cs typeface="Consolas"/>
-              </a:rPr>
-              <a:t>respond(</a:t>
-            </a:r>
-            <a:r>
-              <a:rPr lang="en-US" sz="1600" b="1" dirty="0">
-                <a:latin typeface="Consolas"/>
-                <a:cs typeface="Consolas"/>
-              </a:rPr>
-              <a:t>int </a:t>
-            </a:r>
-            <a:r>
-              <a:rPr lang="en-US" sz="1600" dirty="0">
-                <a:latin typeface="Consolas"/>
-                <a:cs typeface="Consolas"/>
-              </a:rPr>
-              <a:t>val) {</a:t>
-            </a:r>
-          </a:p>
-          <a:p>
-            <a:pPr marL="0" indent="0">
-              <a:buNone/>
-            </a:pPr>
-            <a:r>
-              <a:rPr lang="en-US" sz="1600" dirty="0" smtClean="0">
-                <a:latin typeface="Consolas"/>
-                <a:cs typeface="Consolas"/>
-              </a:rPr>
-              <a:t>        result </a:t>
-            </a:r>
-            <a:r>
-              <a:rPr lang="en-US" sz="1600" dirty="0">
-                <a:latin typeface="Consolas"/>
-                <a:cs typeface="Consolas"/>
-              </a:rPr>
-              <a:t>+= val;</a:t>
-            </a:r>
-          </a:p>
-          <a:p>
-            <a:pPr marL="0" indent="0">
-              <a:buNone/>
-            </a:pPr>
-            <a:r>
-              <a:rPr lang="en-US" sz="1600" dirty="0" smtClean="0">
-                <a:latin typeface="Consolas"/>
-                <a:cs typeface="Consolas"/>
-              </a:rPr>
-              <a:t>        </a:t>
-            </a:r>
-            <a:r>
-              <a:rPr lang="en-US" sz="1600" b="1" dirty="0" smtClean="0">
-                <a:latin typeface="Consolas"/>
-                <a:cs typeface="Consolas"/>
-              </a:rPr>
-              <a:t>if </a:t>
-            </a:r>
-            <a:r>
-              <a:rPr lang="en-US" sz="1600" dirty="0">
-                <a:latin typeface="Consolas"/>
-                <a:cs typeface="Consolas"/>
-              </a:rPr>
-              <a:t>(−−count == 0 || n &lt; 2) {</a:t>
-            </a:r>
-          </a:p>
-          <a:p>
-            <a:pPr marL="0" indent="0">
-              <a:buNone/>
-            </a:pPr>
-            <a:r>
-              <a:rPr lang="en-US" sz="1600" dirty="0" smtClean="0">
-                <a:latin typeface="Consolas"/>
-                <a:cs typeface="Consolas"/>
-              </a:rPr>
-              <a:t>            </a:t>
-            </a:r>
-            <a:r>
-              <a:rPr lang="en-US" sz="1600" b="1" dirty="0" smtClean="0">
-                <a:latin typeface="Consolas"/>
-                <a:cs typeface="Consolas"/>
-              </a:rPr>
-              <a:t>if </a:t>
-            </a:r>
-            <a:r>
-              <a:rPr lang="en-US" sz="1600" dirty="0">
-                <a:latin typeface="Consolas"/>
-                <a:cs typeface="Consolas"/>
-              </a:rPr>
-              <a:t>(isRoot) {</a:t>
-            </a:r>
-          </a:p>
-          <a:p>
-            <a:pPr marL="0" indent="0">
-              <a:buNone/>
-            </a:pPr>
-            <a:r>
-              <a:rPr lang="en-US" sz="1600" dirty="0" smtClean="0">
-                <a:latin typeface="Consolas"/>
-                <a:cs typeface="Consolas"/>
-              </a:rPr>
-              <a:t>                CkPrintf</a:t>
-            </a:r>
-            <a:r>
-              <a:rPr lang="en-US" sz="1600" dirty="0">
-                <a:latin typeface="Consolas"/>
-                <a:cs typeface="Consolas"/>
-              </a:rPr>
-              <a:t>(”Fibonacci number is: %d\n”, result); </a:t>
+              <a:t>{</a:t>
             </a:r>
             <a:endParaRPr lang="en-US" sz="1600" dirty="0" smtClean="0">
               <a:latin typeface="Consolas"/>
@@ -32907,81 +33452,32 @@
               <a:buNone/>
             </a:pPr>
             <a:r>
+              <a:rPr lang="en-US" sz="1600" b="1" dirty="0">
+                <a:latin typeface="Consolas"/>
+                <a:cs typeface="Consolas"/>
+              </a:rPr>
+              <a:t> </a:t>
+            </a:r>
+            <a:r>
+              <a:rPr lang="en-US" sz="1600" b="1" dirty="0" smtClean="0">
+                <a:latin typeface="Consolas"/>
+                <a:cs typeface="Consolas"/>
+              </a:rPr>
+              <a:t>               </a:t>
+            </a:r>
+            <a:r>
+              <a:rPr lang="en-US" sz="1600" dirty="0" err="1" smtClean="0">
+                <a:latin typeface="Consolas"/>
+                <a:cs typeface="Consolas"/>
+              </a:rPr>
+              <a:t>parent.respond</a:t>
+            </a:r>
+            <a:r>
               <a:rPr lang="en-US" sz="1600" dirty="0">
                 <a:latin typeface="Consolas"/>
                 <a:cs typeface="Consolas"/>
               </a:rPr>
-              <a:t> </a:t>
-            </a:r>
-            <a:r>
-              <a:rPr lang="en-US" sz="1600" dirty="0" smtClean="0">
-                <a:latin typeface="Consolas"/>
-                <a:cs typeface="Consolas"/>
-              </a:rPr>
-              <a:t>               CkExit</a:t>
-            </a:r>
-            <a:r>
-              <a:rPr lang="en-US" sz="1600" dirty="0">
-                <a:latin typeface="Consolas"/>
-                <a:cs typeface="Consolas"/>
-              </a:rPr>
-              <a:t>();</a:t>
-            </a:r>
-          </a:p>
-          <a:p>
-            <a:pPr marL="0" indent="0">
-              <a:buNone/>
-            </a:pPr>
-            <a:r>
-              <a:rPr lang="en-US" sz="1600" dirty="0" smtClean="0">
-                <a:latin typeface="Consolas"/>
-                <a:cs typeface="Consolas"/>
-              </a:rPr>
-              <a:t>            } </a:t>
-            </a:r>
-            <a:r>
-              <a:rPr lang="en-US" sz="1600" b="1" dirty="0">
-                <a:latin typeface="Consolas"/>
-                <a:cs typeface="Consolas"/>
-              </a:rPr>
-              <a:t>else </a:t>
-            </a:r>
-            <a:endParaRPr lang="en-US" sz="1600" b="1" dirty="0" smtClean="0">
-              <a:latin typeface="Consolas"/>
-              <a:cs typeface="Consolas"/>
-            </a:endParaRPr>
-          </a:p>
-          <a:p>
-            <a:pPr marL="0" indent="0">
-              <a:buNone/>
-            </a:pPr>
-            <a:r>
-              <a:rPr lang="en-US" sz="1600" b="1" dirty="0">
-                <a:latin typeface="Consolas"/>
-                <a:cs typeface="Consolas"/>
-              </a:rPr>
-              <a:t> </a:t>
-            </a:r>
-            <a:r>
-              <a:rPr lang="en-US" sz="1600" b="1" dirty="0" smtClean="0">
-                <a:latin typeface="Consolas"/>
-                <a:cs typeface="Consolas"/>
-              </a:rPr>
-              <a:t>               </a:t>
-            </a:r>
-            <a:r>
-              <a:rPr lang="en-US" sz="1600" dirty="0" smtClean="0">
-                <a:latin typeface="Consolas"/>
-                <a:cs typeface="Consolas"/>
-              </a:rPr>
-              <a:t>{ </a:t>
-            </a:r>
-            <a:r>
-              <a:rPr lang="en-US" sz="1600" dirty="0">
-                <a:latin typeface="Consolas"/>
-                <a:cs typeface="Consolas"/>
-              </a:rPr>
-              <a:t>parent.respond(result); </a:t>
+              <a:t>(result); </a:t>
             </a:r>
             <a:endParaRPr lang="en-US" sz="1600" dirty="0" smtClean="0">
               <a:latin typeface="Consolas"/>
@@ -33641,39 +34137,39 @@
               <a:t> </a:t>
             </a:r>
             <a:r>
-              <a:rPr lang="en-US" sz="2000" spc="-15" dirty="0">
-                <a:latin typeface="Times New Roman"/>
-                <a:cs typeface="Times New Roman"/>
-              </a:rPr>
-              <a:t>calling  </a:t>
-            </a:r>
-            <a:r>
-              <a:rPr lang="en-US" sz="2000" spc="-114" dirty="0">
-                <a:latin typeface="Times New Roman"/>
-                <a:cs typeface="Times New Roman"/>
-              </a:rPr>
-              <a:t> </a:t>
-            </a:r>
-            <a:r>
-              <a:rPr lang="en-US" sz="2000" i="1" spc="-80" dirty="0">
-                <a:latin typeface="Courier"/>
-                <a:cs typeface="Courier"/>
+              <a:rPr lang="en-US" sz="2000" spc="-15" dirty="0" smtClean="0">
+                <a:latin typeface="Times New Roman"/>
+                <a:cs typeface="Times New Roman"/>
+              </a:rPr>
+              <a:t>calling</a:t>
+            </a:r>
+            <a:r>
+              <a:rPr lang="en-US" sz="2000" spc="-114" dirty="0" smtClean="0">
+                <a:latin typeface="Times New Roman"/>
+                <a:cs typeface="Times New Roman"/>
+              </a:rPr>
+              <a:t> </a:t>
+            </a:r>
+            <a:r>
+              <a:rPr lang="en-US" sz="2000" spc="-80" dirty="0" smtClean="0">
+                <a:latin typeface="Lucida Console"/>
+                <a:cs typeface="Lucida Console"/>
               </a:rPr>
               <a:t>respond</a:t>
             </a:r>
             <a:r>
-              <a:rPr lang="en-US" sz="2000" spc="-305" dirty="0">
-                <a:latin typeface="Courier"/>
-                <a:cs typeface="Courier"/>
-              </a:rPr>
-              <a:t> </a:t>
+              <a:rPr lang="en-US" sz="2000" spc="20" dirty="0" smtClean="0">
+                <a:latin typeface="Times New Roman"/>
+                <a:cs typeface="Times New Roman"/>
+              </a:rPr>
+              <a:t>)</a:t>
             </a:r>
             <a:r>
               <a:rPr lang="en-US" sz="2000" spc="20" dirty="0">
                 <a:latin typeface="Times New Roman"/>
                 <a:cs typeface="Times New Roman"/>
               </a:rPr>
-              <a:t>):</a:t>
+              <a:t>:</a:t>
             </a:r>
             <a:endParaRPr lang="en-US" sz="2000" dirty="0">
               <a:latin typeface="Times New Roman"/>
@@ -33905,21 +34401,21 @@
               <a:t> </a:t>
             </a:r>
             <a:r>
-              <a:rPr lang="en-US" sz="2000" dirty="0">
-                <a:latin typeface="Times New Roman"/>
-                <a:cs typeface="Times New Roman"/>
-              </a:rPr>
-              <a:t>our</a:t>
-            </a:r>
-            <a:r>
-              <a:rPr lang="en-US" sz="2000" spc="25" dirty="0">
+              <a:rPr lang="en-US" sz="2000" dirty="0" smtClean="0">
+                <a:latin typeface="Times New Roman"/>
+                <a:cs typeface="Times New Roman"/>
+              </a:rPr>
+              <a:t>our example</a:t>
+            </a:r>
+            <a:r>
+              <a:rPr lang="en-US" sz="2000" spc="25" dirty="0" smtClean="0">
                 <a:latin typeface="Times New Roman"/>
                 <a:cs typeface="Times New Roman"/>
               </a:rPr>
               <a:t>,</a:t>
             </a:r>
             <a:r>
-              <a:rPr lang="en-US" sz="2000" spc="80" dirty="0">
+              <a:rPr lang="en-US" sz="2000" spc="80" dirty="0" smtClean="0">
                 <a:latin typeface="Times New Roman"/>
                 <a:cs typeface="Times New Roman"/>
               </a:rPr>
@@ -36428,6 +36924,17 @@
               </a:rPr>
               <a:t>serial</a:t>
             </a:r>
+            <a:r>
+              <a:rPr lang="en-US" spc="10" dirty="0" smtClean="0">
+                <a:latin typeface="Consolas"/>
+                <a:cs typeface="Consolas"/>
+              </a:rPr>
+              <a:t> {</a:t>
+            </a:r>
+            <a:endParaRPr lang="en-US" spc="10" dirty="0" smtClean="0">
+              <a:latin typeface="Consolas"/>
+              <a:cs typeface="Consolas"/>
+            </a:endParaRPr>
           </a:p>
           <a:p>
             <a:pPr marL="0" indent="0">
@@ -36451,18 +36958,18 @@
               <a:t>       </a:t>
             </a:r>
             <a:r>
-              <a:rPr lang="en-US" spc="10" dirty="0" smtClean="0">
-                <a:latin typeface="Consolas"/>
-                <a:cs typeface="Consolas"/>
-              </a:rPr>
-              <a:t>{ </a:t>
+              <a:rPr lang="en-US" spc="10" dirty="0" err="1" smtClean="0">
+                <a:latin typeface="Consolas"/>
+                <a:cs typeface="Consolas"/>
+              </a:rPr>
+              <a:t>thisProxy.invokeMethod</a:t>
             </a:r>
             <a:r>
               <a:rPr lang="en-US" spc="10" dirty="0">
                 <a:latin typeface="Consolas"/>
                 <a:cs typeface="Consolas"/>
               </a:rPr>
-              <a:t>thisProxy.invokeMethod(10); </a:t>
+              <a:t>(10); </a:t>
             </a:r>
             <a:r>
               <a:rPr lang="en-US" spc="10" dirty="0" smtClean="0">
@@ -36771,11 +37278,25 @@
               <a:t>    serial </a:t>
             </a:r>
             <a:r>
+              <a:rPr lang="en-US" sz="1500" spc="10" dirty="0" smtClean="0">
+                <a:latin typeface="Consolas"/>
+                <a:cs typeface="Consolas"/>
+              </a:rPr>
+              <a:t>“</a:t>
+            </a:r>
+            <a:r>
+              <a:rPr lang="en-US" sz="1500" spc="10" dirty="0" err="1" smtClean="0">
+                <a:latin typeface="Consolas"/>
+                <a:cs typeface="Consolas"/>
+              </a:rPr>
+              <a:t>setValue</a:t>
+            </a:r>
+            <a:r>
               <a:rPr lang="en-US" sz="1500" spc="10" dirty="0">
                 <a:latin typeface="Consolas"/>
                 <a:cs typeface="Consolas"/>
               </a:rPr>
-              <a:t>”setValue” {</a:t>
+              <a:t>” {</a:t>
             </a:r>
           </a:p>
           <a:p>
@@ -39231,7 +39752,21 @@
                 <a:latin typeface="Courier"/>
                 <a:cs typeface="Courier"/>
               </a:rPr>
-              <a:t> myMethod2 </a:t>
+              <a:t> </a:t>
+            </a:r>
+            <a:r>
+              <a:rPr lang="en-US" dirty="0" smtClean="0">
+                <a:latin typeface="Lucida Console"/>
+                <a:cs typeface="Lucida Console"/>
+              </a:rPr>
+              <a:t>myMethod2</a:t>
+            </a:r>
+            <a:r>
+              <a:rPr lang="en-US" i="1" dirty="0" smtClean="0">
+                <a:latin typeface="Courier"/>
+                <a:cs typeface="Courier"/>
+              </a:rPr>
+              <a:t> </a:t>
             </a:r>
             <a:r>
               <a:rPr lang="en-US" dirty="0" smtClean="0">

</xml_diff>

<commit_message>
tut 7: reduce size on sdag slide
</commit_message>
<xml_diff>
--- a/tutorial-07-sdag.pptx
+++ b/tutorial-07-sdag.pptx
@@ -23,7 +23,7 @@
     <p:sldId id="265" r:id="rId11"/>
     <p:sldId id="266" r:id="rId12"/>
     <p:sldId id="267" r:id="rId13"/>
-    <p:sldId id="268" r:id="rId14"/>
+    <p:sldId id="346" r:id="rId14"/>
     <p:sldId id="269" r:id="rId15"/>
     <p:sldId id="273" r:id="rId16"/>
     <p:sldId id="270" r:id="rId17"/>
@@ -234,7 +234,7 @@
           <a:p>
             <a:fld id="{775CE290-E0F5-444C-B849-A8F17CD4104C}" type="datetimeFigureOut">
               <a:rPr lang="en-US" smtClean="0"/>
-              <a:t>9/12/14</a:t>
+              <a:t>11/16/14</a:t>
             </a:fld>
             <a:endParaRPr lang="en-US" dirty="0"/>
           </a:p>
@@ -400,7 +400,7 @@
           <a:p>
             <a:fld id="{AD53A24C-4135-094C-957B-35852E7EDFA4}" type="datetimeFigureOut">
               <a:rPr lang="en-US" smtClean="0"/>
-              <a:t>9/12/14</a:t>
+              <a:t>11/16/14</a:t>
             </a:fld>
             <a:endParaRPr lang="en-US" dirty="0"/>
           </a:p>
@@ -861,7 +861,7 @@
           <a:p>
             <a:fld id="{55371D55-B102-DE43-A54B-569022836A44}" type="datetime2">
               <a:rPr lang="en-US" smtClean="0"/>
-              <a:t>Friday, September 12, 14</a:t>
+              <a:t>Sunday, November 16, 14</a:t>
             </a:fld>
             <a:endParaRPr lang="en-US" dirty="0"/>
           </a:p>
@@ -1164,7 +1164,7 @@
                 <a:latin typeface="Times New Roman"/>
                 <a:cs typeface="Times New Roman"/>
               </a:rPr>
-              <a:t>September 12, 2014</a:t>
+              <a:t>November 16, 2014</a:t>
             </a:fld>
             <a:endParaRPr lang="en-US" dirty="0">
               <a:latin typeface="Times New Roman"/>
@@ -1438,7 +1438,7 @@
                 <a:latin typeface="Times New Roman"/>
                 <a:cs typeface="Times New Roman"/>
               </a:rPr>
-              <a:t>September 12, 2014</a:t>
+              <a:t>November 16, 2014</a:t>
             </a:fld>
             <a:endParaRPr lang="en-US" dirty="0">
               <a:latin typeface="Times New Roman"/>
@@ -1673,7 +1673,7 @@
           <a:p>
             <a:fld id="{10430136-2C40-3C47-B811-72E243CC5A32}" type="datetime2">
               <a:rPr lang="en-US" smtClean="0"/>
-              <a:t>Friday, September 12, 14</a:t>
+              <a:t>Sunday, November 16, 14</a:t>
             </a:fld>
             <a:endParaRPr lang="en-US" dirty="0"/>
           </a:p>
@@ -1984,7 +1984,7 @@
           <a:p>
             <a:fld id="{BF7456C3-D853-A84D-99C4-10F33E5473D0}" type="datetime2">
               <a:rPr lang="en-US" smtClean="0"/>
-              <a:t>Friday, September 12, 14</a:t>
+              <a:t>Sunday, November 16, 14</a:t>
             </a:fld>
             <a:endParaRPr lang="en-US" dirty="0"/>
           </a:p>
@@ -2155,7 +2155,7 @@
           <a:p>
             <a:fld id="{DD7C3122-9C2A-FB40-86AE-72327076B58E}" type="datetime2">
               <a:rPr lang="en-US" smtClean="0"/>
-              <a:t>Friday, September 12, 14</a:t>
+              <a:t>Sunday, November 16, 14</a:t>
             </a:fld>
             <a:endParaRPr lang="en-US" dirty="0"/>
           </a:p>
@@ -2336,7 +2336,7 @@
           <a:p>
             <a:fld id="{85AA442A-D6AD-C842-BAA5-2EF7034136A9}" type="datetime2">
               <a:rPr lang="en-US" smtClean="0"/>
-              <a:t>Friday, September 12, 14</a:t>
+              <a:t>Sunday, November 16, 14</a:t>
             </a:fld>
             <a:endParaRPr lang="en-US" dirty="0"/>
           </a:p>
@@ -2590,7 +2590,7 @@
           <a:p>
             <a:fld id="{428FCBCD-D1C2-C64D-96BC-B4670C1BFEA8}" type="datetime2">
               <a:rPr lang="en-US" smtClean="0"/>
-              <a:t>Friday, September 12, 14</a:t>
+              <a:t>Sunday, November 16, 14</a:t>
             </a:fld>
             <a:endParaRPr lang="en-US" dirty="0"/>
           </a:p>
@@ -2893,7 +2893,7 @@
                 <a:latin typeface="Times New Roman"/>
                 <a:cs typeface="Times New Roman"/>
               </a:rPr>
-              <a:t>September 12, 2014</a:t>
+              <a:t>November 16, 2014</a:t>
             </a:fld>
             <a:endParaRPr lang="en-US" dirty="0">
               <a:latin typeface="Times New Roman"/>
@@ -3019,7 +3019,7 @@
           <a:p>
             <a:fld id="{E7E53064-9CE0-8542-8A75-4FE813A4312E}" type="datetime2">
               <a:rPr lang="en-US" smtClean="0"/>
-              <a:t>Friday, September 12, 14</a:t>
+              <a:t>Sunday, November 16, 14</a:t>
             </a:fld>
             <a:endParaRPr lang="en-US" dirty="0"/>
           </a:p>
@@ -3548,7 +3548,7 @@
           <a:p>
             <a:fld id="{7FC05179-7E64-2B45-BB3C-87F76F47DC06}" type="datetime2">
               <a:rPr lang="en-US" smtClean="0"/>
-              <a:t>Friday, September 12, 14</a:t>
+              <a:t>Sunday, November 16, 14</a:t>
             </a:fld>
             <a:endParaRPr lang="en-US" dirty="0"/>
           </a:p>
@@ -3844,7 +3844,7 @@
           <a:p>
             <a:fld id="{7DCAEC3A-7170-B046-8957-19A47F740798}" type="datetime2">
               <a:rPr lang="en-US" smtClean="0"/>
-              <a:t>Friday, September 12, 14</a:t>
+              <a:t>Sunday, November 16, 14</a:t>
             </a:fld>
             <a:endParaRPr lang="en-US" dirty="0"/>
           </a:p>
@@ -3963,7 +3963,7 @@
           <a:p>
             <a:fld id="{2D11693D-B560-4945-9798-6BDB552E1C57}" type="datetime2">
               <a:rPr lang="en-US" smtClean="0"/>
-              <a:t>Friday, September 12, 14</a:t>
+              <a:t>Sunday, November 16, 14</a:t>
             </a:fld>
             <a:endParaRPr lang="en-US" dirty="0"/>
           </a:p>
@@ -4450,7 +4450,7 @@
           <a:p>
             <a:fld id="{1D19CF00-7836-3147-BC13-E9798AB10E75}" type="datetime2">
               <a:rPr lang="en-US" smtClean="0"/>
-              <a:t>Friday, September 12, 14</a:t>
+              <a:t>Sunday, November 16, 14</a:t>
             </a:fld>
             <a:endParaRPr lang="en-US" dirty="0"/>
           </a:p>
@@ -4781,7 +4781,7 @@
           <a:p>
             <a:fld id="{20DBB18D-80F3-D648-8DF5-EC481608E7BE}" type="datetime2">
               <a:rPr lang="en-US" smtClean="0"/>
-              <a:t>Friday, September 12, 14</a:t>
+              <a:t>Sunday, November 16, 14</a:t>
             </a:fld>
             <a:endParaRPr lang="en-US" dirty="0"/>
           </a:p>
@@ -5260,7 +5260,7 @@
           <a:p>
             <a:fld id="{F7B17654-A74F-D448-A2F8-D4B258E0F087}" type="datetime2">
               <a:rPr lang="en-US" smtClean="0"/>
-              <a:t>Friday, September 12, 14</a:t>
+              <a:t>Sunday, November 16, 14</a:t>
             </a:fld>
             <a:endParaRPr lang="en-US" dirty="0"/>
           </a:p>
@@ -5556,7 +5556,7 @@
           <a:p>
             <a:fld id="{E95229B4-E8E0-9943-8351-031BF89671CD}" type="datetime2">
               <a:rPr lang="en-US" smtClean="0"/>
-              <a:t>Friday, September 12, 14</a:t>
+              <a:t>Sunday, November 16, 14</a:t>
             </a:fld>
             <a:endParaRPr lang="en-US" dirty="0"/>
           </a:p>
@@ -5799,7 +5799,7 @@
           <a:p>
             <a:fld id="{1D94E620-01DA-264A-8743-A30FCBA1DE9C}" type="datetime2">
               <a:rPr lang="en-US" smtClean="0"/>
-              <a:t>Friday, September 12, 14</a:t>
+              <a:t>Sunday, November 16, 14</a:t>
             </a:fld>
             <a:endParaRPr lang="en-US" dirty="0"/>
           </a:p>
@@ -5895,7 +5895,7 @@
           <a:p>
             <a:fld id="{44719A06-2B2C-2B47-B929-5D8F0754A828}" type="datetime2">
               <a:rPr lang="en-US" smtClean="0"/>
-              <a:t>Friday, September 12, 14</a:t>
+              <a:t>Sunday, November 16, 14</a:t>
             </a:fld>
             <a:endParaRPr lang="en-US" dirty="0"/>
           </a:p>
@@ -6210,7 +6210,7 @@
           <a:p>
             <a:fld id="{BA714DC8-9929-464D-B61C-AD4338E76A58}" type="datetime2">
               <a:rPr lang="en-US" smtClean="0"/>
-              <a:t>Friday, September 12, 14</a:t>
+              <a:t>Sunday, November 16, 14</a:t>
             </a:fld>
             <a:endParaRPr lang="en-US" dirty="0"/>
           </a:p>
@@ -10222,8 +10222,8 @@
           </a:ln>
         </p:spPr>
         <p:txBody>
-          <a:bodyPr>
-            <a:normAutofit fontScale="47500" lnSpcReduction="20000"/>
+          <a:bodyPr anchor="t">
+            <a:noAutofit/>
           </a:bodyPr>
           <a:lstStyle/>
           <a:p>
@@ -10231,28 +10231,28 @@
               <a:buNone/>
             </a:pPr>
             <a:r>
-              <a:rPr lang="en-US" b="1" dirty="0">
+              <a:rPr lang="en-US" sz="1400" b="1" dirty="0">
                 <a:latin typeface="Consolas"/>
                 <a:cs typeface="Consolas"/>
               </a:rPr>
               <a:t>#include </a:t>
             </a:r>
             <a:r>
-              <a:rPr lang="en-US" dirty="0" smtClean="0">
+              <a:rPr lang="en-US" sz="1400" dirty="0" smtClean="0">
                 <a:latin typeface="Consolas"/>
                 <a:cs typeface="Consolas"/>
               </a:rPr>
               <a:t>“</a:t>
             </a:r>
             <a:r>
-              <a:rPr lang="en-US" dirty="0" err="1" smtClean="0">
+              <a:rPr lang="en-US" sz="1400" dirty="0" err="1" smtClean="0">
                 <a:latin typeface="Consolas"/>
                 <a:cs typeface="Consolas"/>
               </a:rPr>
               <a:t>fib.decl.h</a:t>
             </a:r>
             <a:r>
-              <a:rPr lang="en-US" dirty="0">
+              <a:rPr lang="en-US" sz="1400" dirty="0">
                 <a:latin typeface="Consolas"/>
                 <a:cs typeface="Consolas"/>
               </a:rPr>
@@ -10264,25 +10264,27 @@
               <a:buNone/>
             </a:pPr>
             <a:r>
-              <a:rPr lang="en-US" b="1" dirty="0">
+              <a:rPr lang="en-US" sz="1400" b="1" dirty="0">
                 <a:latin typeface="Consolas"/>
                 <a:cs typeface="Consolas"/>
               </a:rPr>
               <a:t>#define </a:t>
             </a:r>
             <a:r>
-              <a:rPr lang="en-US" dirty="0">
-                <a:latin typeface="Consolas"/>
-                <a:cs typeface="Consolas"/>
-              </a:rPr>
-              <a:t>THRESHOLD 10</a:t>
-            </a:r>
-          </a:p>
-          <a:p>
-            <a:pPr marL="0" indent="0">
-              <a:buNone/>
-            </a:pPr>
-            <a:endParaRPr lang="en-US" dirty="0">
+              <a:rPr lang="en-US" sz="1400" dirty="0">
+                <a:latin typeface="Consolas"/>
+                <a:cs typeface="Consolas"/>
+              </a:rPr>
+              <a:t>THRESHOLD </a:t>
+            </a:r>
+            <a:r>
+              <a:rPr lang="en-US" sz="1400" dirty="0" smtClean="0">
+                <a:latin typeface="Consolas"/>
+                <a:cs typeface="Consolas"/>
+              </a:rPr>
+              <a:t>10</a:t>
+            </a:r>
+            <a:endParaRPr lang="en-US" sz="1400" dirty="0">
               <a:latin typeface="Consolas"/>
               <a:cs typeface="Consolas"/>
             </a:endParaRPr>
@@ -10292,35 +10294,35 @@
               <a:buNone/>
             </a:pPr>
             <a:r>
-              <a:rPr lang="en-US" b="1" dirty="0">
+              <a:rPr lang="en-US" sz="1400" b="1" dirty="0">
                 <a:latin typeface="Consolas"/>
                 <a:cs typeface="Consolas"/>
               </a:rPr>
               <a:t>class </a:t>
             </a:r>
             <a:r>
-              <a:rPr lang="en-US" dirty="0">
+              <a:rPr lang="en-US" sz="1400" dirty="0">
                 <a:latin typeface="Consolas"/>
                 <a:cs typeface="Consolas"/>
               </a:rPr>
               <a:t>Main : </a:t>
             </a:r>
             <a:r>
-              <a:rPr lang="en-US" b="1" dirty="0">
+              <a:rPr lang="en-US" sz="1400" b="1" dirty="0">
                 <a:latin typeface="Consolas"/>
                 <a:cs typeface="Consolas"/>
               </a:rPr>
               <a:t>public </a:t>
             </a:r>
             <a:r>
-              <a:rPr lang="en-US" dirty="0" smtClean="0">
+              <a:rPr lang="en-US" sz="1400" dirty="0" smtClean="0">
                 <a:latin typeface="Consolas"/>
                 <a:cs typeface="Consolas"/>
               </a:rPr>
               <a:t>CBase_Main </a:t>
             </a:r>
             <a:r>
-              <a:rPr lang="en-US" dirty="0">
+              <a:rPr lang="en-US" sz="1400" dirty="0">
                 <a:latin typeface="Consolas"/>
                 <a:cs typeface="Consolas"/>
               </a:rPr>
@@ -10332,79 +10334,20 @@
               <a:buNone/>
             </a:pPr>
             <a:r>
-              <a:rPr lang="en-US" b="1" dirty="0">
+              <a:rPr lang="en-US" sz="1400" b="1" dirty="0">
                 <a:latin typeface="Consolas"/>
                 <a:cs typeface="Consolas"/>
               </a:rPr>
               <a:t>public</a:t>
             </a:r>
             <a:r>
-              <a:rPr lang="en-US" dirty="0">
+              <a:rPr lang="en-US" sz="1400" dirty="0">
                 <a:latin typeface="Consolas"/>
                 <a:cs typeface="Consolas"/>
               </a:rPr>
               <a:t>: Main(CkArgMsg∗  m) { </a:t>
             </a:r>
-            <a:r>
-              <a:rPr lang="en-US" dirty="0" smtClean="0">
-                <a:latin typeface="Consolas"/>
-                <a:cs typeface="Consolas"/>
-              </a:rPr>
-              <a:t>CProxy_Fib</a:t>
-            </a:r>
-            <a:r>
-              <a:rPr lang="en-US" dirty="0">
-                <a:latin typeface="Consolas"/>
-                <a:cs typeface="Consolas"/>
-              </a:rPr>
-              <a:t>::ckNew(atoi(m−&gt;argv[1]), </a:t>
-            </a:r>
-            <a:r>
-              <a:rPr lang="en-US" b="1" dirty="0">
-                <a:latin typeface="Consolas"/>
-                <a:cs typeface="Consolas"/>
-              </a:rPr>
-              <a:t>true</a:t>
-            </a:r>
-            <a:r>
-              <a:rPr lang="en-US" dirty="0">
-                <a:latin typeface="Consolas"/>
-                <a:cs typeface="Consolas"/>
-              </a:rPr>
-              <a:t>, </a:t>
-            </a:r>
-            <a:r>
-              <a:rPr lang="en-US" dirty="0" smtClean="0">
-                <a:latin typeface="Consolas"/>
-                <a:cs typeface="Consolas"/>
-              </a:rPr>
-              <a:t>CProxy_Fib</a:t>
-            </a:r>
-            <a:r>
-              <a:rPr lang="en-US" dirty="0">
-                <a:latin typeface="Consolas"/>
-                <a:cs typeface="Consolas"/>
-              </a:rPr>
-              <a:t>()); }</a:t>
-            </a:r>
-          </a:p>
-          <a:p>
-            <a:pPr marL="0" indent="0">
-              <a:buNone/>
-            </a:pPr>
-            <a:r>
-              <a:rPr lang="en-US" dirty="0">
-                <a:latin typeface="Consolas"/>
-                <a:cs typeface="Consolas"/>
-              </a:rPr>
-              <a:t>};</a:t>
-            </a:r>
-          </a:p>
-          <a:p>
-            <a:pPr marL="0" indent="0">
-              <a:buNone/>
-            </a:pPr>
-            <a:endParaRPr lang="en-US" dirty="0">
+            <a:endParaRPr lang="en-US" sz="1400" dirty="0" smtClean="0">
               <a:latin typeface="Consolas"/>
               <a:cs typeface="Consolas"/>
             </a:endParaRPr>
@@ -10414,93 +10357,76 @@
               <a:buNone/>
             </a:pPr>
             <a:r>
-              <a:rPr lang="en-US" b="1" dirty="0">
-                <a:latin typeface="Consolas"/>
-                <a:cs typeface="Consolas"/>
-              </a:rPr>
-              <a:t>class </a:t>
-            </a:r>
-            <a:r>
-              <a:rPr lang="en-US" dirty="0">
-                <a:latin typeface="Consolas"/>
-                <a:cs typeface="Consolas"/>
-              </a:rPr>
-              <a:t>Fib : </a:t>
-            </a:r>
-            <a:r>
-              <a:rPr lang="en-US" b="1" dirty="0">
-                <a:latin typeface="Consolas"/>
-                <a:cs typeface="Consolas"/>
-              </a:rPr>
-              <a:t>public </a:t>
-            </a:r>
-            <a:r>
-              <a:rPr lang="en-US" dirty="0" smtClean="0">
-                <a:latin typeface="Consolas"/>
-                <a:cs typeface="Consolas"/>
-              </a:rPr>
-              <a:t>CBase_Fib </a:t>
-            </a:r>
-            <a:r>
-              <a:rPr lang="en-US" dirty="0">
-                <a:latin typeface="Consolas"/>
-                <a:cs typeface="Consolas"/>
-              </a:rPr>
-              <a:t>{</a:t>
-            </a:r>
-          </a:p>
-          <a:p>
-            <a:pPr marL="0" indent="0">
-              <a:buNone/>
-            </a:pPr>
-            <a:r>
-              <a:rPr lang="en-US" b="1" dirty="0">
-                <a:latin typeface="Consolas"/>
-                <a:cs typeface="Consolas"/>
-              </a:rPr>
-              <a:t>public</a:t>
-            </a:r>
-            <a:r>
-              <a:rPr lang="en-US" dirty="0">
-                <a:latin typeface="Consolas"/>
-                <a:cs typeface="Consolas"/>
-              </a:rPr>
-              <a:t>:</a:t>
-            </a:r>
-          </a:p>
-          <a:p>
-            <a:pPr marL="0" indent="0">
-              <a:buNone/>
-            </a:pPr>
-            <a:r>
-              <a:rPr lang="en-US" dirty="0" smtClean="0">
-                <a:latin typeface="Consolas"/>
-                <a:cs typeface="Consolas"/>
-              </a:rPr>
-              <a:t>    </a:t>
-            </a:r>
-            <a:r>
-              <a:rPr lang="en-US" dirty="0" err="1" smtClean="0">
-                <a:latin typeface="Consolas"/>
-                <a:cs typeface="Consolas"/>
-              </a:rPr>
-              <a:t>Fib_SDAG</a:t>
-            </a:r>
-            <a:r>
-              <a:rPr lang="en-US" dirty="0" err="1">
-                <a:latin typeface="Consolas"/>
-                <a:cs typeface="Consolas"/>
-              </a:rPr>
-              <a:t>_</a:t>
-            </a:r>
-            <a:r>
-              <a:rPr lang="en-US" dirty="0" err="1" smtClean="0">
-                <a:latin typeface="Consolas"/>
-                <a:cs typeface="Consolas"/>
-              </a:rPr>
-              <a:t>CODE</a:t>
-            </a:r>
-            <a:endParaRPr lang="en-US" dirty="0">
+              <a:rPr lang="en-US" sz="1400" dirty="0">
+                <a:latin typeface="Consolas"/>
+                <a:cs typeface="Consolas"/>
+              </a:rPr>
+              <a:t> </a:t>
+            </a:r>
+            <a:r>
+              <a:rPr lang="en-US" sz="1400" dirty="0" smtClean="0">
+                <a:latin typeface="Consolas"/>
+                <a:cs typeface="Consolas"/>
+              </a:rPr>
+              <a:t> </a:t>
+            </a:r>
+            <a:r>
+              <a:rPr lang="en-US" sz="1400" dirty="0" err="1" smtClean="0">
+                <a:latin typeface="Consolas"/>
+                <a:cs typeface="Consolas"/>
+              </a:rPr>
+              <a:t>CProxy_Fib</a:t>
+            </a:r>
+            <a:r>
+              <a:rPr lang="en-US" sz="1400" dirty="0">
+                <a:latin typeface="Consolas"/>
+                <a:cs typeface="Consolas"/>
+              </a:rPr>
+              <a:t>::ckNew(atoi(m−&gt;argv[1]), </a:t>
+            </a:r>
+            <a:r>
+              <a:rPr lang="en-US" sz="1400" b="1" dirty="0">
+                <a:latin typeface="Consolas"/>
+                <a:cs typeface="Consolas"/>
+              </a:rPr>
+              <a:t>true</a:t>
+            </a:r>
+            <a:r>
+              <a:rPr lang="en-US" sz="1400" dirty="0">
+                <a:latin typeface="Consolas"/>
+                <a:cs typeface="Consolas"/>
+              </a:rPr>
+              <a:t>, </a:t>
+            </a:r>
+            <a:r>
+              <a:rPr lang="en-US" sz="1400" dirty="0" smtClean="0">
+                <a:latin typeface="Consolas"/>
+                <a:cs typeface="Consolas"/>
+              </a:rPr>
+              <a:t>CProxy_Fib</a:t>
+            </a:r>
+            <a:r>
+              <a:rPr lang="en-US" sz="1400" dirty="0">
+                <a:latin typeface="Consolas"/>
+                <a:cs typeface="Consolas"/>
+              </a:rPr>
+              <a:t>()); </a:t>
+            </a:r>
+            <a:r>
+              <a:rPr lang="en-US" sz="1400" dirty="0">
+                <a:latin typeface="Consolas"/>
+                <a:cs typeface="Consolas"/>
+              </a:rPr>
+              <a:t>} }</a:t>
+            </a:r>
+            <a:r>
+              <a:rPr lang="en-US" sz="1400" dirty="0" smtClean="0">
+                <a:latin typeface="Consolas"/>
+                <a:cs typeface="Consolas"/>
+              </a:rPr>
+              <a:t>;</a:t>
+            </a:r>
+            <a:endParaRPr lang="en-US" sz="1400" dirty="0">
               <a:latin typeface="Consolas"/>
               <a:cs typeface="Consolas"/>
             </a:endParaRPr>
@@ -10510,41 +10436,79 @@
               <a:buNone/>
             </a:pPr>
             <a:r>
-              <a:rPr lang="en-US" dirty="0" smtClean="0">
-                <a:latin typeface="Consolas"/>
-                <a:cs typeface="Consolas"/>
-              </a:rPr>
-              <a:t>    CProxy_Fib </a:t>
-            </a:r>
-            <a:r>
-              <a:rPr lang="en-US" dirty="0">
-                <a:latin typeface="Consolas"/>
-                <a:cs typeface="Consolas"/>
-              </a:rPr>
-              <a:t>parent; </a:t>
-            </a:r>
-            <a:r>
-              <a:rPr lang="en-US" b="1" dirty="0">
-                <a:latin typeface="Consolas"/>
-                <a:cs typeface="Consolas"/>
-              </a:rPr>
-              <a:t>bool </a:t>
-            </a:r>
-            <a:r>
-              <a:rPr lang="en-US" dirty="0">
-                <a:latin typeface="Consolas"/>
-                <a:cs typeface="Consolas"/>
-              </a:rPr>
-              <a:t>isRoot</a:t>
-            </a:r>
-            <a:r>
-              <a:rPr lang="en-US" dirty="0" smtClean="0">
-                <a:latin typeface="Consolas"/>
-                <a:cs typeface="Consolas"/>
-              </a:rPr>
-              <a:t>;</a:t>
-            </a:r>
-            <a:endParaRPr lang="en-US" dirty="0">
+              <a:rPr lang="en-US" sz="1400" b="1" dirty="0" smtClean="0">
+                <a:latin typeface="Consolas"/>
+                <a:cs typeface="Consolas"/>
+              </a:rPr>
+              <a:t>class </a:t>
+            </a:r>
+            <a:r>
+              <a:rPr lang="en-US" sz="1400" dirty="0">
+                <a:latin typeface="Consolas"/>
+                <a:cs typeface="Consolas"/>
+              </a:rPr>
+              <a:t>Fib : </a:t>
+            </a:r>
+            <a:r>
+              <a:rPr lang="en-US" sz="1400" b="1" dirty="0">
+                <a:latin typeface="Consolas"/>
+                <a:cs typeface="Consolas"/>
+              </a:rPr>
+              <a:t>public </a:t>
+            </a:r>
+            <a:r>
+              <a:rPr lang="en-US" sz="1400" dirty="0" smtClean="0">
+                <a:latin typeface="Consolas"/>
+                <a:cs typeface="Consolas"/>
+              </a:rPr>
+              <a:t>CBase_Fib </a:t>
+            </a:r>
+            <a:r>
+              <a:rPr lang="en-US" sz="1400" dirty="0">
+                <a:latin typeface="Consolas"/>
+                <a:cs typeface="Consolas"/>
+              </a:rPr>
+              <a:t>{</a:t>
+            </a:r>
+          </a:p>
+          <a:p>
+            <a:pPr marL="0" indent="0">
+              <a:buNone/>
+            </a:pPr>
+            <a:r>
+              <a:rPr lang="en-US" sz="1400" b="1" dirty="0">
+                <a:latin typeface="Consolas"/>
+                <a:cs typeface="Consolas"/>
+              </a:rPr>
+              <a:t>public</a:t>
+            </a:r>
+            <a:r>
+              <a:rPr lang="en-US" sz="1400" dirty="0">
+                <a:latin typeface="Consolas"/>
+                <a:cs typeface="Consolas"/>
+              </a:rPr>
+              <a:t>:</a:t>
+            </a:r>
+          </a:p>
+          <a:p>
+            <a:pPr marL="0" indent="0">
+              <a:buNone/>
+            </a:pPr>
+            <a:r>
+              <a:rPr lang="en-US" sz="1400" dirty="0" smtClean="0">
+                <a:latin typeface="Consolas"/>
+                <a:cs typeface="Consolas"/>
+              </a:rPr>
+              <a:t>  </a:t>
+            </a:r>
+            <a:r>
+              <a:rPr lang="en-US" sz="1400" dirty="0" err="1" smtClean="0">
+                <a:latin typeface="Consolas"/>
+                <a:cs typeface="Consolas"/>
+              </a:rPr>
+              <a:t>Fib_SDAG_CODE</a:t>
+            </a:r>
+            <a:endParaRPr lang="en-US" sz="1400" dirty="0">
               <a:latin typeface="Consolas"/>
               <a:cs typeface="Consolas"/>
             </a:endParaRPr>
@@ -10553,7 +10517,56 @@
             <a:pPr marL="0" indent="0">
               <a:buNone/>
             </a:pPr>
-            <a:endParaRPr lang="en-US" dirty="0" smtClean="0">
+            <a:r>
+              <a:rPr lang="en-US" sz="1400" dirty="0" smtClean="0">
+                <a:latin typeface="Consolas"/>
+                <a:cs typeface="Consolas"/>
+              </a:rPr>
+              <a:t>  </a:t>
+            </a:r>
+            <a:r>
+              <a:rPr lang="en-US" sz="1400" dirty="0" err="1" smtClean="0">
+                <a:latin typeface="Consolas"/>
+                <a:cs typeface="Consolas"/>
+              </a:rPr>
+              <a:t>CProxy_Fib</a:t>
+            </a:r>
+            <a:r>
+              <a:rPr lang="en-US" sz="1400" dirty="0" smtClean="0">
+                <a:latin typeface="Consolas"/>
+                <a:cs typeface="Consolas"/>
+              </a:rPr>
+              <a:t> </a:t>
+            </a:r>
+            <a:r>
+              <a:rPr lang="en-US" sz="1400" dirty="0">
+                <a:latin typeface="Consolas"/>
+                <a:cs typeface="Consolas"/>
+              </a:rPr>
+              <a:t>parent; </a:t>
+            </a:r>
+            <a:r>
+              <a:rPr lang="en-US" sz="1400" b="1" dirty="0">
+                <a:latin typeface="Consolas"/>
+                <a:cs typeface="Consolas"/>
+              </a:rPr>
+              <a:t>bool </a:t>
+            </a:r>
+            <a:r>
+              <a:rPr lang="en-US" sz="1400" dirty="0" err="1">
+                <a:latin typeface="Consolas"/>
+                <a:cs typeface="Consolas"/>
+              </a:rPr>
+              <a:t>isRoot</a:t>
+            </a:r>
+            <a:r>
+              <a:rPr lang="en-US" sz="1400" dirty="0" smtClean="0">
+                <a:latin typeface="Consolas"/>
+                <a:cs typeface="Consolas"/>
+              </a:rPr>
+              <a:t>;</a:t>
+            </a:r>
+            <a:endParaRPr lang="en-US" sz="1400" dirty="0" smtClean="0">
               <a:latin typeface="Consolas"/>
               <a:cs typeface="Consolas"/>
             </a:endParaRPr>
@@ -10563,128 +10576,111 @@
               <a:buNone/>
             </a:pPr>
             <a:r>
-              <a:rPr lang="en-US" dirty="0" smtClean="0">
-                <a:latin typeface="Consolas"/>
-                <a:cs typeface="Consolas"/>
-              </a:rPr>
-              <a:t>    Fib</a:t>
-            </a:r>
-            <a:r>
-              <a:rPr lang="en-US" dirty="0">
+              <a:rPr lang="en-US" sz="1400" dirty="0" smtClean="0">
+                <a:latin typeface="Consolas"/>
+                <a:cs typeface="Consolas"/>
+              </a:rPr>
+              <a:t>  Fib</a:t>
+            </a:r>
+            <a:r>
+              <a:rPr lang="en-US" sz="1400" dirty="0">
                 <a:latin typeface="Consolas"/>
                 <a:cs typeface="Consolas"/>
               </a:rPr>
               <a:t>(</a:t>
             </a:r>
             <a:r>
-              <a:rPr lang="en-US" b="1" dirty="0">
+              <a:rPr lang="en-US" sz="1400" b="1" dirty="0">
                 <a:latin typeface="Consolas"/>
                 <a:cs typeface="Consolas"/>
               </a:rPr>
               <a:t>int </a:t>
             </a:r>
             <a:r>
-              <a:rPr lang="en-US" dirty="0">
-                <a:latin typeface="Consolas"/>
-                <a:cs typeface="Consolas"/>
-              </a:rPr>
-              <a:t>n, </a:t>
-            </a:r>
-            <a:r>
-              <a:rPr lang="en-US" b="1" dirty="0">
-                <a:latin typeface="Consolas"/>
-                <a:cs typeface="Consolas"/>
-              </a:rPr>
-              <a:t>bool </a:t>
-            </a:r>
-            <a:r>
-              <a:rPr lang="en-US" dirty="0" smtClean="0">
-                <a:latin typeface="Consolas"/>
-                <a:cs typeface="Consolas"/>
-              </a:rPr>
-              <a:t>isRoot_, CProxy_Fib parent_)</a:t>
-            </a:r>
-            <a:r>
-              <a:rPr lang="en-US" dirty="0">
-                <a:latin typeface="Consolas"/>
-                <a:cs typeface="Consolas"/>
-              </a:rPr>
-              <a:t> </a:t>
-            </a:r>
-            <a:r>
-              <a:rPr lang="en-US" dirty="0" smtClean="0">
-                <a:latin typeface="Consolas"/>
-                <a:cs typeface="Consolas"/>
-              </a:rPr>
-              <a:t>: </a:t>
-            </a:r>
-            <a:r>
-              <a:rPr lang="en-US" dirty="0">
-                <a:latin typeface="Consolas"/>
-                <a:cs typeface="Consolas"/>
-              </a:rPr>
-              <a:t>parent(</a:t>
-            </a:r>
-            <a:r>
-              <a:rPr lang="en-US" dirty="0" smtClean="0">
+              <a:rPr lang="en-US" sz="1400" dirty="0">
+                <a:latin typeface="Consolas"/>
+                <a:cs typeface="Consolas"/>
+              </a:rPr>
+              <a:t>n</a:t>
+            </a:r>
+            <a:r>
+              <a:rPr lang="en-US" sz="1400" dirty="0" smtClean="0">
+                <a:latin typeface="Consolas"/>
+                <a:cs typeface="Consolas"/>
+              </a:rPr>
+              <a:t>, </a:t>
+            </a:r>
+            <a:r>
+              <a:rPr lang="en-US" sz="1400" b="1" dirty="0" err="1" smtClean="0">
+                <a:latin typeface="Consolas"/>
+                <a:cs typeface="Consolas"/>
+              </a:rPr>
+              <a:t>bool</a:t>
+            </a:r>
+            <a:r>
+              <a:rPr lang="en-US" sz="1400" b="1" dirty="0" smtClean="0">
+                <a:latin typeface="Consolas"/>
+                <a:cs typeface="Consolas"/>
+              </a:rPr>
+              <a:t> </a:t>
+            </a:r>
+            <a:r>
+              <a:rPr lang="en-US" sz="1400" dirty="0" smtClean="0">
+                <a:latin typeface="Consolas"/>
+                <a:cs typeface="Consolas"/>
+              </a:rPr>
+              <a:t>isRoot_, CProxy_Fib parent_</a:t>
+            </a:r>
+            <a:r>
+              <a:rPr lang="en-US" sz="1400" dirty="0" smtClean="0">
+                <a:latin typeface="Consolas"/>
+                <a:cs typeface="Consolas"/>
+              </a:rPr>
+              <a:t>):parent</a:t>
+            </a:r>
+            <a:r>
+              <a:rPr lang="en-US" sz="1400" dirty="0">
+                <a:latin typeface="Consolas"/>
+                <a:cs typeface="Consolas"/>
+              </a:rPr>
+              <a:t>(</a:t>
+            </a:r>
+            <a:r>
+              <a:rPr lang="en-US" sz="1400" dirty="0" smtClean="0">
                 <a:latin typeface="Consolas"/>
                 <a:cs typeface="Consolas"/>
               </a:rPr>
               <a:t>parent_)</a:t>
             </a:r>
             <a:r>
-              <a:rPr lang="en-US" dirty="0">
+              <a:rPr lang="en-US" sz="1400" dirty="0">
                 <a:latin typeface="Consolas"/>
                 <a:cs typeface="Consolas"/>
               </a:rPr>
               <a:t>, isRoot(</a:t>
             </a:r>
             <a:r>
-              <a:rPr lang="en-US" dirty="0" smtClean="0">
-                <a:latin typeface="Consolas"/>
-                <a:cs typeface="Consolas"/>
-              </a:rPr>
-              <a:t>isRoot_) </a:t>
-            </a:r>
-            <a:r>
-              <a:rPr lang="en-US" dirty="0">
-                <a:latin typeface="Consolas"/>
-                <a:cs typeface="Consolas"/>
-              </a:rPr>
-              <a:t>{</a:t>
-            </a:r>
-          </a:p>
-          <a:p>
-            <a:pPr marL="0" indent="0">
-              <a:buNone/>
-            </a:pPr>
-            <a:r>
-              <a:rPr lang="en-US" dirty="0" smtClean="0">
-                <a:latin typeface="Consolas"/>
-                <a:cs typeface="Consolas"/>
-              </a:rPr>
-              <a:t>        calc</a:t>
-            </a:r>
-            <a:r>
-              <a:rPr lang="en-US" dirty="0">
-                <a:latin typeface="Consolas"/>
-                <a:cs typeface="Consolas"/>
-              </a:rPr>
-              <a:t>(n);</a:t>
-            </a:r>
-          </a:p>
-          <a:p>
-            <a:pPr marL="0" indent="0">
-              <a:buNone/>
-            </a:pPr>
-            <a:r>
-              <a:rPr lang="en-US" dirty="0" smtClean="0">
-                <a:latin typeface="Consolas"/>
-                <a:cs typeface="Consolas"/>
-              </a:rPr>
-              <a:t>    }</a:t>
-            </a:r>
-            <a:endParaRPr lang="en-US" dirty="0">
+              <a:rPr lang="en-US" sz="1400" dirty="0" err="1" smtClean="0">
+                <a:latin typeface="Consolas"/>
+                <a:cs typeface="Consolas"/>
+              </a:rPr>
+              <a:t>isRoot</a:t>
+            </a:r>
+            <a:r>
+              <a:rPr lang="en-US" sz="1400" dirty="0" smtClean="0">
+                <a:latin typeface="Consolas"/>
+                <a:cs typeface="Consolas"/>
+              </a:rPr>
+              <a:t>_</a:t>
+            </a:r>
+            <a:r>
+              <a:rPr lang="en-US" sz="1400" dirty="0" smtClean="0">
+                <a:latin typeface="Consolas"/>
+                <a:cs typeface="Consolas"/>
+              </a:rPr>
+              <a:t>){</a:t>
+            </a:r>
+            <a:endParaRPr lang="en-US" sz="1400" dirty="0">
               <a:latin typeface="Consolas"/>
               <a:cs typeface="Consolas"/>
             </a:endParaRPr>
@@ -10693,7 +10689,117 @@
             <a:pPr marL="0" indent="0">
               <a:buNone/>
             </a:pPr>
-            <a:endParaRPr lang="en-US" dirty="0">
+            <a:r>
+              <a:rPr lang="en-US" sz="1400" dirty="0" smtClean="0">
+                <a:latin typeface="Consolas"/>
+                <a:cs typeface="Consolas"/>
+              </a:rPr>
+              <a:t>  </a:t>
+            </a:r>
+            <a:r>
+              <a:rPr lang="en-US" sz="1400" dirty="0">
+                <a:latin typeface="Consolas"/>
+                <a:cs typeface="Consolas"/>
+              </a:rPr>
+              <a:t> </a:t>
+            </a:r>
+            <a:r>
+              <a:rPr lang="en-US" sz="1400" dirty="0" smtClean="0">
+                <a:latin typeface="Consolas"/>
+                <a:cs typeface="Consolas"/>
+              </a:rPr>
+              <a:t> </a:t>
+            </a:r>
+            <a:r>
+              <a:rPr lang="en-US" sz="1400" dirty="0" err="1" smtClean="0">
+                <a:latin typeface="Consolas"/>
+                <a:cs typeface="Consolas"/>
+              </a:rPr>
+              <a:t>calc</a:t>
+            </a:r>
+            <a:r>
+              <a:rPr lang="en-US" sz="1400" dirty="0">
+                <a:latin typeface="Consolas"/>
+                <a:cs typeface="Consolas"/>
+              </a:rPr>
+              <a:t>(n)</a:t>
+            </a:r>
+            <a:r>
+              <a:rPr lang="en-US" sz="1400" dirty="0" smtClean="0">
+                <a:latin typeface="Consolas"/>
+                <a:cs typeface="Consolas"/>
+              </a:rPr>
+              <a:t>; }</a:t>
+            </a:r>
+          </a:p>
+          <a:p>
+            <a:pPr marL="0" indent="0">
+              <a:buNone/>
+            </a:pPr>
+            <a:r>
+              <a:rPr lang="en-US" sz="1400" dirty="0" smtClean="0">
+                <a:latin typeface="Consolas"/>
+                <a:cs typeface="Consolas"/>
+              </a:rPr>
+              <a:t>  </a:t>
+            </a:r>
+            <a:r>
+              <a:rPr lang="en-US" sz="1400" b="1" dirty="0" err="1" smtClean="0">
+                <a:latin typeface="Consolas"/>
+                <a:cs typeface="Consolas"/>
+              </a:rPr>
+              <a:t>int</a:t>
+            </a:r>
+            <a:r>
+              <a:rPr lang="en-US" sz="1400" b="1" dirty="0" smtClean="0">
+                <a:latin typeface="Consolas"/>
+                <a:cs typeface="Consolas"/>
+              </a:rPr>
+              <a:t> </a:t>
+            </a:r>
+            <a:r>
+              <a:rPr lang="en-US" sz="1400" dirty="0">
+                <a:latin typeface="Consolas"/>
+                <a:cs typeface="Consolas"/>
+              </a:rPr>
+              <a:t>seqFib(</a:t>
+            </a:r>
+            <a:r>
+              <a:rPr lang="en-US" sz="1400" b="1" dirty="0">
+                <a:latin typeface="Consolas"/>
+                <a:cs typeface="Consolas"/>
+              </a:rPr>
+              <a:t>int </a:t>
+            </a:r>
+            <a:r>
+              <a:rPr lang="en-US" sz="1400" dirty="0">
+                <a:latin typeface="Consolas"/>
+                <a:cs typeface="Consolas"/>
+              </a:rPr>
+              <a:t>n) { </a:t>
+            </a:r>
+            <a:r>
+              <a:rPr lang="en-US" sz="1400" b="1" dirty="0">
+                <a:latin typeface="Consolas"/>
+                <a:cs typeface="Consolas"/>
+              </a:rPr>
+              <a:t>return </a:t>
+            </a:r>
+            <a:r>
+              <a:rPr lang="en-US" sz="1400" dirty="0">
+                <a:latin typeface="Consolas"/>
+                <a:cs typeface="Consolas"/>
+              </a:rPr>
+              <a:t>(n &lt; 2) ? n : seqFib(n − 1) + seqFib(n − 2); </a:t>
+            </a:r>
+            <a:r>
+              <a:rPr lang="en-US" sz="1400" dirty="0" smtClean="0">
+                <a:latin typeface="Consolas"/>
+                <a:cs typeface="Consolas"/>
+              </a:rPr>
+              <a:t>}</a:t>
+            </a:r>
+            <a:endParaRPr lang="en-US" sz="1400" dirty="0">
               <a:latin typeface="Consolas"/>
               <a:cs typeface="Consolas"/>
             </a:endParaRPr>
@@ -10703,60 +10809,95 @@
               <a:buNone/>
             </a:pPr>
             <a:r>
-              <a:rPr lang="en-US" dirty="0" smtClean="0">
-                <a:latin typeface="Consolas"/>
-                <a:cs typeface="Consolas"/>
-              </a:rPr>
-              <a:t>    </a:t>
-            </a:r>
-            <a:r>
-              <a:rPr lang="en-US" b="1" dirty="0" smtClean="0">
+              <a:rPr lang="en-US" sz="1400" dirty="0" smtClean="0">
+                <a:latin typeface="Consolas"/>
+                <a:cs typeface="Consolas"/>
+              </a:rPr>
+              <a:t>  </a:t>
+            </a:r>
+            <a:r>
+              <a:rPr lang="en-US" sz="1400" b="1" dirty="0" smtClean="0">
+                <a:latin typeface="Consolas"/>
+                <a:cs typeface="Consolas"/>
+              </a:rPr>
+              <a:t>void </a:t>
+            </a:r>
+            <a:r>
+              <a:rPr lang="en-US" sz="1400" dirty="0">
+                <a:latin typeface="Consolas"/>
+                <a:cs typeface="Consolas"/>
+              </a:rPr>
+              <a:t>respond(</a:t>
+            </a:r>
+            <a:r>
+              <a:rPr lang="en-US" sz="1400" b="1" dirty="0">
                 <a:latin typeface="Consolas"/>
                 <a:cs typeface="Consolas"/>
               </a:rPr>
               <a:t>int </a:t>
             </a:r>
             <a:r>
-              <a:rPr lang="en-US" dirty="0">
-                <a:latin typeface="Consolas"/>
-                <a:cs typeface="Consolas"/>
-              </a:rPr>
-              <a:t>seqFib(</a:t>
-            </a:r>
-            <a:r>
-              <a:rPr lang="en-US" b="1" dirty="0">
-                <a:latin typeface="Consolas"/>
-                <a:cs typeface="Consolas"/>
-              </a:rPr>
-              <a:t>int </a:t>
-            </a:r>
-            <a:r>
-              <a:rPr lang="en-US" dirty="0">
-                <a:latin typeface="Consolas"/>
-                <a:cs typeface="Consolas"/>
-              </a:rPr>
-              <a:t>n) { </a:t>
-            </a:r>
-            <a:r>
-              <a:rPr lang="en-US" b="1" dirty="0">
-                <a:latin typeface="Consolas"/>
-                <a:cs typeface="Consolas"/>
-              </a:rPr>
-              <a:t>return </a:t>
-            </a:r>
-            <a:r>
-              <a:rPr lang="en-US" dirty="0">
-                <a:latin typeface="Consolas"/>
-                <a:cs typeface="Consolas"/>
-              </a:rPr>
-              <a:t>(n &lt; 2) ? n : seqFib(n − 1) + seqFib(n − 2); }</a:t>
+              <a:rPr lang="en-US" sz="1400" dirty="0">
+                <a:latin typeface="Consolas"/>
+                <a:cs typeface="Consolas"/>
+              </a:rPr>
+              <a:t>val) {</a:t>
             </a:r>
           </a:p>
           <a:p>
             <a:pPr marL="0" indent="0">
               <a:buNone/>
             </a:pPr>
-            <a:endParaRPr lang="en-US" dirty="0">
+            <a:r>
+              <a:rPr lang="en-US" sz="1400" dirty="0" smtClean="0">
+                <a:latin typeface="Consolas"/>
+                <a:cs typeface="Consolas"/>
+              </a:rPr>
+              <a:t>  </a:t>
+            </a:r>
+            <a:r>
+              <a:rPr lang="en-US" sz="1400" dirty="0">
+                <a:latin typeface="Consolas"/>
+                <a:cs typeface="Consolas"/>
+              </a:rPr>
+              <a:t> </a:t>
+            </a:r>
+            <a:r>
+              <a:rPr lang="en-US" sz="1400" dirty="0" smtClean="0">
+                <a:latin typeface="Consolas"/>
+                <a:cs typeface="Consolas"/>
+              </a:rPr>
+              <a:t> </a:t>
+            </a:r>
+            <a:r>
+              <a:rPr lang="en-US" sz="1400" b="1" dirty="0" smtClean="0">
+                <a:latin typeface="Consolas"/>
+                <a:cs typeface="Consolas"/>
+              </a:rPr>
+              <a:t>if </a:t>
+            </a:r>
+            <a:r>
+              <a:rPr lang="en-US" sz="1400" dirty="0">
+                <a:latin typeface="Consolas"/>
+                <a:cs typeface="Consolas"/>
+              </a:rPr>
+              <a:t>(!</a:t>
+            </a:r>
+            <a:r>
+              <a:rPr lang="en-US" sz="1400" dirty="0" err="1">
+                <a:latin typeface="Consolas"/>
+                <a:cs typeface="Consolas"/>
+              </a:rPr>
+              <a:t>isRoot</a:t>
+            </a:r>
+            <a:r>
+              <a:rPr lang="en-US" sz="1400" dirty="0" smtClean="0">
+                <a:latin typeface="Consolas"/>
+                <a:cs typeface="Consolas"/>
+              </a:rPr>
+              <a:t>) { </a:t>
+            </a:r>
+            <a:endParaRPr lang="en-US" sz="1400" dirty="0" smtClean="0">
               <a:latin typeface="Consolas"/>
               <a:cs typeface="Consolas"/>
             </a:endParaRPr>
@@ -10766,67 +10907,41 @@
               <a:buNone/>
             </a:pPr>
             <a:r>
-              <a:rPr lang="en-US" dirty="0" smtClean="0">
-                <a:latin typeface="Consolas"/>
-                <a:cs typeface="Consolas"/>
-              </a:rPr>
-              <a:t>    </a:t>
-            </a:r>
-            <a:r>
-              <a:rPr lang="en-US" b="1" dirty="0" smtClean="0">
-                <a:latin typeface="Consolas"/>
-                <a:cs typeface="Consolas"/>
-              </a:rPr>
-              <a:t>void </a:t>
-            </a:r>
-            <a:r>
-              <a:rPr lang="en-US" dirty="0">
-                <a:latin typeface="Consolas"/>
-                <a:cs typeface="Consolas"/>
-              </a:rPr>
-              <a:t>respond(</a:t>
-            </a:r>
-            <a:r>
-              <a:rPr lang="en-US" b="1" dirty="0">
-                <a:latin typeface="Consolas"/>
-                <a:cs typeface="Consolas"/>
-              </a:rPr>
-              <a:t>int </a:t>
-            </a:r>
-            <a:r>
-              <a:rPr lang="en-US" dirty="0">
-                <a:latin typeface="Consolas"/>
-                <a:cs typeface="Consolas"/>
-              </a:rPr>
-              <a:t>val) {</a:t>
-            </a:r>
-          </a:p>
-          <a:p>
-            <a:pPr marL="0" indent="0">
-              <a:buNone/>
-            </a:pPr>
-            <a:r>
-              <a:rPr lang="en-US" dirty="0" smtClean="0">
-                <a:latin typeface="Consolas"/>
-                <a:cs typeface="Consolas"/>
-              </a:rPr>
-              <a:t>        </a:t>
-            </a:r>
-            <a:r>
-              <a:rPr lang="en-US" b="1" dirty="0" smtClean="0">
-                <a:latin typeface="Consolas"/>
-                <a:cs typeface="Consolas"/>
-              </a:rPr>
-              <a:t>if </a:t>
-            </a:r>
-            <a:r>
-              <a:rPr lang="en-US" dirty="0">
-                <a:latin typeface="Consolas"/>
-                <a:cs typeface="Consolas"/>
-              </a:rPr>
-              <a:t>(!isRoot) </a:t>
-            </a:r>
-            <a:endParaRPr lang="en-US" dirty="0" smtClean="0">
+              <a:rPr lang="en-US" sz="1400" dirty="0">
+                <a:latin typeface="Consolas"/>
+                <a:cs typeface="Consolas"/>
+              </a:rPr>
+              <a:t> </a:t>
+            </a:r>
+            <a:r>
+              <a:rPr lang="en-US" sz="1400" dirty="0" smtClean="0">
+                <a:latin typeface="Consolas"/>
+                <a:cs typeface="Consolas"/>
+              </a:rPr>
+              <a:t>   </a:t>
+            </a:r>
+            <a:r>
+              <a:rPr lang="en-US" sz="1400" dirty="0" smtClean="0">
+                <a:latin typeface="Consolas"/>
+                <a:cs typeface="Consolas"/>
+              </a:rPr>
+              <a:t>  </a:t>
+            </a:r>
+            <a:r>
+              <a:rPr lang="en-US" sz="1400" dirty="0" err="1" smtClean="0">
+                <a:latin typeface="Consolas"/>
+                <a:cs typeface="Consolas"/>
+              </a:rPr>
+              <a:t>parent.response</a:t>
+            </a:r>
+            <a:r>
+              <a:rPr lang="en-US" sz="1400" dirty="0">
+                <a:latin typeface="Consolas"/>
+                <a:cs typeface="Consolas"/>
+              </a:rPr>
+              <a:t>(val); </a:t>
+            </a:r>
+            <a:endParaRPr lang="en-US" sz="1400" dirty="0" smtClean="0">
               <a:latin typeface="Consolas"/>
               <a:cs typeface="Consolas"/>
             </a:endParaRPr>
@@ -10836,27 +10951,114 @@
               <a:buNone/>
             </a:pPr>
             <a:r>
-              <a:rPr lang="en-US" dirty="0">
-                <a:latin typeface="Consolas"/>
-                <a:cs typeface="Consolas"/>
-              </a:rPr>
-              <a:t> </a:t>
-            </a:r>
-            <a:r>
-              <a:rPr lang="en-US" dirty="0" smtClean="0">
-                <a:latin typeface="Consolas"/>
-                <a:cs typeface="Consolas"/>
-              </a:rPr>
-              <a:t>           { </a:t>
-            </a:r>
-            <a:r>
-              <a:rPr lang="en-US" dirty="0">
-                <a:latin typeface="Consolas"/>
-                <a:cs typeface="Consolas"/>
-              </a:rPr>
-              <a:t>parent.response(val); </a:t>
-            </a:r>
-            <a:endParaRPr lang="en-US" dirty="0" smtClean="0">
+              <a:rPr lang="en-US" sz="1400" dirty="0">
+                <a:latin typeface="Consolas"/>
+                <a:cs typeface="Consolas"/>
+              </a:rPr>
+              <a:t> </a:t>
+            </a:r>
+            <a:r>
+              <a:rPr lang="en-US" sz="1400" dirty="0" smtClean="0">
+                <a:latin typeface="Consolas"/>
+                <a:cs typeface="Consolas"/>
+              </a:rPr>
+              <a:t>     </a:t>
+            </a:r>
+            <a:r>
+              <a:rPr lang="en-US" sz="1400" b="1" dirty="0" smtClean="0">
+                <a:latin typeface="Consolas"/>
+                <a:cs typeface="Consolas"/>
+              </a:rPr>
+              <a:t>delete </a:t>
+            </a:r>
+            <a:r>
+              <a:rPr lang="en-US" sz="1400" b="1" dirty="0">
+                <a:latin typeface="Consolas"/>
+                <a:cs typeface="Consolas"/>
+              </a:rPr>
+              <a:t>this</a:t>
+            </a:r>
+            <a:r>
+              <a:rPr lang="en-US" sz="1400" dirty="0">
+                <a:latin typeface="Consolas"/>
+                <a:cs typeface="Consolas"/>
+              </a:rPr>
+              <a:t>;</a:t>
+            </a:r>
+          </a:p>
+          <a:p>
+            <a:pPr marL="0" indent="0">
+              <a:buNone/>
+            </a:pPr>
+            <a:r>
+              <a:rPr lang="en-US" sz="1400" dirty="0" smtClean="0">
+                <a:latin typeface="Consolas"/>
+                <a:cs typeface="Consolas"/>
+              </a:rPr>
+              <a:t>    </a:t>
+            </a:r>
+            <a:r>
+              <a:rPr lang="en-US" sz="1400" dirty="0" smtClean="0">
+                <a:latin typeface="Consolas"/>
+                <a:cs typeface="Consolas"/>
+              </a:rPr>
+              <a:t>} </a:t>
+            </a:r>
+            <a:r>
+              <a:rPr lang="en-US" sz="1400" b="1" dirty="0">
+                <a:latin typeface="Consolas"/>
+                <a:cs typeface="Consolas"/>
+              </a:rPr>
+              <a:t>else</a:t>
+            </a:r>
+            <a:r>
+              <a:rPr lang="en-US" sz="1400" dirty="0">
+                <a:latin typeface="Consolas"/>
+                <a:cs typeface="Consolas"/>
+              </a:rPr>
+              <a:t> {</a:t>
+            </a:r>
+          </a:p>
+          <a:p>
+            <a:pPr marL="0" indent="0">
+              <a:buNone/>
+            </a:pPr>
+            <a:r>
+              <a:rPr lang="en-US" sz="1400" dirty="0" smtClean="0">
+                <a:latin typeface="Consolas"/>
+                <a:cs typeface="Consolas"/>
+              </a:rPr>
+              <a:t>    </a:t>
+            </a:r>
+            <a:r>
+              <a:rPr lang="en-US" sz="1400" dirty="0">
+                <a:latin typeface="Consolas"/>
+                <a:cs typeface="Consolas"/>
+              </a:rPr>
+              <a:t> </a:t>
+            </a:r>
+            <a:r>
+              <a:rPr lang="en-US" sz="1400" dirty="0" smtClean="0">
+                <a:latin typeface="Consolas"/>
+                <a:cs typeface="Consolas"/>
+              </a:rPr>
+              <a:t> </a:t>
+            </a:r>
+            <a:r>
+              <a:rPr lang="en-US" sz="1400" dirty="0" err="1" smtClean="0">
+                <a:latin typeface="Consolas"/>
+                <a:cs typeface="Consolas"/>
+              </a:rPr>
+              <a:t>CkPrintf</a:t>
+            </a:r>
+            <a:r>
+              <a:rPr lang="en-US" sz="1400" dirty="0">
+                <a:latin typeface="Consolas"/>
+                <a:cs typeface="Consolas"/>
+              </a:rPr>
+              <a:t>(”Fibonacci number is: %d\n”, val); </a:t>
+            </a:r>
+            <a:endParaRPr lang="en-US" sz="1400" dirty="0" smtClean="0">
               <a:latin typeface="Consolas"/>
               <a:cs typeface="Consolas"/>
             </a:endParaRPr>
@@ -10866,86 +11068,41 @@
               <a:buNone/>
             </a:pPr>
             <a:r>
-              <a:rPr lang="en-US" dirty="0">
-                <a:latin typeface="Consolas"/>
-                <a:cs typeface="Consolas"/>
-              </a:rPr>
-              <a:t> </a:t>
-            </a:r>
-            <a:r>
-              <a:rPr lang="en-US" dirty="0" smtClean="0">
-                <a:latin typeface="Consolas"/>
-                <a:cs typeface="Consolas"/>
-              </a:rPr>
-              <a:t>           </a:t>
-            </a:r>
-            <a:r>
-              <a:rPr lang="en-US" b="1" dirty="0" smtClean="0">
-                <a:latin typeface="Consolas"/>
-                <a:cs typeface="Consolas"/>
-              </a:rPr>
-              <a:t>delete </a:t>
-            </a:r>
-            <a:r>
-              <a:rPr lang="en-US" b="1" dirty="0">
-                <a:latin typeface="Consolas"/>
-                <a:cs typeface="Consolas"/>
-              </a:rPr>
-              <a:t>this</a:t>
-            </a:r>
-            <a:r>
-              <a:rPr lang="en-US" dirty="0">
-                <a:latin typeface="Consolas"/>
-                <a:cs typeface="Consolas"/>
-              </a:rPr>
-              <a:t>;</a:t>
-            </a:r>
-          </a:p>
-          <a:p>
-            <a:pPr marL="0" indent="0">
-              <a:buNone/>
-            </a:pPr>
-            <a:r>
-              <a:rPr lang="en-US" dirty="0" smtClean="0">
-                <a:latin typeface="Consolas"/>
-                <a:cs typeface="Consolas"/>
-              </a:rPr>
-              <a:t>        } </a:t>
-            </a:r>
-            <a:r>
-              <a:rPr lang="en-US" b="1" dirty="0">
-                <a:latin typeface="Consolas"/>
-                <a:cs typeface="Consolas"/>
-              </a:rPr>
-              <a:t>else</a:t>
-            </a:r>
-            <a:r>
-              <a:rPr lang="en-US" dirty="0">
-                <a:latin typeface="Consolas"/>
-                <a:cs typeface="Consolas"/>
-              </a:rPr>
-              <a:t> {</a:t>
-            </a:r>
-          </a:p>
-          <a:p>
-            <a:pPr marL="0" indent="0">
-              <a:buNone/>
-            </a:pPr>
-            <a:r>
-              <a:rPr lang="en-US" dirty="0" smtClean="0">
-                <a:latin typeface="Consolas"/>
-                <a:cs typeface="Consolas"/>
-              </a:rPr>
-              <a:t>            CkPrintf</a:t>
-            </a:r>
-            <a:r>
-              <a:rPr lang="en-US" dirty="0">
-                <a:latin typeface="Consolas"/>
-                <a:cs typeface="Consolas"/>
-              </a:rPr>
-              <a:t>(”Fibonacci number is: %d\n”, val); </a:t>
-            </a:r>
-            <a:endParaRPr lang="en-US" dirty="0" smtClean="0">
+              <a:rPr lang="en-US" sz="1400" dirty="0">
+                <a:latin typeface="Consolas"/>
+                <a:cs typeface="Consolas"/>
+              </a:rPr>
+              <a:t> </a:t>
+            </a:r>
+            <a:r>
+              <a:rPr lang="en-US" sz="1400" dirty="0" smtClean="0">
+                <a:latin typeface="Consolas"/>
+                <a:cs typeface="Consolas"/>
+              </a:rPr>
+              <a:t>     </a:t>
+            </a:r>
+            <a:r>
+              <a:rPr lang="en-US" sz="1400" dirty="0" err="1" smtClean="0">
+                <a:latin typeface="Consolas"/>
+                <a:cs typeface="Consolas"/>
+              </a:rPr>
+              <a:t>CkExit</a:t>
+            </a:r>
+            <a:r>
+              <a:rPr lang="en-US" sz="1400" dirty="0">
+                <a:latin typeface="Consolas"/>
+                <a:cs typeface="Consolas"/>
+              </a:rPr>
+              <a:t>()</a:t>
+            </a:r>
+            <a:r>
+              <a:rPr lang="en-US" sz="1400" dirty="0" smtClean="0">
+                <a:latin typeface="Consolas"/>
+                <a:cs typeface="Consolas"/>
+              </a:rPr>
+              <a:t>; } } };</a:t>
+            </a:r>
+            <a:endParaRPr lang="en-US" sz="1400" dirty="0">
               <a:latin typeface="Consolas"/>
               <a:cs typeface="Consolas"/>
             </a:endParaRPr>
@@ -10955,99 +11112,27 @@
               <a:buNone/>
             </a:pPr>
             <a:r>
-              <a:rPr lang="en-US" dirty="0">
-                <a:latin typeface="Consolas"/>
-                <a:cs typeface="Consolas"/>
-              </a:rPr>
-              <a:t> </a:t>
-            </a:r>
-            <a:r>
-              <a:rPr lang="en-US" dirty="0" smtClean="0">
-                <a:latin typeface="Consolas"/>
-                <a:cs typeface="Consolas"/>
-              </a:rPr>
-              <a:t>           CkExit</a:t>
-            </a:r>
-            <a:r>
-              <a:rPr lang="en-US" dirty="0">
-                <a:latin typeface="Consolas"/>
-                <a:cs typeface="Consolas"/>
-              </a:rPr>
-              <a:t>();</a:t>
-            </a:r>
-          </a:p>
-          <a:p>
-            <a:pPr marL="0" indent="0">
-              <a:buNone/>
-            </a:pPr>
-            <a:r>
-              <a:rPr lang="en-US" dirty="0" smtClean="0">
-                <a:latin typeface="Consolas"/>
-                <a:cs typeface="Consolas"/>
-              </a:rPr>
-              <a:t>        }</a:t>
-            </a:r>
-            <a:endParaRPr lang="en-US" dirty="0">
-              <a:latin typeface="Consolas"/>
-              <a:cs typeface="Consolas"/>
-            </a:endParaRPr>
-          </a:p>
-          <a:p>
-            <a:pPr marL="0" indent="0">
-              <a:buNone/>
-            </a:pPr>
-            <a:r>
-              <a:rPr lang="en-US" dirty="0" smtClean="0">
-                <a:latin typeface="Consolas"/>
-                <a:cs typeface="Consolas"/>
-              </a:rPr>
-              <a:t>    }</a:t>
-            </a:r>
-            <a:endParaRPr lang="en-US" dirty="0">
-              <a:latin typeface="Consolas"/>
-              <a:cs typeface="Consolas"/>
-            </a:endParaRPr>
-          </a:p>
-          <a:p>
-            <a:pPr marL="0" indent="0">
-              <a:buNone/>
-            </a:pPr>
-            <a:r>
-              <a:rPr lang="en-US" dirty="0" smtClean="0">
-                <a:latin typeface="Consolas"/>
-                <a:cs typeface="Consolas"/>
-              </a:rPr>
-              <a:t>};</a:t>
-            </a:r>
-          </a:p>
-          <a:p>
-            <a:pPr marL="0" indent="0">
-              <a:buNone/>
-            </a:pPr>
-            <a:endParaRPr lang="en-US" dirty="0" smtClean="0">
-              <a:latin typeface="Consolas"/>
-              <a:cs typeface="Consolas"/>
-            </a:endParaRPr>
-          </a:p>
-          <a:p>
-            <a:pPr marL="0" indent="0">
-              <a:buNone/>
-            </a:pPr>
-            <a:r>
-              <a:rPr lang="en-US" b="1" dirty="0" smtClean="0">
-                <a:latin typeface="Consolas"/>
-                <a:cs typeface="Consolas"/>
-              </a:rPr>
-              <a:t>#include </a:t>
-            </a:r>
-            <a:r>
-              <a:rPr lang="en-US" dirty="0" smtClean="0">
+              <a:rPr lang="en-US" sz="1400" b="1" dirty="0" smtClean="0">
+                <a:latin typeface="Consolas"/>
+                <a:cs typeface="Consolas"/>
+              </a:rPr>
+              <a:t>#</a:t>
+            </a:r>
+            <a:r>
+              <a:rPr lang="en-US" sz="1400" b="1" dirty="0" smtClean="0">
+                <a:latin typeface="Consolas"/>
+                <a:cs typeface="Consolas"/>
+              </a:rPr>
+              <a:t>include </a:t>
+            </a:r>
+            <a:r>
+              <a:rPr lang="en-US" sz="1400" dirty="0" smtClean="0">
                 <a:latin typeface="Consolas"/>
                 <a:cs typeface="Consolas"/>
               </a:rPr>
               <a:t>“fib.def.h”</a:t>
             </a:r>
-            <a:endParaRPr lang="en-US" dirty="0">
+            <a:endParaRPr lang="en-US" sz="1400" dirty="0">
               <a:latin typeface="Consolas"/>
               <a:cs typeface="Consolas"/>
             </a:endParaRPr>
@@ -11243,7 +11328,7 @@
     </p:spTree>
     <p:extLst>
       <p:ext uri="{BB962C8B-B14F-4D97-AF65-F5344CB8AC3E}">
-        <p14:creationId xmlns:p14="http://schemas.microsoft.com/office/powerpoint/2010/main" val="1750658510"/>
+        <p14:creationId xmlns:p14="http://schemas.microsoft.com/office/powerpoint/2010/main" val="917841477"/>
       </p:ext>
     </p:extLst>
   </p:cSld>

</xml_diff>

<commit_message>
tut 7: Convert jacobi from 3d to 2d
</commit_message>
<xml_diff>
--- a/tutorial-07-sdag.pptx
+++ b/tutorial-07-sdag.pptx
@@ -40,7 +40,7 @@
     <p:sldId id="282" r:id="rId28"/>
     <p:sldId id="283" r:id="rId29"/>
     <p:sldId id="284" r:id="rId30"/>
-    <p:sldId id="285" r:id="rId31"/>
+    <p:sldId id="347" r:id="rId31"/>
     <p:sldId id="286" r:id="rId32"/>
     <p:sldId id="287" r:id="rId33"/>
     <p:sldId id="288" r:id="rId34"/>
@@ -10410,14 +10410,7 @@
                 <a:latin typeface="Consolas"/>
                 <a:cs typeface="Consolas"/>
               </a:rPr>
-              <a:t>()); </a:t>
-            </a:r>
-            <a:r>
-              <a:rPr lang="en-US" sz="1400" dirty="0">
-                <a:latin typeface="Consolas"/>
-                <a:cs typeface="Consolas"/>
-              </a:rPr>
-              <a:t>} }</a:t>
+              <a:t>()); } }</a:t>
             </a:r>
             <a:r>
               <a:rPr lang="en-US" sz="1400" dirty="0" smtClean="0">
@@ -10566,6 +10559,352 @@
               </a:rPr>
               <a:t>;</a:t>
             </a:r>
+          </a:p>
+          <a:p>
+            <a:pPr marL="0" indent="0">
+              <a:buNone/>
+            </a:pPr>
+            <a:r>
+              <a:rPr lang="en-US" sz="1400" dirty="0" smtClean="0">
+                <a:latin typeface="Consolas"/>
+                <a:cs typeface="Consolas"/>
+              </a:rPr>
+              <a:t>  Fib</a:t>
+            </a:r>
+            <a:r>
+              <a:rPr lang="en-US" sz="1400" dirty="0">
+                <a:latin typeface="Consolas"/>
+                <a:cs typeface="Consolas"/>
+              </a:rPr>
+              <a:t>(</a:t>
+            </a:r>
+            <a:r>
+              <a:rPr lang="en-US" sz="1400" b="1" dirty="0">
+                <a:latin typeface="Consolas"/>
+                <a:cs typeface="Consolas"/>
+              </a:rPr>
+              <a:t>int </a:t>
+            </a:r>
+            <a:r>
+              <a:rPr lang="en-US" sz="1400" dirty="0">
+                <a:latin typeface="Consolas"/>
+                <a:cs typeface="Consolas"/>
+              </a:rPr>
+              <a:t>n</a:t>
+            </a:r>
+            <a:r>
+              <a:rPr lang="en-US" sz="1400" dirty="0" smtClean="0">
+                <a:latin typeface="Consolas"/>
+                <a:cs typeface="Consolas"/>
+              </a:rPr>
+              <a:t>, </a:t>
+            </a:r>
+            <a:r>
+              <a:rPr lang="en-US" sz="1400" b="1" dirty="0" err="1" smtClean="0">
+                <a:latin typeface="Consolas"/>
+                <a:cs typeface="Consolas"/>
+              </a:rPr>
+              <a:t>bool</a:t>
+            </a:r>
+            <a:r>
+              <a:rPr lang="en-US" sz="1400" b="1" dirty="0" smtClean="0">
+                <a:latin typeface="Consolas"/>
+                <a:cs typeface="Consolas"/>
+              </a:rPr>
+              <a:t> </a:t>
+            </a:r>
+            <a:r>
+              <a:rPr lang="en-US" sz="1400" dirty="0" smtClean="0">
+                <a:latin typeface="Consolas"/>
+                <a:cs typeface="Consolas"/>
+              </a:rPr>
+              <a:t>isRoot_, CProxy_Fib parent_):parent</a:t>
+            </a:r>
+            <a:r>
+              <a:rPr lang="en-US" sz="1400" dirty="0">
+                <a:latin typeface="Consolas"/>
+                <a:cs typeface="Consolas"/>
+              </a:rPr>
+              <a:t>(</a:t>
+            </a:r>
+            <a:r>
+              <a:rPr lang="en-US" sz="1400" dirty="0" smtClean="0">
+                <a:latin typeface="Consolas"/>
+                <a:cs typeface="Consolas"/>
+              </a:rPr>
+              <a:t>parent_)</a:t>
+            </a:r>
+            <a:r>
+              <a:rPr lang="en-US" sz="1400" dirty="0">
+                <a:latin typeface="Consolas"/>
+                <a:cs typeface="Consolas"/>
+              </a:rPr>
+              <a:t>, isRoot(</a:t>
+            </a:r>
+            <a:r>
+              <a:rPr lang="en-US" sz="1400" dirty="0" err="1" smtClean="0">
+                <a:latin typeface="Consolas"/>
+                <a:cs typeface="Consolas"/>
+              </a:rPr>
+              <a:t>isRoot</a:t>
+            </a:r>
+            <a:r>
+              <a:rPr lang="en-US" sz="1400" dirty="0" smtClean="0">
+                <a:latin typeface="Consolas"/>
+                <a:cs typeface="Consolas"/>
+              </a:rPr>
+              <a:t>_){</a:t>
+            </a:r>
+            <a:endParaRPr lang="en-US" sz="1400" dirty="0">
+              <a:latin typeface="Consolas"/>
+              <a:cs typeface="Consolas"/>
+            </a:endParaRPr>
+          </a:p>
+          <a:p>
+            <a:pPr marL="0" indent="0">
+              <a:buNone/>
+            </a:pPr>
+            <a:r>
+              <a:rPr lang="en-US" sz="1400" dirty="0" smtClean="0">
+                <a:latin typeface="Consolas"/>
+                <a:cs typeface="Consolas"/>
+              </a:rPr>
+              <a:t>  </a:t>
+            </a:r>
+            <a:r>
+              <a:rPr lang="en-US" sz="1400" dirty="0">
+                <a:latin typeface="Consolas"/>
+                <a:cs typeface="Consolas"/>
+              </a:rPr>
+              <a:t> </a:t>
+            </a:r>
+            <a:r>
+              <a:rPr lang="en-US" sz="1400" dirty="0" smtClean="0">
+                <a:latin typeface="Consolas"/>
+                <a:cs typeface="Consolas"/>
+              </a:rPr>
+              <a:t> </a:t>
+            </a:r>
+            <a:r>
+              <a:rPr lang="en-US" sz="1400" dirty="0" err="1" smtClean="0">
+                <a:latin typeface="Consolas"/>
+                <a:cs typeface="Consolas"/>
+              </a:rPr>
+              <a:t>calc</a:t>
+            </a:r>
+            <a:r>
+              <a:rPr lang="en-US" sz="1400" dirty="0">
+                <a:latin typeface="Consolas"/>
+                <a:cs typeface="Consolas"/>
+              </a:rPr>
+              <a:t>(n)</a:t>
+            </a:r>
+            <a:r>
+              <a:rPr lang="en-US" sz="1400" dirty="0" smtClean="0">
+                <a:latin typeface="Consolas"/>
+                <a:cs typeface="Consolas"/>
+              </a:rPr>
+              <a:t>; }</a:t>
+            </a:r>
+          </a:p>
+          <a:p>
+            <a:pPr marL="0" indent="0">
+              <a:buNone/>
+            </a:pPr>
+            <a:r>
+              <a:rPr lang="en-US" sz="1400" dirty="0" smtClean="0">
+                <a:latin typeface="Consolas"/>
+                <a:cs typeface="Consolas"/>
+              </a:rPr>
+              <a:t>  </a:t>
+            </a:r>
+            <a:r>
+              <a:rPr lang="en-US" sz="1400" b="1" dirty="0" err="1" smtClean="0">
+                <a:latin typeface="Consolas"/>
+                <a:cs typeface="Consolas"/>
+              </a:rPr>
+              <a:t>int</a:t>
+            </a:r>
+            <a:r>
+              <a:rPr lang="en-US" sz="1400" b="1" dirty="0" smtClean="0">
+                <a:latin typeface="Consolas"/>
+                <a:cs typeface="Consolas"/>
+              </a:rPr>
+              <a:t> </a:t>
+            </a:r>
+            <a:r>
+              <a:rPr lang="en-US" sz="1400" dirty="0">
+                <a:latin typeface="Consolas"/>
+                <a:cs typeface="Consolas"/>
+              </a:rPr>
+              <a:t>seqFib(</a:t>
+            </a:r>
+            <a:r>
+              <a:rPr lang="en-US" sz="1400" b="1" dirty="0">
+                <a:latin typeface="Consolas"/>
+                <a:cs typeface="Consolas"/>
+              </a:rPr>
+              <a:t>int </a:t>
+            </a:r>
+            <a:r>
+              <a:rPr lang="en-US" sz="1400" dirty="0">
+                <a:latin typeface="Consolas"/>
+                <a:cs typeface="Consolas"/>
+              </a:rPr>
+              <a:t>n) { </a:t>
+            </a:r>
+            <a:r>
+              <a:rPr lang="en-US" sz="1400" b="1" dirty="0">
+                <a:latin typeface="Consolas"/>
+                <a:cs typeface="Consolas"/>
+              </a:rPr>
+              <a:t>return </a:t>
+            </a:r>
+            <a:r>
+              <a:rPr lang="en-US" sz="1400" dirty="0">
+                <a:latin typeface="Consolas"/>
+                <a:cs typeface="Consolas"/>
+              </a:rPr>
+              <a:t>(n &lt; 2) ? n : seqFib(n − 1) + seqFib(n − 2); </a:t>
+            </a:r>
+            <a:r>
+              <a:rPr lang="en-US" sz="1400" dirty="0" smtClean="0">
+                <a:latin typeface="Consolas"/>
+                <a:cs typeface="Consolas"/>
+              </a:rPr>
+              <a:t>}</a:t>
+            </a:r>
+            <a:endParaRPr lang="en-US" sz="1400" dirty="0">
+              <a:latin typeface="Consolas"/>
+              <a:cs typeface="Consolas"/>
+            </a:endParaRPr>
+          </a:p>
+          <a:p>
+            <a:pPr marL="0" indent="0">
+              <a:buNone/>
+            </a:pPr>
+            <a:r>
+              <a:rPr lang="en-US" sz="1400" dirty="0" smtClean="0">
+                <a:latin typeface="Consolas"/>
+                <a:cs typeface="Consolas"/>
+              </a:rPr>
+              <a:t>  </a:t>
+            </a:r>
+            <a:r>
+              <a:rPr lang="en-US" sz="1400" b="1" dirty="0" smtClean="0">
+                <a:latin typeface="Consolas"/>
+                <a:cs typeface="Consolas"/>
+              </a:rPr>
+              <a:t>void </a:t>
+            </a:r>
+            <a:r>
+              <a:rPr lang="en-US" sz="1400" dirty="0">
+                <a:latin typeface="Consolas"/>
+                <a:cs typeface="Consolas"/>
+              </a:rPr>
+              <a:t>respond(</a:t>
+            </a:r>
+            <a:r>
+              <a:rPr lang="en-US" sz="1400" b="1" dirty="0">
+                <a:latin typeface="Consolas"/>
+                <a:cs typeface="Consolas"/>
+              </a:rPr>
+              <a:t>int </a:t>
+            </a:r>
+            <a:r>
+              <a:rPr lang="en-US" sz="1400" dirty="0">
+                <a:latin typeface="Consolas"/>
+                <a:cs typeface="Consolas"/>
+              </a:rPr>
+              <a:t>val) {</a:t>
+            </a:r>
+          </a:p>
+          <a:p>
+            <a:pPr marL="0" indent="0">
+              <a:buNone/>
+            </a:pPr>
+            <a:r>
+              <a:rPr lang="en-US" sz="1400" dirty="0" smtClean="0">
+                <a:latin typeface="Consolas"/>
+                <a:cs typeface="Consolas"/>
+              </a:rPr>
+              <a:t>  </a:t>
+            </a:r>
+            <a:r>
+              <a:rPr lang="en-US" sz="1400" dirty="0">
+                <a:latin typeface="Consolas"/>
+                <a:cs typeface="Consolas"/>
+              </a:rPr>
+              <a:t> </a:t>
+            </a:r>
+            <a:r>
+              <a:rPr lang="en-US" sz="1400" dirty="0" smtClean="0">
+                <a:latin typeface="Consolas"/>
+                <a:cs typeface="Consolas"/>
+              </a:rPr>
+              <a:t> </a:t>
+            </a:r>
+            <a:r>
+              <a:rPr lang="en-US" sz="1400" b="1" dirty="0" smtClean="0">
+                <a:latin typeface="Consolas"/>
+                <a:cs typeface="Consolas"/>
+              </a:rPr>
+              <a:t>if </a:t>
+            </a:r>
+            <a:r>
+              <a:rPr lang="en-US" sz="1400" dirty="0">
+                <a:latin typeface="Consolas"/>
+                <a:cs typeface="Consolas"/>
+              </a:rPr>
+              <a:t>(!</a:t>
+            </a:r>
+            <a:r>
+              <a:rPr lang="en-US" sz="1400" dirty="0" err="1">
+                <a:latin typeface="Consolas"/>
+                <a:cs typeface="Consolas"/>
+              </a:rPr>
+              <a:t>isRoot</a:t>
+            </a:r>
+            <a:r>
+              <a:rPr lang="en-US" sz="1400" dirty="0" smtClean="0">
+                <a:latin typeface="Consolas"/>
+                <a:cs typeface="Consolas"/>
+              </a:rPr>
+              <a:t>) { </a:t>
+            </a:r>
+          </a:p>
+          <a:p>
+            <a:pPr marL="0" indent="0">
+              <a:buNone/>
+            </a:pPr>
+            <a:r>
+              <a:rPr lang="en-US" sz="1400" dirty="0">
+                <a:latin typeface="Consolas"/>
+                <a:cs typeface="Consolas"/>
+              </a:rPr>
+              <a:t> </a:t>
+            </a:r>
+            <a:r>
+              <a:rPr lang="en-US" sz="1400" dirty="0" smtClean="0">
+                <a:latin typeface="Consolas"/>
+                <a:cs typeface="Consolas"/>
+              </a:rPr>
+              <a:t>     </a:t>
+            </a:r>
+            <a:r>
+              <a:rPr lang="en-US" sz="1400" dirty="0" err="1" smtClean="0">
+                <a:latin typeface="Consolas"/>
+                <a:cs typeface="Consolas"/>
+              </a:rPr>
+              <a:t>parent.response</a:t>
+            </a:r>
+            <a:r>
+              <a:rPr lang="en-US" sz="1400" dirty="0">
+                <a:latin typeface="Consolas"/>
+                <a:cs typeface="Consolas"/>
+              </a:rPr>
+              <a:t>(val); </a:t>
+            </a:r>
             <a:endParaRPr lang="en-US" sz="1400" dirty="0" smtClean="0">
               <a:latin typeface="Consolas"/>
               <a:cs typeface="Consolas"/>
@@ -10576,49 +10915,80 @@
               <a:buNone/>
             </a:pPr>
             <a:r>
+              <a:rPr lang="en-US" sz="1400" dirty="0">
+                <a:latin typeface="Consolas"/>
+                <a:cs typeface="Consolas"/>
+              </a:rPr>
+              <a:t> </a:t>
+            </a:r>
+            <a:r>
               <a:rPr lang="en-US" sz="1400" dirty="0" smtClean="0">
                 <a:latin typeface="Consolas"/>
                 <a:cs typeface="Consolas"/>
               </a:rPr>
-              <a:t>  Fib</a:t>
+              <a:t>     </a:t>
+            </a:r>
+            <a:r>
+              <a:rPr lang="en-US" sz="1400" b="1" dirty="0" smtClean="0">
+                <a:latin typeface="Consolas"/>
+                <a:cs typeface="Consolas"/>
+              </a:rPr>
+              <a:t>delete </a:t>
+            </a:r>
+            <a:r>
+              <a:rPr lang="en-US" sz="1400" b="1" dirty="0">
+                <a:latin typeface="Consolas"/>
+                <a:cs typeface="Consolas"/>
+              </a:rPr>
+              <a:t>this</a:t>
             </a:r>
             <a:r>
               <a:rPr lang="en-US" sz="1400" dirty="0">
                 <a:latin typeface="Consolas"/>
                 <a:cs typeface="Consolas"/>
               </a:rPr>
-              <a:t>(</a:t>
+              <a:t>;</a:t>
+            </a:r>
+          </a:p>
+          <a:p>
+            <a:pPr marL="0" indent="0">
+              <a:buNone/>
+            </a:pPr>
+            <a:r>
+              <a:rPr lang="en-US" sz="1400" dirty="0" smtClean="0">
+                <a:latin typeface="Consolas"/>
+                <a:cs typeface="Consolas"/>
+              </a:rPr>
+              <a:t>    } </a:t>
             </a:r>
             <a:r>
               <a:rPr lang="en-US" sz="1400" b="1" dirty="0">
                 <a:latin typeface="Consolas"/>
                 <a:cs typeface="Consolas"/>
               </a:rPr>
-              <a:t>int </a:t>
+              <a:t>else</a:t>
             </a:r>
             <a:r>
               <a:rPr lang="en-US" sz="1400" dirty="0">
                 <a:latin typeface="Consolas"/>
                 <a:cs typeface="Consolas"/>
               </a:rPr>
-              <a:t>n</a:t>
-            </a:r>
+              <a:t> {</a:t>
+            </a:r>
+          </a:p>
+          <a:p>
+            <a:pPr marL="0" indent="0">
+              <a:buNone/>
+            </a:pPr>
             <a:r>
               <a:rPr lang="en-US" sz="1400" dirty="0" smtClean="0">
                 <a:latin typeface="Consolas"/>
                 <a:cs typeface="Consolas"/>
               </a:rPr>
-              <a:t>, </a:t>
-            </a:r>
-            <a:r>
-              <a:rPr lang="en-US" sz="1400" b="1" dirty="0" err="1" smtClean="0">
-                <a:latin typeface="Consolas"/>
-                <a:cs typeface="Consolas"/>
-              </a:rPr>
-              <a:t>bool</a:t>
-            </a:r>
-            <a:r>
-              <a:rPr lang="en-US" sz="1400" b="1" dirty="0" smtClean="0">
+              <a:t>    </a:t>
+            </a:r>
+            <a:r>
+              <a:rPr lang="en-US" sz="1400" dirty="0">
                 <a:latin typeface="Consolas"/>
                 <a:cs typeface="Consolas"/>
               </a:rPr>
@@ -10629,56 +10999,65 @@
                 <a:latin typeface="Consolas"/>
                 <a:cs typeface="Consolas"/>
               </a:rPr>
-              <a:t>isRoot_, CProxy_Fib parent_</a:t>
+              <a:t> </a:t>
+            </a:r>
+            <a:r>
+              <a:rPr lang="en-US" sz="1400" dirty="0" err="1" smtClean="0">
+                <a:latin typeface="Consolas"/>
+                <a:cs typeface="Consolas"/>
+              </a:rPr>
+              <a:t>CkPrintf</a:t>
+            </a:r>
+            <a:r>
+              <a:rPr lang="en-US" sz="1400" dirty="0">
+                <a:latin typeface="Consolas"/>
+                <a:cs typeface="Consolas"/>
+              </a:rPr>
+              <a:t>(”Fibonacci number is: %d\n”, val); </a:t>
+            </a:r>
+            <a:endParaRPr lang="en-US" sz="1400" dirty="0" smtClean="0">
+              <a:latin typeface="Consolas"/>
+              <a:cs typeface="Consolas"/>
+            </a:endParaRPr>
+          </a:p>
+          <a:p>
+            <a:pPr marL="0" indent="0">
+              <a:buNone/>
+            </a:pPr>
+            <a:r>
+              <a:rPr lang="en-US" sz="1400" dirty="0">
+                <a:latin typeface="Consolas"/>
+                <a:cs typeface="Consolas"/>
+              </a:rPr>
+              <a:t> </a:t>
             </a:r>
             <a:r>
               <a:rPr lang="en-US" sz="1400" dirty="0" smtClean="0">
                 <a:latin typeface="Consolas"/>
                 <a:cs typeface="Consolas"/>
               </a:rPr>
-              <a:t>):parent</a:t>
+              <a:t>     </a:t>
+            </a:r>
+            <a:r>
+              <a:rPr lang="en-US" sz="1400" dirty="0" err="1" smtClean="0">
+                <a:latin typeface="Consolas"/>
+                <a:cs typeface="Consolas"/>
+              </a:rPr>
+              <a:t>CkExit</a:t>
             </a:r>
             <a:r>
               <a:rPr lang="en-US" sz="1400" dirty="0">
                 <a:latin typeface="Consolas"/>
                 <a:cs typeface="Consolas"/>
               </a:rPr>
-              <a:t>(</a:t>
+              <a:t>()</a:t>
             </a:r>
             <a:r>
               <a:rPr lang="en-US" sz="1400" dirty="0" smtClean="0">
                 <a:latin typeface="Consolas"/>
                 <a:cs typeface="Consolas"/>
               </a:rPr>
-              <a:t>parent_)</a:t>
-            </a:r>
-            <a:r>
-              <a:rPr lang="en-US" sz="1400" dirty="0">
-                <a:latin typeface="Consolas"/>
-                <a:cs typeface="Consolas"/>
-              </a:rPr>
-              <a:t>, isRoot(</a:t>
-            </a:r>
-            <a:r>
-              <a:rPr lang="en-US" sz="1400" dirty="0" err="1" smtClean="0">
-                <a:latin typeface="Consolas"/>
-                <a:cs typeface="Consolas"/>
-              </a:rPr>
-              <a:t>isRoot</a:t>
-            </a:r>
-            <a:r>
-              <a:rPr lang="en-US" sz="1400" dirty="0" smtClean="0">
-                <a:latin typeface="Consolas"/>
-                <a:cs typeface="Consolas"/>
-              </a:rPr>
-              <a:t>_</a:t>
-            </a:r>
-            <a:r>
-              <a:rPr lang="en-US" sz="1400" dirty="0" smtClean="0">
-                <a:latin typeface="Consolas"/>
-                <a:cs typeface="Consolas"/>
-              </a:rPr>
-              <a:t>){</a:t>
+              <a:t>; } } };</a:t>
             </a:r>
             <a:endParaRPr lang="en-US" sz="1400" dirty="0">
               <a:latin typeface="Consolas"/>
@@ -10690,440 +11069,11 @@
               <a:buNone/>
             </a:pPr>
             <a:r>
-              <a:rPr lang="en-US" sz="1400" dirty="0" smtClean="0">
-                <a:latin typeface="Consolas"/>
-                <a:cs typeface="Consolas"/>
-              </a:rPr>
-              <a:t>  </a:t>
-            </a:r>
-            <a:r>
-              <a:rPr lang="en-US" sz="1400" dirty="0">
-                <a:latin typeface="Consolas"/>
-                <a:cs typeface="Consolas"/>
-              </a:rPr>
-              <a:t> </a:t>
-            </a:r>
-            <a:r>
-              <a:rPr lang="en-US" sz="1400" dirty="0" smtClean="0">
-                <a:latin typeface="Consolas"/>
-                <a:cs typeface="Consolas"/>
-              </a:rPr>
-              <a:t> </a:t>
-            </a:r>
-            <a:r>
-              <a:rPr lang="en-US" sz="1400" dirty="0" err="1" smtClean="0">
-                <a:latin typeface="Consolas"/>
-                <a:cs typeface="Consolas"/>
-              </a:rPr>
-              <a:t>calc</a:t>
-            </a:r>
-            <a:r>
-              <a:rPr lang="en-US" sz="1400" dirty="0">
-                <a:latin typeface="Consolas"/>
-                <a:cs typeface="Consolas"/>
-              </a:rPr>
-              <a:t>(n)</a:t>
-            </a:r>
-            <a:r>
-              <a:rPr lang="en-US" sz="1400" dirty="0" smtClean="0">
-                <a:latin typeface="Consolas"/>
-                <a:cs typeface="Consolas"/>
-              </a:rPr>
-              <a:t>; }</a:t>
-            </a:r>
-          </a:p>
-          <a:p>
-            <a:pPr marL="0" indent="0">
-              <a:buNone/>
-            </a:pPr>
-            <a:r>
-              <a:rPr lang="en-US" sz="1400" dirty="0" smtClean="0">
-                <a:latin typeface="Consolas"/>
-                <a:cs typeface="Consolas"/>
-              </a:rPr>
-              <a:t>  </a:t>
-            </a:r>
-            <a:r>
-              <a:rPr lang="en-US" sz="1400" b="1" dirty="0" err="1" smtClean="0">
-                <a:latin typeface="Consolas"/>
-                <a:cs typeface="Consolas"/>
-              </a:rPr>
-              <a:t>int</a:t>
-            </a:r>
-            <a:r>
               <a:rPr lang="en-US" sz="1400" b="1" dirty="0" smtClean="0">
                 <a:latin typeface="Consolas"/>
                 <a:cs typeface="Consolas"/>
               </a:rPr>
-              <a:t> </a:t>
-            </a:r>
-            <a:r>
-              <a:rPr lang="en-US" sz="1400" dirty="0">
-                <a:latin typeface="Consolas"/>
-                <a:cs typeface="Consolas"/>
-              </a:rPr>
-              <a:t>seqFib(</a:t>
-            </a:r>
-            <a:r>
-              <a:rPr lang="en-US" sz="1400" b="1" dirty="0">
-                <a:latin typeface="Consolas"/>
-                <a:cs typeface="Consolas"/>
-              </a:rPr>
-              <a:t>int </a:t>
-            </a:r>
-            <a:r>
-              <a:rPr lang="en-US" sz="1400" dirty="0">
-                <a:latin typeface="Consolas"/>
-                <a:cs typeface="Consolas"/>
-              </a:rPr>
-              <a:t>n) { </a:t>
-            </a:r>
-            <a:r>
-              <a:rPr lang="en-US" sz="1400" b="1" dirty="0">
-                <a:latin typeface="Consolas"/>
-                <a:cs typeface="Consolas"/>
-              </a:rPr>
-              <a:t>return </a:t>
-            </a:r>
-            <a:r>
-              <a:rPr lang="en-US" sz="1400" dirty="0">
-                <a:latin typeface="Consolas"/>
-                <a:cs typeface="Consolas"/>
-              </a:rPr>
-              <a:t>(n &lt; 2) ? n : seqFib(n − 1) + seqFib(n − 2); </a:t>
-            </a:r>
-            <a:r>
-              <a:rPr lang="en-US" sz="1400" dirty="0" smtClean="0">
-                <a:latin typeface="Consolas"/>
-                <a:cs typeface="Consolas"/>
-              </a:rPr>
-              <a:t>}</a:t>
-            </a:r>
-            <a:endParaRPr lang="en-US" sz="1400" dirty="0">
-              <a:latin typeface="Consolas"/>
-              <a:cs typeface="Consolas"/>
-            </a:endParaRPr>
-          </a:p>
-          <a:p>
-            <a:pPr marL="0" indent="0">
-              <a:buNone/>
-            </a:pPr>
-            <a:r>
-              <a:rPr lang="en-US" sz="1400" dirty="0" smtClean="0">
-                <a:latin typeface="Consolas"/>
-                <a:cs typeface="Consolas"/>
-              </a:rPr>
-              <a:t>  </a:t>
-            </a:r>
-            <a:r>
-              <a:rPr lang="en-US" sz="1400" b="1" dirty="0" smtClean="0">
-                <a:latin typeface="Consolas"/>
-                <a:cs typeface="Consolas"/>
-              </a:rPr>
-              <a:t>void </a:t>
-            </a:r>
-            <a:r>
-              <a:rPr lang="en-US" sz="1400" dirty="0">
-                <a:latin typeface="Consolas"/>
-                <a:cs typeface="Consolas"/>
-              </a:rPr>
-              <a:t>respond(</a:t>
-            </a:r>
-            <a:r>
-              <a:rPr lang="en-US" sz="1400" b="1" dirty="0">
-                <a:latin typeface="Consolas"/>
-                <a:cs typeface="Consolas"/>
-              </a:rPr>
-              <a:t>int </a:t>
-            </a:r>
-            <a:r>
-              <a:rPr lang="en-US" sz="1400" dirty="0">
-                <a:latin typeface="Consolas"/>
-                <a:cs typeface="Consolas"/>
-              </a:rPr>
-              <a:t>val) {</a:t>
-            </a:r>
-          </a:p>
-          <a:p>
-            <a:pPr marL="0" indent="0">
-              <a:buNone/>
-            </a:pPr>
-            <a:r>
-              <a:rPr lang="en-US" sz="1400" dirty="0" smtClean="0">
-                <a:latin typeface="Consolas"/>
-                <a:cs typeface="Consolas"/>
-              </a:rPr>
-              <a:t>  </a:t>
-            </a:r>
-            <a:r>
-              <a:rPr lang="en-US" sz="1400" dirty="0">
-                <a:latin typeface="Consolas"/>
-                <a:cs typeface="Consolas"/>
-              </a:rPr>
-              <a:t> </a:t>
-            </a:r>
-            <a:r>
-              <a:rPr lang="en-US" sz="1400" dirty="0" smtClean="0">
-                <a:latin typeface="Consolas"/>
-                <a:cs typeface="Consolas"/>
-              </a:rPr>
-              <a:t> </a:t>
-            </a:r>
-            <a:r>
-              <a:rPr lang="en-US" sz="1400" b="1" dirty="0" smtClean="0">
-                <a:latin typeface="Consolas"/>
-                <a:cs typeface="Consolas"/>
-              </a:rPr>
-              <a:t>if </a:t>
-            </a:r>
-            <a:r>
-              <a:rPr lang="en-US" sz="1400" dirty="0">
-                <a:latin typeface="Consolas"/>
-                <a:cs typeface="Consolas"/>
-              </a:rPr>
-              <a:t>(!</a:t>
-            </a:r>
-            <a:r>
-              <a:rPr lang="en-US" sz="1400" dirty="0" err="1">
-                <a:latin typeface="Consolas"/>
-                <a:cs typeface="Consolas"/>
-              </a:rPr>
-              <a:t>isRoot</a:t>
-            </a:r>
-            <a:r>
-              <a:rPr lang="en-US" sz="1400" dirty="0" smtClean="0">
-                <a:latin typeface="Consolas"/>
-                <a:cs typeface="Consolas"/>
-              </a:rPr>
-              <a:t>) { </a:t>
-            </a:r>
-            <a:endParaRPr lang="en-US" sz="1400" dirty="0" smtClean="0">
-              <a:latin typeface="Consolas"/>
-              <a:cs typeface="Consolas"/>
-            </a:endParaRPr>
-          </a:p>
-          <a:p>
-            <a:pPr marL="0" indent="0">
-              <a:buNone/>
-            </a:pPr>
-            <a:r>
-              <a:rPr lang="en-US" sz="1400" dirty="0">
-                <a:latin typeface="Consolas"/>
-                <a:cs typeface="Consolas"/>
-              </a:rPr>
-              <a:t> </a:t>
-            </a:r>
-            <a:r>
-              <a:rPr lang="en-US" sz="1400" dirty="0" smtClean="0">
-                <a:latin typeface="Consolas"/>
-                <a:cs typeface="Consolas"/>
-              </a:rPr>
-              <a:t>   </a:t>
-            </a:r>
-            <a:r>
-              <a:rPr lang="en-US" sz="1400" dirty="0" smtClean="0">
-                <a:latin typeface="Consolas"/>
-                <a:cs typeface="Consolas"/>
-              </a:rPr>
-              <a:t>  </a:t>
-            </a:r>
-            <a:r>
-              <a:rPr lang="en-US" sz="1400" dirty="0" err="1" smtClean="0">
-                <a:latin typeface="Consolas"/>
-                <a:cs typeface="Consolas"/>
-              </a:rPr>
-              <a:t>parent.response</a:t>
-            </a:r>
-            <a:r>
-              <a:rPr lang="en-US" sz="1400" dirty="0">
-                <a:latin typeface="Consolas"/>
-                <a:cs typeface="Consolas"/>
-              </a:rPr>
-              <a:t>(val); </a:t>
-            </a:r>
-            <a:endParaRPr lang="en-US" sz="1400" dirty="0" smtClean="0">
-              <a:latin typeface="Consolas"/>
-              <a:cs typeface="Consolas"/>
-            </a:endParaRPr>
-          </a:p>
-          <a:p>
-            <a:pPr marL="0" indent="0">
-              <a:buNone/>
-            </a:pPr>
-            <a:r>
-              <a:rPr lang="en-US" sz="1400" dirty="0">
-                <a:latin typeface="Consolas"/>
-                <a:cs typeface="Consolas"/>
-              </a:rPr>
-              <a:t> </a:t>
-            </a:r>
-            <a:r>
-              <a:rPr lang="en-US" sz="1400" dirty="0" smtClean="0">
-                <a:latin typeface="Consolas"/>
-                <a:cs typeface="Consolas"/>
-              </a:rPr>
-              <a:t>     </a:t>
-            </a:r>
-            <a:r>
-              <a:rPr lang="en-US" sz="1400" b="1" dirty="0" smtClean="0">
-                <a:latin typeface="Consolas"/>
-                <a:cs typeface="Consolas"/>
-              </a:rPr>
-              <a:t>delete </a:t>
-            </a:r>
-            <a:r>
-              <a:rPr lang="en-US" sz="1400" b="1" dirty="0">
-                <a:latin typeface="Consolas"/>
-                <a:cs typeface="Consolas"/>
-              </a:rPr>
-              <a:t>this</a:t>
-            </a:r>
-            <a:r>
-              <a:rPr lang="en-US" sz="1400" dirty="0">
-                <a:latin typeface="Consolas"/>
-                <a:cs typeface="Consolas"/>
-              </a:rPr>
-              <a:t>;</a:t>
-            </a:r>
-          </a:p>
-          <a:p>
-            <a:pPr marL="0" indent="0">
-              <a:buNone/>
-            </a:pPr>
-            <a:r>
-              <a:rPr lang="en-US" sz="1400" dirty="0" smtClean="0">
-                <a:latin typeface="Consolas"/>
-                <a:cs typeface="Consolas"/>
-              </a:rPr>
-              <a:t>    </a:t>
-            </a:r>
-            <a:r>
-              <a:rPr lang="en-US" sz="1400" dirty="0" smtClean="0">
-                <a:latin typeface="Consolas"/>
-                <a:cs typeface="Consolas"/>
-              </a:rPr>
-              <a:t>} </a:t>
-            </a:r>
-            <a:r>
-              <a:rPr lang="en-US" sz="1400" b="1" dirty="0">
-                <a:latin typeface="Consolas"/>
-                <a:cs typeface="Consolas"/>
-              </a:rPr>
-              <a:t>else</a:t>
-            </a:r>
-            <a:r>
-              <a:rPr lang="en-US" sz="1400" dirty="0">
-                <a:latin typeface="Consolas"/>
-                <a:cs typeface="Consolas"/>
-              </a:rPr>
-              <a:t> {</a:t>
-            </a:r>
-          </a:p>
-          <a:p>
-            <a:pPr marL="0" indent="0">
-              <a:buNone/>
-            </a:pPr>
-            <a:r>
-              <a:rPr lang="en-US" sz="1400" dirty="0" smtClean="0">
-                <a:latin typeface="Consolas"/>
-                <a:cs typeface="Consolas"/>
-              </a:rPr>
-              <a:t>    </a:t>
-            </a:r>
-            <a:r>
-              <a:rPr lang="en-US" sz="1400" dirty="0">
-                <a:latin typeface="Consolas"/>
-                <a:cs typeface="Consolas"/>
-              </a:rPr>
-              <a:t> </a:t>
-            </a:r>
-            <a:r>
-              <a:rPr lang="en-US" sz="1400" dirty="0" smtClean="0">
-                <a:latin typeface="Consolas"/>
-                <a:cs typeface="Consolas"/>
-              </a:rPr>
-              <a:t> </a:t>
-            </a:r>
-            <a:r>
-              <a:rPr lang="en-US" sz="1400" dirty="0" err="1" smtClean="0">
-                <a:latin typeface="Consolas"/>
-                <a:cs typeface="Consolas"/>
-              </a:rPr>
-              <a:t>CkPrintf</a:t>
-            </a:r>
-            <a:r>
-              <a:rPr lang="en-US" sz="1400" dirty="0">
-                <a:latin typeface="Consolas"/>
-                <a:cs typeface="Consolas"/>
-              </a:rPr>
-              <a:t>(”Fibonacci number is: %d\n”, val); </a:t>
-            </a:r>
-            <a:endParaRPr lang="en-US" sz="1400" dirty="0" smtClean="0">
-              <a:latin typeface="Consolas"/>
-              <a:cs typeface="Consolas"/>
-            </a:endParaRPr>
-          </a:p>
-          <a:p>
-            <a:pPr marL="0" indent="0">
-              <a:buNone/>
-            </a:pPr>
-            <a:r>
-              <a:rPr lang="en-US" sz="1400" dirty="0">
-                <a:latin typeface="Consolas"/>
-                <a:cs typeface="Consolas"/>
-              </a:rPr>
-              <a:t> </a:t>
-            </a:r>
-            <a:r>
-              <a:rPr lang="en-US" sz="1400" dirty="0" smtClean="0">
-                <a:latin typeface="Consolas"/>
-                <a:cs typeface="Consolas"/>
-              </a:rPr>
-              <a:t>     </a:t>
-            </a:r>
-            <a:r>
-              <a:rPr lang="en-US" sz="1400" dirty="0" err="1" smtClean="0">
-                <a:latin typeface="Consolas"/>
-                <a:cs typeface="Consolas"/>
-              </a:rPr>
-              <a:t>CkExit</a:t>
-            </a:r>
-            <a:r>
-              <a:rPr lang="en-US" sz="1400" dirty="0">
-                <a:latin typeface="Consolas"/>
-                <a:cs typeface="Consolas"/>
-              </a:rPr>
-              <a:t>()</a:t>
-            </a:r>
-            <a:r>
-              <a:rPr lang="en-US" sz="1400" dirty="0" smtClean="0">
-                <a:latin typeface="Consolas"/>
-                <a:cs typeface="Consolas"/>
-              </a:rPr>
-              <a:t>; } } };</a:t>
-            </a:r>
-            <a:endParaRPr lang="en-US" sz="1400" dirty="0">
-              <a:latin typeface="Consolas"/>
-              <a:cs typeface="Consolas"/>
-            </a:endParaRPr>
-          </a:p>
-          <a:p>
-            <a:pPr marL="0" indent="0">
-              <a:buNone/>
-            </a:pPr>
-            <a:r>
-              <a:rPr lang="en-US" sz="1400" b="1" dirty="0" smtClean="0">
-                <a:latin typeface="Consolas"/>
-                <a:cs typeface="Consolas"/>
-              </a:rPr>
-              <a:t>#</a:t>
-            </a:r>
-            <a:r>
-              <a:rPr lang="en-US" sz="1400" b="1" dirty="0" smtClean="0">
-                <a:latin typeface="Consolas"/>
-                <a:cs typeface="Consolas"/>
-              </a:rPr>
-              <a:t>include </a:t>
+              <a:t>#include </a:t>
             </a:r>
             <a:r>
               <a:rPr lang="en-US" sz="1400" dirty="0" smtClean="0">
@@ -26956,18 +26906,32 @@
               <a:buNone/>
             </a:pPr>
             <a:r>
+              <a:rPr lang="en-US" sz="1600" b="1" dirty="0" err="1" smtClean="0">
+                <a:latin typeface="Consolas"/>
+                <a:cs typeface="Consolas"/>
+              </a:rPr>
+              <a:t>mainmodule</a:t>
+            </a:r>
+            <a:r>
               <a:rPr lang="en-US" sz="1600" b="1" dirty="0" smtClean="0">
                 <a:latin typeface="Consolas"/>
                 <a:cs typeface="Consolas"/>
               </a:rPr>
-              <a:t>mainmodule </a:t>
+              <a:t> </a:t>
+            </a:r>
+            <a:r>
+              <a:rPr lang="en-US" sz="1600" dirty="0" smtClean="0">
+                <a:latin typeface="Consolas"/>
+                <a:cs typeface="Consolas"/>
+              </a:rPr>
+              <a:t>jacobi2d </a:t>
             </a:r>
             <a:r>
               <a:rPr lang="en-US" sz="1600" dirty="0">
                 <a:latin typeface="Consolas"/>
                 <a:cs typeface="Consolas"/>
               </a:rPr>
-              <a:t>jacobi3d {</a:t>
+              <a:t>{</a:t>
             </a:r>
           </a:p>
           <a:p>
@@ -27150,11 +27114,18 @@
               <a:t>array </a:t>
             </a:r>
             <a:r>
+              <a:rPr lang="en-US" sz="1600" dirty="0" smtClean="0">
+                <a:latin typeface="Consolas"/>
+                <a:cs typeface="Consolas"/>
+              </a:rPr>
+              <a:t>[2D</a:t>
+            </a:r>
+            <a:r>
               <a:rPr lang="en-US" sz="1600" dirty="0">
                 <a:latin typeface="Consolas"/>
                 <a:cs typeface="Consolas"/>
               </a:rPr>
-              <a:t>[3D] Jacobi {</a:t>
+              <a:t>] Jacobi {</a:t>
             </a:r>
           </a:p>
           <a:p>
@@ -27258,46 +27229,46 @@
               <a:t>dir, </a:t>
             </a:r>
             <a:r>
+              <a:rPr lang="en-US" sz="1500" b="1" dirty="0" err="1">
+                <a:latin typeface="Consolas"/>
+                <a:cs typeface="Consolas"/>
+              </a:rPr>
+              <a:t>int</a:t>
+            </a:r>
+            <a:r>
               <a:rPr lang="en-US" sz="1500" b="1" dirty="0">
                 <a:latin typeface="Consolas"/>
                 <a:cs typeface="Consolas"/>
               </a:rPr>
-              <a:t>int </a:t>
+              <a:t> </a:t>
+            </a:r>
+            <a:r>
+              <a:rPr lang="en-US" sz="1500" dirty="0" smtClean="0">
+                <a:latin typeface="Consolas"/>
+                <a:cs typeface="Consolas"/>
+              </a:rPr>
+              <a:t>w, </a:t>
+            </a:r>
+            <a:r>
+              <a:rPr lang="en-US" sz="1500" b="1" dirty="0">
+                <a:latin typeface="Consolas"/>
+                <a:cs typeface="Consolas"/>
+              </a:rPr>
+              <a:t>double </a:t>
             </a:r>
             <a:r>
               <a:rPr lang="en-US" sz="1500" dirty="0">
                 <a:latin typeface="Consolas"/>
                 <a:cs typeface="Consolas"/>
               </a:rPr>
-              <a:t>w, </a:t>
-            </a:r>
-            <a:r>
-              <a:rPr lang="en-US" sz="1500" b="1" dirty="0">
-                <a:latin typeface="Consolas"/>
-                <a:cs typeface="Consolas"/>
-              </a:rPr>
-              <a:t>int </a:t>
-            </a:r>
-            <a:r>
-              <a:rPr lang="en-US" sz="1500" dirty="0">
-                <a:latin typeface="Consolas"/>
-                <a:cs typeface="Consolas"/>
-              </a:rPr>
-              <a:t>h, </a:t>
-            </a:r>
-            <a:r>
-              <a:rPr lang="en-US" sz="1500" b="1" dirty="0">
-                <a:latin typeface="Consolas"/>
-                <a:cs typeface="Consolas"/>
-              </a:rPr>
-              <a:t>double </a:t>
-            </a:r>
-            <a:r>
-              <a:rPr lang="en-US" sz="1500" dirty="0">
-                <a:latin typeface="Consolas"/>
-                <a:cs typeface="Consolas"/>
-              </a:rPr>
-              <a:t>gh[w∗h]</a:t>
+              <a:t>gh[</a:t>
+            </a:r>
+            <a:r>
+              <a:rPr lang="en-US" sz="1500" dirty="0" smtClean="0">
+                <a:latin typeface="Consolas"/>
+                <a:cs typeface="Consolas"/>
+              </a:rPr>
+              <a:t>w]</a:t>
             </a:r>
             <a:r>
               <a:rPr lang="en-US" sz="1600" dirty="0">
@@ -27531,7 +27502,7 @@
     </p:spTree>
     <p:extLst>
       <p:ext uri="{BB962C8B-B14F-4D97-AF65-F5344CB8AC3E}">
-        <p14:creationId xmlns:p14="http://schemas.microsoft.com/office/powerpoint/2010/main" val="3223411935"/>
+        <p14:creationId xmlns:p14="http://schemas.microsoft.com/office/powerpoint/2010/main" val="2224363419"/>
       </p:ext>
     </p:extLst>
   </p:cSld>
@@ -27772,7 +27743,28 @@
                 <a:latin typeface="Consolas"/>
                 <a:cs typeface="Consolas"/>
               </a:rPr>
-              <a:t>x = thisIndex.x, y = thisIndex.y, z = thisIndex.z;</a:t>
+              <a:t>x = thisIndex.x, y = </a:t>
+            </a:r>
+            <a:r>
+              <a:rPr lang="en-US" dirty="0" err="1" smtClean="0">
+                <a:latin typeface="Consolas"/>
+                <a:cs typeface="Consolas"/>
+              </a:rPr>
+              <a:t>thisIndex.y</a:t>
+            </a:r>
+            <a:r>
+              <a:rPr lang="en-US" dirty="0" smtClean="0">
+                <a:latin typeface="Consolas"/>
+                <a:cs typeface="Consolas"/>
+              </a:rPr>
+              <a:t>;</a:t>
+            </a:r>
+            <a:r>
+              <a:rPr lang="en-US" dirty="0">
+                <a:latin typeface="Consolas"/>
+                <a:cs typeface="Consolas"/>
+              </a:rPr>
+              <a:t/>
             </a:r>
             <a:br>
               <a:rPr lang="en-US" dirty="0">
@@ -27799,7 +27791,14 @@
                 <a:latin typeface="Consolas"/>
                 <a:cs typeface="Consolas"/>
               </a:rPr>
-              <a:t>bdX = blockDimX, bdY = blockDimY, bdZ = blockDimZ</a:t>
+              <a:t>bdX = blockDimX, bdY = </a:t>
+            </a:r>
+            <a:r>
+              <a:rPr lang="en-US" dirty="0" err="1" smtClean="0">
+                <a:latin typeface="Consolas"/>
+                <a:cs typeface="Consolas"/>
+              </a:rPr>
+              <a:t>blockDimY</a:t>
             </a:r>
             <a:r>
               <a:rPr lang="en-US" dirty="0" smtClean="0">
@@ -27807,46 +27806,6 @@
                 <a:cs typeface="Consolas"/>
               </a:rPr>
               <a:t>;</a:t>
-            </a:r>
-          </a:p>
-          <a:p>
-            <a:pPr marL="0" indent="0">
-              <a:buNone/>
-            </a:pPr>
-            <a:r>
-              <a:rPr lang="en-US" dirty="0">
-                <a:latin typeface="Consolas"/>
-                <a:cs typeface="Consolas"/>
-              </a:rPr>
-              <a:t> </a:t>
-            </a:r>
-            <a:r>
-              <a:rPr lang="en-US" dirty="0" smtClean="0">
-                <a:latin typeface="Consolas"/>
-                <a:cs typeface="Consolas"/>
-              </a:rPr>
-              <a:t>        thisProxy</a:t>
-            </a:r>
-            <a:r>
-              <a:rPr lang="en-US" dirty="0">
-                <a:latin typeface="Consolas"/>
-                <a:cs typeface="Consolas"/>
-              </a:rPr>
-              <a:t>(wrapX(</a:t>
-            </a:r>
-            <a:r>
-              <a:rPr lang="en-US" dirty="0" smtClean="0">
-                <a:latin typeface="Consolas"/>
-                <a:cs typeface="Consolas"/>
-              </a:rPr>
-              <a:t>x-1</a:t>
-            </a:r>
-            <a:r>
-              <a:rPr lang="en-US" dirty="0">
-                <a:latin typeface="Consolas"/>
-                <a:cs typeface="Consolas"/>
-              </a:rPr>
-              <a:t>),y,z).updateGhosts(iter, RIGHT, bdY, bdZ, rightGhost); </a:t>
             </a:r>
             <a:endParaRPr lang="en-US" dirty="0" smtClean="0">
               <a:latin typeface="Consolas"/>
@@ -27876,7 +27835,56 @@
                 <a:latin typeface="Consolas"/>
                 <a:cs typeface="Consolas"/>
               </a:rPr>
-              <a:t>(wrapX(x+1),y,z).updateGhosts(iter, LEFT, bdY, bdZ, leftGhost); </a:t>
+              <a:t>(wrapX(</a:t>
+            </a:r>
+            <a:r>
+              <a:rPr lang="en-US" dirty="0" smtClean="0">
+                <a:latin typeface="Consolas"/>
+                <a:cs typeface="Consolas"/>
+              </a:rPr>
+              <a:t>x-1</a:t>
+            </a:r>
+            <a:r>
+              <a:rPr lang="en-US" dirty="0">
+                <a:latin typeface="Consolas"/>
+                <a:cs typeface="Consolas"/>
+              </a:rPr>
+              <a:t>),</a:t>
+            </a:r>
+            <a:r>
+              <a:rPr lang="en-US" dirty="0" smtClean="0">
+                <a:latin typeface="Consolas"/>
+                <a:cs typeface="Consolas"/>
+              </a:rPr>
+              <a:t>y)</a:t>
+            </a:r>
+            <a:r>
+              <a:rPr lang="en-US" dirty="0">
+                <a:latin typeface="Consolas"/>
+                <a:cs typeface="Consolas"/>
+              </a:rPr>
+              <a:t>.updateGhosts(iter, RIGHT, </a:t>
+            </a:r>
+            <a:r>
+              <a:rPr lang="en-US" dirty="0" err="1" smtClean="0">
+                <a:latin typeface="Consolas"/>
+                <a:cs typeface="Consolas"/>
+              </a:rPr>
+              <a:t>bdY</a:t>
+            </a:r>
+            <a:r>
+              <a:rPr lang="en-US" dirty="0" smtClean="0">
+                <a:latin typeface="Consolas"/>
+                <a:cs typeface="Consolas"/>
+              </a:rPr>
+              <a:t>, </a:t>
+            </a:r>
+            <a:r>
+              <a:rPr lang="en-US" dirty="0">
+                <a:latin typeface="Consolas"/>
+                <a:cs typeface="Consolas"/>
+              </a:rPr>
+              <a:t>rightGhost); </a:t>
             </a:r>
             <a:endParaRPr lang="en-US" dirty="0" smtClean="0">
               <a:latin typeface="Consolas"/>
@@ -27906,21 +27914,42 @@
                 <a:latin typeface="Consolas"/>
                 <a:cs typeface="Consolas"/>
               </a:rPr>
-              <a:t>(x,wrapY(</a:t>
+              <a:t>(wrapX(x+1),</a:t>
             </a:r>
             <a:r>
               <a:rPr lang="en-US" dirty="0" smtClean="0">
                 <a:latin typeface="Consolas"/>
                 <a:cs typeface="Consolas"/>
               </a:rPr>
-              <a:t>y-1</a:t>
+              <a:t>y)</a:t>
             </a:r>
             <a:r>
               <a:rPr lang="en-US" dirty="0">
                 <a:latin typeface="Consolas"/>
                 <a:cs typeface="Consolas"/>
               </a:rPr>
-              <a:t>),z).updateGhosts(iter, TOP, bdX, bdZ, topGhost); </a:t>
+              <a:t>.updateGhosts(iter, LEFT, </a:t>
+            </a:r>
+            <a:r>
+              <a:rPr lang="en-US" dirty="0" err="1" smtClean="0">
+                <a:latin typeface="Consolas"/>
+                <a:cs typeface="Consolas"/>
+              </a:rPr>
+              <a:t>bdY</a:t>
+            </a:r>
+            <a:r>
+              <a:rPr lang="en-US" dirty="0" smtClean="0">
+                <a:latin typeface="Consolas"/>
+                <a:cs typeface="Consolas"/>
+              </a:rPr>
+              <a:t>, </a:t>
+            </a:r>
+            <a:r>
+              <a:rPr lang="en-US" dirty="0">
+                <a:latin typeface="Consolas"/>
+                <a:cs typeface="Consolas"/>
+              </a:rPr>
+              <a:t>leftGhost); </a:t>
             </a:r>
             <a:endParaRPr lang="en-US" dirty="0" smtClean="0">
               <a:latin typeface="Consolas"/>
@@ -27950,7 +27979,49 @@
                 <a:latin typeface="Consolas"/>
                 <a:cs typeface="Consolas"/>
               </a:rPr>
-              <a:t>(x,wrapY(y+1),z).updateGhosts(iter, BOTTOM, bdX, bdZ, bottomGhost); </a:t>
+              <a:t>(x,wrapY(</a:t>
+            </a:r>
+            <a:r>
+              <a:rPr lang="en-US" dirty="0" smtClean="0">
+                <a:latin typeface="Consolas"/>
+                <a:cs typeface="Consolas"/>
+              </a:rPr>
+              <a:t>y-1</a:t>
+            </a:r>
+            <a:r>
+              <a:rPr lang="en-US" dirty="0" smtClean="0">
+                <a:latin typeface="Consolas"/>
+                <a:cs typeface="Consolas"/>
+              </a:rPr>
+              <a:t>))</a:t>
+            </a:r>
+            <a:r>
+              <a:rPr lang="en-US" dirty="0">
+                <a:latin typeface="Consolas"/>
+                <a:cs typeface="Consolas"/>
+              </a:rPr>
+              <a:t>.updateGhosts(iter, TOP, </a:t>
+            </a:r>
+            <a:r>
+              <a:rPr lang="en-US" dirty="0" err="1" smtClean="0">
+                <a:latin typeface="Consolas"/>
+                <a:cs typeface="Consolas"/>
+              </a:rPr>
+              <a:t>bdX</a:t>
+            </a:r>
+            <a:r>
+              <a:rPr lang="en-US" dirty="0" smtClean="0">
+                <a:latin typeface="Consolas"/>
+                <a:cs typeface="Consolas"/>
+              </a:rPr>
+              <a:t>, </a:t>
+            </a:r>
+            <a:r>
+              <a:rPr lang="en-US" dirty="0">
+                <a:latin typeface="Consolas"/>
+                <a:cs typeface="Consolas"/>
+              </a:rPr>
+              <a:t>topGhost); </a:t>
             </a:r>
             <a:endParaRPr lang="en-US" dirty="0" smtClean="0">
               <a:latin typeface="Consolas"/>
@@ -27980,21 +28051,42 @@
                 <a:latin typeface="Consolas"/>
                 <a:cs typeface="Consolas"/>
               </a:rPr>
-              <a:t>(x,y,wrapZ(</a:t>
+              <a:t>(x,wrapY(y+1</a:t>
             </a:r>
             <a:r>
               <a:rPr lang="en-US" dirty="0" smtClean="0">
                 <a:latin typeface="Consolas"/>
                 <a:cs typeface="Consolas"/>
               </a:rPr>
-              <a:t>z-1</a:t>
+              <a:t>))</a:t>
             </a:r>
             <a:r>
               <a:rPr lang="en-US" dirty="0">
                 <a:latin typeface="Consolas"/>
                 <a:cs typeface="Consolas"/>
               </a:rPr>
-              <a:t>)).updateGhosts(iter, BACK, bdX, bdY, backGhost); </a:t>
+              <a:t>.updateGhosts(iter, BOTTOM, </a:t>
+            </a:r>
+            <a:r>
+              <a:rPr lang="en-US" dirty="0" err="1" smtClean="0">
+                <a:latin typeface="Consolas"/>
+                <a:cs typeface="Consolas"/>
+              </a:rPr>
+              <a:t>bdX</a:t>
+            </a:r>
+            <a:r>
+              <a:rPr lang="en-US" dirty="0" smtClean="0">
+                <a:latin typeface="Consolas"/>
+                <a:cs typeface="Consolas"/>
+              </a:rPr>
+              <a:t>, </a:t>
+            </a:r>
+            <a:r>
+              <a:rPr lang="en-US" dirty="0">
+                <a:latin typeface="Consolas"/>
+                <a:cs typeface="Consolas"/>
+              </a:rPr>
+              <a:t>bottomGhost); </a:t>
             </a:r>
             <a:endParaRPr lang="en-US" dirty="0" smtClean="0">
               <a:latin typeface="Consolas"/>
@@ -28017,56 +28109,40 @@
                 <a:latin typeface="Consolas"/>
                 <a:cs typeface="Consolas"/>
               </a:rPr>
-              <a:t>        thisProxy</a:t>
-            </a:r>
-            <a:r>
-              <a:rPr lang="en-US" dirty="0">
-                <a:latin typeface="Consolas"/>
-                <a:cs typeface="Consolas"/>
-              </a:rPr>
-              <a:t>(x,y,wrapZ(z+1)).updateGhosts(iter, FRONT, bdX, bdY, frontGhost); </a:t>
-            </a:r>
-            <a:endParaRPr lang="en-US" dirty="0" smtClean="0">
-              <a:latin typeface="Consolas"/>
-              <a:cs typeface="Consolas"/>
-            </a:endParaRPr>
+              <a:t>        </a:t>
+            </a:r>
+            <a:r>
+              <a:rPr lang="en-US" dirty="0" err="1" smtClean="0">
+                <a:latin typeface="Consolas"/>
+                <a:cs typeface="Consolas"/>
+              </a:rPr>
+              <a:t>freeBoundaries</a:t>
+            </a:r>
+            <a:r>
+              <a:rPr lang="en-US" dirty="0" smtClean="0">
+                <a:latin typeface="Consolas"/>
+                <a:cs typeface="Consolas"/>
+              </a:rPr>
+              <a:t>(); </a:t>
+            </a:r>
           </a:p>
           <a:p>
             <a:pPr marL="0" indent="0">
               <a:buNone/>
             </a:pPr>
             <a:r>
-              <a:rPr lang="en-US" dirty="0">
-                <a:latin typeface="Consolas"/>
-                <a:cs typeface="Consolas"/>
-              </a:rPr>
-              <a:t> </a:t>
-            </a:r>
-            <a:r>
               <a:rPr lang="en-US" dirty="0" smtClean="0">
                 <a:latin typeface="Consolas"/>
                 <a:cs typeface="Consolas"/>
               </a:rPr>
-              <a:t>        freeBoundaries</a:t>
-            </a:r>
-            <a:r>
-              <a:rPr lang="en-US" dirty="0">
-                <a:latin typeface="Consolas"/>
-                <a:cs typeface="Consolas"/>
-              </a:rPr>
-              <a:t>(); </a:t>
-            </a:r>
-          </a:p>
-          <a:p>
-            <a:pPr marL="0" indent="0">
-              <a:buNone/>
-            </a:pPr>
+              <a:t>      </a:t>
+            </a:r>
             <a:r>
               <a:rPr lang="en-US" dirty="0" smtClean="0">
                 <a:latin typeface="Consolas"/>
                 <a:cs typeface="Consolas"/>
               </a:rPr>
-              <a:t>      } </a:t>
+              <a:t>} </a:t>
             </a:r>
             <a:endParaRPr lang="en-US" dirty="0">
               <a:latin typeface="Consolas"/>
@@ -28096,7 +28172,21 @@
                 <a:latin typeface="Consolas"/>
                 <a:cs typeface="Consolas"/>
               </a:rPr>
-              <a:t>(remoteCount = 0; remoteCount &lt; 6; remoteCount++)</a:t>
+              <a:t>(remoteCount = 0; remoteCount &lt; </a:t>
+            </a:r>
+            <a:r>
+              <a:rPr lang="en-US" dirty="0" smtClean="0">
+                <a:latin typeface="Consolas"/>
+                <a:cs typeface="Consolas"/>
+              </a:rPr>
+              <a:t>4; </a:t>
+            </a:r>
+            <a:r>
+              <a:rPr lang="en-US" dirty="0">
+                <a:latin typeface="Consolas"/>
+                <a:cs typeface="Consolas"/>
+              </a:rPr>
+              <a:t>remoteCount++)</a:t>
             </a:r>
             <a:br>
               <a:rPr lang="en-US" dirty="0">
@@ -28154,79 +28244,100 @@
               <a:t>dir, </a:t>
             </a:r>
             <a:r>
+              <a:rPr lang="en-US" b="1" dirty="0" err="1">
+                <a:latin typeface="Consolas"/>
+                <a:cs typeface="Consolas"/>
+              </a:rPr>
+              <a:t>int</a:t>
+            </a:r>
+            <a:r>
               <a:rPr lang="en-US" b="1" dirty="0">
                 <a:latin typeface="Consolas"/>
                 <a:cs typeface="Consolas"/>
               </a:rPr>
-              <a:t>int </a:t>
+              <a:t> </a:t>
+            </a:r>
+            <a:r>
+              <a:rPr lang="en-US" dirty="0" smtClean="0">
+                <a:latin typeface="Consolas"/>
+                <a:cs typeface="Consolas"/>
+              </a:rPr>
+              <a:t>w, </a:t>
+            </a:r>
+            <a:r>
+              <a:rPr lang="en-US" b="1" dirty="0">
+                <a:latin typeface="Consolas"/>
+                <a:cs typeface="Consolas"/>
+              </a:rPr>
+              <a:t>double </a:t>
             </a:r>
             <a:r>
               <a:rPr lang="en-US" dirty="0">
                 <a:latin typeface="Consolas"/>
                 <a:cs typeface="Consolas"/>
               </a:rPr>
+              <a:t>buf[</a:t>
+            </a:r>
+            <a:r>
+              <a:rPr lang="en-US" dirty="0" smtClean="0">
+                <a:latin typeface="Consolas"/>
+                <a:cs typeface="Consolas"/>
+              </a:rPr>
+              <a:t>w]</a:t>
+            </a:r>
+            <a:r>
+              <a:rPr lang="en-US" dirty="0">
+                <a:latin typeface="Consolas"/>
+                <a:cs typeface="Consolas"/>
+              </a:rPr>
+              <a:t>) </a:t>
+            </a:r>
+            <a:r>
+              <a:rPr lang="en-US" b="1" dirty="0">
+                <a:latin typeface="Consolas"/>
+                <a:cs typeface="Consolas"/>
+              </a:rPr>
+              <a:t>serial </a:t>
+            </a:r>
+            <a:r>
+              <a:rPr lang="en-US" dirty="0">
+                <a:latin typeface="Consolas"/>
+                <a:cs typeface="Consolas"/>
+              </a:rPr>
+              <a:t>{ </a:t>
+            </a:r>
+          </a:p>
+          <a:p>
+            <a:pPr marL="0" indent="0">
+              <a:buNone/>
+            </a:pPr>
+            <a:r>
+              <a:rPr lang="en-US" dirty="0" smtClean="0">
+                <a:latin typeface="Consolas"/>
+                <a:cs typeface="Consolas"/>
+              </a:rPr>
+              <a:t>            updateBoundary</a:t>
+            </a:r>
+            <a:r>
+              <a:rPr lang="en-US" dirty="0">
+                <a:latin typeface="Consolas"/>
+                <a:cs typeface="Consolas"/>
+              </a:rPr>
+              <a:t>(dir, </a:t>
+            </a:r>
+            <a:r>
+              <a:rPr lang="en-US" dirty="0" smtClean="0">
+                <a:latin typeface="Consolas"/>
+                <a:cs typeface="Consolas"/>
+              </a:rPr>
               <a:t>w, </a:t>
             </a:r>
             <a:r>
-              <a:rPr lang="en-US" b="1" dirty="0">
-                <a:latin typeface="Consolas"/>
-                <a:cs typeface="Consolas"/>
-              </a:rPr>
-              <a:t>int </a:t>
-            </a:r>
-            <a:r>
               <a:rPr lang="en-US" dirty="0">
                 <a:latin typeface="Consolas"/>
                 <a:cs typeface="Consolas"/>
               </a:rPr>
-              <a:t>h, </a:t>
-            </a:r>
-            <a:r>
-              <a:rPr lang="en-US" b="1" dirty="0">
-                <a:latin typeface="Consolas"/>
-                <a:cs typeface="Consolas"/>
-              </a:rPr>
-              <a:t>double </a:t>
-            </a:r>
-            <a:r>
-              <a:rPr lang="en-US" dirty="0">
-                <a:latin typeface="Consolas"/>
-                <a:cs typeface="Consolas"/>
-              </a:rPr>
-              <a:t>buf[w∗h]) </a:t>
-            </a:r>
-            <a:r>
-              <a:rPr lang="en-US" b="1" dirty="0">
-                <a:latin typeface="Consolas"/>
-                <a:cs typeface="Consolas"/>
-              </a:rPr>
-              <a:t>serial </a:t>
-            </a:r>
-            <a:r>
-              <a:rPr lang="en-US" dirty="0">
-                <a:latin typeface="Consolas"/>
-                <a:cs typeface="Consolas"/>
-              </a:rPr>
-              <a:t>{ </a:t>
-            </a:r>
-          </a:p>
-          <a:p>
-            <a:pPr marL="0" indent="0">
-              <a:buNone/>
-            </a:pPr>
-            <a:r>
-              <a:rPr lang="en-US" dirty="0" smtClean="0">
-                <a:latin typeface="Consolas"/>
-                <a:cs typeface="Consolas"/>
-              </a:rPr>
-              <a:t>            updateBoundary</a:t>
-            </a:r>
-            <a:r>
-              <a:rPr lang="en-US" dirty="0">
-                <a:latin typeface="Consolas"/>
-                <a:cs typeface="Consolas"/>
-              </a:rPr>
-              <a:t>(dir, w, h, buf); </a:t>
+              <a:t>buf); </a:t>
             </a:r>
           </a:p>
           <a:p>
@@ -28959,8 +29070,26 @@
                 <a:latin typeface="Consolas"/>
                 <a:cs typeface="Consolas"/>
               </a:rPr>
-              <a:t>x = thisIndex.x, y = thisIndex.y, z = thisIndex.z;</a:t>
-            </a:r>
+              <a:t>x = thisIndex.x, y = </a:t>
+            </a:r>
+            <a:r>
+              <a:rPr lang="en-US" sz="1050" dirty="0" err="1" smtClean="0">
+                <a:latin typeface="Consolas"/>
+                <a:cs typeface="Consolas"/>
+              </a:rPr>
+              <a:t>thisIndex.y</a:t>
+            </a:r>
+            <a:r>
+              <a:rPr lang="en-US" sz="1050" dirty="0" smtClean="0">
+                <a:latin typeface="Consolas"/>
+                <a:cs typeface="Consolas"/>
+              </a:rPr>
+              <a:t>;</a:t>
+            </a:r>
+            <a:endParaRPr lang="en-US" sz="1050" dirty="0">
+              <a:latin typeface="Consolas"/>
+              <a:cs typeface="Consolas"/>
+            </a:endParaRPr>
           </a:p>
           <a:p>
             <a:pPr marL="0" indent="0">
@@ -28985,7 +29114,21 @@
                 <a:latin typeface="Consolas"/>
                 <a:cs typeface="Consolas"/>
               </a:rPr>
-              <a:t>bdX = blockDimX, bdY = blockDimY, bdZ = blockDimZ; </a:t>
+              <a:t>bdX = blockDimX, bdY = </a:t>
+            </a:r>
+            <a:r>
+              <a:rPr lang="en-US" sz="1050" dirty="0" err="1" smtClean="0">
+                <a:latin typeface="Consolas"/>
+                <a:cs typeface="Consolas"/>
+              </a:rPr>
+              <a:t>blockDimY</a:t>
+            </a:r>
+            <a:r>
+              <a:rPr lang="en-US" sz="1050" dirty="0" smtClean="0">
+                <a:latin typeface="Consolas"/>
+                <a:cs typeface="Consolas"/>
+              </a:rPr>
+              <a:t>; </a:t>
             </a:r>
             <a:endParaRPr lang="en-US" sz="1050" dirty="0" smtClean="0">
               <a:latin typeface="Consolas"/>
@@ -29015,7 +29158,42 @@
                 <a:latin typeface="Consolas"/>
                 <a:cs typeface="Consolas"/>
               </a:rPr>
-              <a:t>(wrapX(x−1),y,z).updateGhosts(iter, RIGHT, bdY, bdZ, rightGhost); </a:t>
+              <a:t>(wrapX(x−1),</a:t>
+            </a:r>
+            <a:r>
+              <a:rPr lang="en-US" sz="1050" dirty="0" smtClean="0">
+                <a:latin typeface="Consolas"/>
+                <a:cs typeface="Consolas"/>
+              </a:rPr>
+              <a:t>y)</a:t>
+            </a:r>
+            <a:r>
+              <a:rPr lang="en-US" sz="1050" dirty="0">
+                <a:latin typeface="Consolas"/>
+                <a:cs typeface="Consolas"/>
+              </a:rPr>
+              <a:t>.updateGhosts(iter, RIGHT, </a:t>
+            </a:r>
+            <a:r>
+              <a:rPr lang="en-US" sz="1050" dirty="0" err="1" smtClean="0">
+                <a:latin typeface="Consolas"/>
+                <a:cs typeface="Consolas"/>
+              </a:rPr>
+              <a:t>bdY</a:t>
+            </a:r>
+            <a:r>
+              <a:rPr lang="en-US" sz="1050" dirty="0" smtClean="0">
+                <a:latin typeface="Consolas"/>
+                <a:cs typeface="Consolas"/>
+              </a:rPr>
+              <a:t>, </a:t>
+            </a:r>
+            <a:r>
+              <a:rPr lang="en-US" sz="1050" dirty="0">
+                <a:latin typeface="Consolas"/>
+                <a:cs typeface="Consolas"/>
+              </a:rPr>
+              <a:t>rightGhost); </a:t>
             </a:r>
             <a:endParaRPr lang="en-US" sz="1050" dirty="0" smtClean="0">
               <a:latin typeface="Consolas"/>
@@ -29045,7 +29223,42 @@
                 <a:latin typeface="Consolas"/>
                 <a:cs typeface="Consolas"/>
               </a:rPr>
-              <a:t>(wrapX(x+1),y,z).updateGhosts(iter, LEFT, bdY, bdZ, leftGhost); </a:t>
+              <a:t>(wrapX(x+1),</a:t>
+            </a:r>
+            <a:r>
+              <a:rPr lang="en-US" sz="1050" dirty="0" smtClean="0">
+                <a:latin typeface="Consolas"/>
+                <a:cs typeface="Consolas"/>
+              </a:rPr>
+              <a:t>y)</a:t>
+            </a:r>
+            <a:r>
+              <a:rPr lang="en-US" sz="1050" dirty="0">
+                <a:latin typeface="Consolas"/>
+                <a:cs typeface="Consolas"/>
+              </a:rPr>
+              <a:t>.updateGhosts(iter, LEFT, </a:t>
+            </a:r>
+            <a:r>
+              <a:rPr lang="en-US" sz="1050" dirty="0" err="1" smtClean="0">
+                <a:latin typeface="Consolas"/>
+                <a:cs typeface="Consolas"/>
+              </a:rPr>
+              <a:t>bdY</a:t>
+            </a:r>
+            <a:r>
+              <a:rPr lang="en-US" sz="1050" dirty="0" smtClean="0">
+                <a:latin typeface="Consolas"/>
+                <a:cs typeface="Consolas"/>
+              </a:rPr>
+              <a:t>, </a:t>
+            </a:r>
+            <a:r>
+              <a:rPr lang="en-US" sz="1050" dirty="0">
+                <a:latin typeface="Consolas"/>
+                <a:cs typeface="Consolas"/>
+              </a:rPr>
+              <a:t>leftGhost); </a:t>
             </a:r>
             <a:endParaRPr lang="en-US" sz="1050" dirty="0" smtClean="0">
               <a:latin typeface="Consolas"/>
@@ -29075,7 +29288,42 @@
                 <a:latin typeface="Consolas"/>
                 <a:cs typeface="Consolas"/>
               </a:rPr>
-              <a:t>(x,wrapY(y−1),z).updateGhosts(iter, TOP, bdX, bdZ, topGhost); </a:t>
+              <a:t>(x,wrapY(y−1</a:t>
+            </a:r>
+            <a:r>
+              <a:rPr lang="en-US" sz="1050" dirty="0" smtClean="0">
+                <a:latin typeface="Consolas"/>
+                <a:cs typeface="Consolas"/>
+              </a:rPr>
+              <a:t>))</a:t>
+            </a:r>
+            <a:r>
+              <a:rPr lang="en-US" sz="1050" dirty="0">
+                <a:latin typeface="Consolas"/>
+                <a:cs typeface="Consolas"/>
+              </a:rPr>
+              <a:t>.updateGhosts(iter, TOP, </a:t>
+            </a:r>
+            <a:r>
+              <a:rPr lang="en-US" sz="1050" dirty="0" err="1" smtClean="0">
+                <a:latin typeface="Consolas"/>
+                <a:cs typeface="Consolas"/>
+              </a:rPr>
+              <a:t>bdX</a:t>
+            </a:r>
+            <a:r>
+              <a:rPr lang="en-US" sz="1050" dirty="0" smtClean="0">
+                <a:latin typeface="Consolas"/>
+                <a:cs typeface="Consolas"/>
+              </a:rPr>
+              <a:t>, </a:t>
+            </a:r>
+            <a:r>
+              <a:rPr lang="en-US" sz="1050" dirty="0">
+                <a:latin typeface="Consolas"/>
+                <a:cs typeface="Consolas"/>
+              </a:rPr>
+              <a:t>topGhost); </a:t>
             </a:r>
             <a:endParaRPr lang="en-US" sz="1050" dirty="0" smtClean="0">
               <a:latin typeface="Consolas"/>
@@ -29105,7 +29353,42 @@
                 <a:latin typeface="Consolas"/>
                 <a:cs typeface="Consolas"/>
               </a:rPr>
-              <a:t>(x,wrapY(y+1),z).updateGhosts(iter, BOTTOM, bdX, bdZ, bottomGhost); </a:t>
+              <a:t>(x,wrapY(y+1</a:t>
+            </a:r>
+            <a:r>
+              <a:rPr lang="en-US" sz="1050" dirty="0" smtClean="0">
+                <a:latin typeface="Consolas"/>
+                <a:cs typeface="Consolas"/>
+              </a:rPr>
+              <a:t>))</a:t>
+            </a:r>
+            <a:r>
+              <a:rPr lang="en-US" sz="1050" dirty="0">
+                <a:latin typeface="Consolas"/>
+                <a:cs typeface="Consolas"/>
+              </a:rPr>
+              <a:t>.updateGhosts(iter, BOTTOM, </a:t>
+            </a:r>
+            <a:r>
+              <a:rPr lang="en-US" sz="1050" dirty="0" err="1" smtClean="0">
+                <a:latin typeface="Consolas"/>
+                <a:cs typeface="Consolas"/>
+              </a:rPr>
+              <a:t>bdX</a:t>
+            </a:r>
+            <a:r>
+              <a:rPr lang="en-US" sz="1050" dirty="0" smtClean="0">
+                <a:latin typeface="Consolas"/>
+                <a:cs typeface="Consolas"/>
+              </a:rPr>
+              <a:t>, </a:t>
+            </a:r>
+            <a:r>
+              <a:rPr lang="en-US" sz="1050" dirty="0">
+                <a:latin typeface="Consolas"/>
+                <a:cs typeface="Consolas"/>
+              </a:rPr>
+              <a:t>bottomGhost); </a:t>
             </a:r>
             <a:endParaRPr lang="en-US" sz="1050" dirty="0" smtClean="0">
               <a:latin typeface="Consolas"/>
@@ -29117,78 +29400,18 @@
               <a:buNone/>
             </a:pPr>
             <a:r>
-              <a:rPr lang="en-US" sz="1050" dirty="0">
-                <a:latin typeface="Consolas"/>
-                <a:cs typeface="Consolas"/>
-              </a:rPr>
-              <a:t> </a:t>
-            </a:r>
-            <a:r>
               <a:rPr lang="en-US" sz="1050" dirty="0" smtClean="0">
                 <a:latin typeface="Consolas"/>
                 <a:cs typeface="Consolas"/>
               </a:rPr>
-              <a:t>           thisProxy</a:t>
-            </a:r>
-            <a:r>
-              <a:rPr lang="en-US" sz="1050" dirty="0">
-                <a:latin typeface="Consolas"/>
-                <a:cs typeface="Consolas"/>
-              </a:rPr>
-              <a:t>(x,y,wrapZ(z−1)).updateGhosts(iter, BACK, bdX, bdY, backGhost); </a:t>
-            </a:r>
-            <a:endParaRPr lang="en-US" sz="1050" dirty="0" smtClean="0">
-              <a:latin typeface="Consolas"/>
-              <a:cs typeface="Consolas"/>
-            </a:endParaRPr>
-          </a:p>
-          <a:p>
-            <a:pPr marL="0" indent="0">
-              <a:buNone/>
-            </a:pPr>
-            <a:r>
-              <a:rPr lang="en-US" sz="1050" dirty="0">
-                <a:latin typeface="Consolas"/>
-                <a:cs typeface="Consolas"/>
-              </a:rPr>
-              <a:t> </a:t>
-            </a:r>
-            <a:r>
-              <a:rPr lang="en-US" sz="1050" dirty="0" smtClean="0">
-                <a:latin typeface="Consolas"/>
-                <a:cs typeface="Consolas"/>
-              </a:rPr>
-              <a:t>           thisProxy</a:t>
-            </a:r>
-            <a:r>
-              <a:rPr lang="en-US" sz="1050" dirty="0">
-                <a:latin typeface="Consolas"/>
-                <a:cs typeface="Consolas"/>
-              </a:rPr>
-              <a:t>(x,y,wrapZ(z+1)).updateGhosts(iter, FRONT, bdX, bdY, frontGhost); </a:t>
-            </a:r>
-            <a:endParaRPr lang="en-US" sz="1050" dirty="0" smtClean="0">
-              <a:latin typeface="Consolas"/>
-              <a:cs typeface="Consolas"/>
-            </a:endParaRPr>
-          </a:p>
-          <a:p>
-            <a:pPr marL="0" indent="0">
-              <a:buNone/>
-            </a:pPr>
-            <a:r>
-              <a:rPr lang="en-US" sz="1050" dirty="0">
-                <a:latin typeface="Consolas"/>
-                <a:cs typeface="Consolas"/>
-              </a:rPr>
-              <a:t> </a:t>
-            </a:r>
-            <a:r>
-              <a:rPr lang="en-US" sz="1050" dirty="0" smtClean="0">
-                <a:latin typeface="Consolas"/>
-                <a:cs typeface="Consolas"/>
-              </a:rPr>
-              <a:t>           freeBoundaries</a:t>
+              <a:t>            </a:t>
+            </a:r>
+            <a:r>
+              <a:rPr lang="en-US" sz="1050" dirty="0" err="1" smtClean="0">
+                <a:latin typeface="Consolas"/>
+                <a:cs typeface="Consolas"/>
+              </a:rPr>
+              <a:t>freeBoundaries</a:t>
             </a:r>
             <a:r>
               <a:rPr lang="en-US" sz="1050" dirty="0">
@@ -29237,7 +29460,21 @@
                 <a:latin typeface="Consolas"/>
                 <a:cs typeface="Consolas"/>
               </a:rPr>
-              <a:t>(remoteCount = 0; remoteCount &lt; 6; remoteCount++)</a:t>
+              <a:t>(remoteCount = 0; remoteCount &lt; </a:t>
+            </a:r>
+            <a:r>
+              <a:rPr lang="en-US" sz="1050" dirty="0" smtClean="0">
+                <a:latin typeface="Consolas"/>
+                <a:cs typeface="Consolas"/>
+              </a:rPr>
+              <a:t>4; </a:t>
+            </a:r>
+            <a:r>
+              <a:rPr lang="en-US" sz="1050" dirty="0">
+                <a:latin typeface="Consolas"/>
+                <a:cs typeface="Consolas"/>
+              </a:rPr>
+              <a:t>remoteCount++)</a:t>
             </a:r>
           </a:p>
           <a:p>
@@ -29305,68 +29542,89 @@
                 <a:latin typeface="Consolas"/>
                 <a:cs typeface="Consolas"/>
               </a:rPr>
+              <a:t>w</a:t>
+            </a:r>
+            <a:r>
+              <a:rPr lang="en-US" sz="1050" dirty="0" smtClean="0">
+                <a:latin typeface="Consolas"/>
+                <a:cs typeface="Consolas"/>
+              </a:rPr>
+              <a:t>, </a:t>
+            </a:r>
+            <a:r>
+              <a:rPr lang="en-US" sz="1050" b="1" dirty="0">
+                <a:latin typeface="Consolas"/>
+                <a:cs typeface="Consolas"/>
+              </a:rPr>
+              <a:t>double </a:t>
+            </a:r>
+            <a:r>
+              <a:rPr lang="en-US" sz="1050" dirty="0">
+                <a:latin typeface="Consolas"/>
+                <a:cs typeface="Consolas"/>
+              </a:rPr>
+              <a:t>buf[</a:t>
+            </a:r>
+            <a:r>
+              <a:rPr lang="en-US" sz="1050" dirty="0" smtClean="0">
+                <a:latin typeface="Consolas"/>
+                <a:cs typeface="Consolas"/>
+              </a:rPr>
+              <a:t>w]</a:t>
+            </a:r>
+            <a:r>
+              <a:rPr lang="en-US" sz="1050" dirty="0">
+                <a:latin typeface="Consolas"/>
+                <a:cs typeface="Consolas"/>
+              </a:rPr>
+              <a:t>) </a:t>
+            </a:r>
+            <a:r>
+              <a:rPr lang="en-US" sz="1050" b="1" dirty="0">
+                <a:latin typeface="Consolas"/>
+                <a:cs typeface="Consolas"/>
+              </a:rPr>
+              <a:t>serial </a:t>
+            </a:r>
+            <a:r>
+              <a:rPr lang="en-US" sz="1050" dirty="0">
+                <a:latin typeface="Consolas"/>
+                <a:cs typeface="Consolas"/>
+              </a:rPr>
+              <a:t>{</a:t>
+            </a:r>
+          </a:p>
+          <a:p>
+            <a:pPr marL="0" indent="0">
+              <a:buNone/>
+            </a:pPr>
+            <a:r>
+              <a:rPr lang="en-US" sz="1050" dirty="0" smtClean="0">
+                <a:latin typeface="Consolas"/>
+                <a:cs typeface="Consolas"/>
+              </a:rPr>
+              <a:t>                updateBoundary</a:t>
+            </a:r>
+            <a:r>
+              <a:rPr lang="en-US" sz="1050" dirty="0">
+                <a:latin typeface="Consolas"/>
+                <a:cs typeface="Consolas"/>
+              </a:rPr>
+              <a:t>(dir, </a:t>
+            </a:r>
+            <a:r>
+              <a:rPr lang="en-US" sz="1050" dirty="0" smtClean="0">
+                <a:latin typeface="Consolas"/>
+                <a:cs typeface="Consolas"/>
+              </a:rPr>
               <a:t>w, </a:t>
             </a:r>
             <a:r>
-              <a:rPr lang="en-US" sz="1050" b="1" dirty="0">
-                <a:latin typeface="Consolas"/>
-                <a:cs typeface="Consolas"/>
-              </a:rPr>
-              <a:t>int </a:t>
-            </a:r>
-            <a:r>
               <a:rPr lang="en-US" sz="1050" dirty="0">
                 <a:latin typeface="Consolas"/>
                 <a:cs typeface="Consolas"/>
               </a:rPr>
-              <a:t>h, </a:t>
-            </a:r>
-            <a:r>
-              <a:rPr lang="en-US" sz="1050" b="1" dirty="0">
-                <a:latin typeface="Consolas"/>
-                <a:cs typeface="Consolas"/>
-              </a:rPr>
-              <a:t>double </a:t>
-            </a:r>
-            <a:r>
-              <a:rPr lang="en-US" sz="1050" dirty="0">
-                <a:latin typeface="Consolas"/>
-                <a:cs typeface="Consolas"/>
-              </a:rPr>
-              <a:t>buf[w∗h]) </a:t>
-            </a:r>
-            <a:r>
-              <a:rPr lang="en-US" sz="1050" b="1" dirty="0">
-                <a:latin typeface="Consolas"/>
-                <a:cs typeface="Consolas"/>
-              </a:rPr>
-              <a:t>serial </a:t>
-            </a:r>
-            <a:r>
-              <a:rPr lang="en-US" sz="1050" dirty="0">
-                <a:latin typeface="Consolas"/>
-                <a:cs typeface="Consolas"/>
-              </a:rPr>
-              <a:t>{</a:t>
-            </a:r>
-          </a:p>
-          <a:p>
-            <a:pPr marL="0" indent="0">
-              <a:buNone/>
-            </a:pPr>
-            <a:r>
-              <a:rPr lang="en-US" sz="1050" dirty="0" smtClean="0">
-                <a:latin typeface="Consolas"/>
-                <a:cs typeface="Consolas"/>
-              </a:rPr>
-              <a:t>                updateBoundary</a:t>
-            </a:r>
-            <a:r>
-              <a:rPr lang="en-US" sz="1050" dirty="0">
-                <a:latin typeface="Consolas"/>
-                <a:cs typeface="Consolas"/>
-              </a:rPr>
-              <a:t>(dir, w, h, buf);</a:t>
+              <a:t>buf);</a:t>
             </a:r>
           </a:p>
           <a:p>

</xml_diff>